<commit_message>
update doc and ppt
</commit_message>
<xml_diff>
--- a/docs/Figures_for_FastMarchingMethod_for_Outpainting.pptx
+++ b/docs/Figures_for_FastMarchingMethod_for_Outpainting.pptx
@@ -6,6 +6,7 @@
   </p:sldMasterIdLst>
   <p:sldIdLst>
     <p:sldId id="256" r:id="rId2"/>
+    <p:sldId id="257" r:id="rId3"/>
   </p:sldIdLst>
   <p:sldSz cx="12192000" cy="6858000"/>
   <p:notesSz cx="6858000" cy="9144000"/>
@@ -5309,6 +5310,1430 @@
 </p:sld>
 </file>
 
+<file path=ppt/slides/slide2.xml><?xml version="1.0" encoding="utf-8"?>
+<p:sld xmlns:a="http://schemas.openxmlformats.org/drawingml/2006/main" xmlns:r="http://schemas.openxmlformats.org/officeDocument/2006/relationships" xmlns:p="http://schemas.openxmlformats.org/presentationml/2006/main">
+  <p:cSld>
+    <p:spTree>
+      <p:nvGrpSpPr>
+        <p:cNvPr id="1" name=""/>
+        <p:cNvGrpSpPr/>
+        <p:nvPr/>
+      </p:nvGrpSpPr>
+      <p:grpSpPr>
+        <a:xfrm>
+          <a:off x="0" y="0"/>
+          <a:ext cx="0" cy="0"/>
+          <a:chOff x="0" y="0"/>
+          <a:chExt cx="0" cy="0"/>
+        </a:xfrm>
+      </p:grpSpPr>
+      <p:cxnSp>
+        <p:nvCxnSpPr>
+          <p:cNvPr id="3" name="Straight Connector 2">
+            <a:extLst>
+              <a:ext uri="{FF2B5EF4-FFF2-40B4-BE49-F238E27FC236}">
+                <a16:creationId xmlns:a16="http://schemas.microsoft.com/office/drawing/2014/main" id="{3B25834A-EF25-6492-1E00-CCB28D2FB054}"/>
+              </a:ext>
+            </a:extLst>
+          </p:cNvPr>
+          <p:cNvCxnSpPr>
+            <a:cxnSpLocks/>
+          </p:cNvCxnSpPr>
+          <p:nvPr/>
+        </p:nvCxnSpPr>
+        <p:spPr>
+          <a:xfrm>
+            <a:off x="4899025" y="2400300"/>
+            <a:ext cx="0" cy="1784350"/>
+          </a:xfrm>
+          <a:prstGeom prst="line">
+            <a:avLst/>
+          </a:prstGeom>
+          <a:ln w="12700"/>
+        </p:spPr>
+        <p:style>
+          <a:lnRef idx="2">
+            <a:schemeClr val="accent1"/>
+          </a:lnRef>
+          <a:fillRef idx="0">
+            <a:schemeClr val="accent1"/>
+          </a:fillRef>
+          <a:effectRef idx="1">
+            <a:schemeClr val="accent1"/>
+          </a:effectRef>
+          <a:fontRef idx="minor">
+            <a:schemeClr val="tx1"/>
+          </a:fontRef>
+        </p:style>
+      </p:cxnSp>
+      <p:cxnSp>
+        <p:nvCxnSpPr>
+          <p:cNvPr id="6" name="Straight Connector 5">
+            <a:extLst>
+              <a:ext uri="{FF2B5EF4-FFF2-40B4-BE49-F238E27FC236}">
+                <a16:creationId xmlns:a16="http://schemas.microsoft.com/office/drawing/2014/main" id="{D81661F7-D64B-FEE1-DE85-98DAC16CE67A}"/>
+              </a:ext>
+            </a:extLst>
+          </p:cNvPr>
+          <p:cNvCxnSpPr/>
+          <p:nvPr/>
+        </p:nvCxnSpPr>
+        <p:spPr>
+          <a:xfrm>
+            <a:off x="3956050" y="2400300"/>
+            <a:ext cx="2381250" cy="0"/>
+          </a:xfrm>
+          <a:prstGeom prst="line">
+            <a:avLst/>
+          </a:prstGeom>
+          <a:ln w="12700"/>
+        </p:spPr>
+        <p:style>
+          <a:lnRef idx="2">
+            <a:schemeClr val="accent1"/>
+          </a:lnRef>
+          <a:fillRef idx="0">
+            <a:schemeClr val="accent1"/>
+          </a:fillRef>
+          <a:effectRef idx="1">
+            <a:schemeClr val="accent1"/>
+          </a:effectRef>
+          <a:fontRef idx="minor">
+            <a:schemeClr val="tx1"/>
+          </a:fontRef>
+        </p:style>
+      </p:cxnSp>
+      <p:cxnSp>
+        <p:nvCxnSpPr>
+          <p:cNvPr id="8" name="Straight Connector 7">
+            <a:extLst>
+              <a:ext uri="{FF2B5EF4-FFF2-40B4-BE49-F238E27FC236}">
+                <a16:creationId xmlns:a16="http://schemas.microsoft.com/office/drawing/2014/main" id="{646B8BAB-8238-3B9A-E964-33EFF1697DE9}"/>
+              </a:ext>
+            </a:extLst>
+          </p:cNvPr>
+          <p:cNvCxnSpPr/>
+          <p:nvPr/>
+        </p:nvCxnSpPr>
+        <p:spPr>
+          <a:xfrm>
+            <a:off x="3956050" y="2400300"/>
+            <a:ext cx="0" cy="1784350"/>
+          </a:xfrm>
+          <a:prstGeom prst="line">
+            <a:avLst/>
+          </a:prstGeom>
+          <a:ln>
+            <a:solidFill>
+              <a:schemeClr val="tx1"/>
+            </a:solidFill>
+          </a:ln>
+        </p:spPr>
+        <p:style>
+          <a:lnRef idx="1">
+            <a:schemeClr val="accent6"/>
+          </a:lnRef>
+          <a:fillRef idx="0">
+            <a:schemeClr val="accent6"/>
+          </a:fillRef>
+          <a:effectRef idx="0">
+            <a:schemeClr val="accent6"/>
+          </a:effectRef>
+          <a:fontRef idx="minor">
+            <a:schemeClr val="tx1"/>
+          </a:fontRef>
+        </p:style>
+      </p:cxnSp>
+      <p:cxnSp>
+        <p:nvCxnSpPr>
+          <p:cNvPr id="10" name="Straight Connector 9">
+            <a:extLst>
+              <a:ext uri="{FF2B5EF4-FFF2-40B4-BE49-F238E27FC236}">
+                <a16:creationId xmlns:a16="http://schemas.microsoft.com/office/drawing/2014/main" id="{CD90D85F-0737-CC26-09F2-27ADC315DEE1}"/>
+              </a:ext>
+            </a:extLst>
+          </p:cNvPr>
+          <p:cNvCxnSpPr/>
+          <p:nvPr/>
+        </p:nvCxnSpPr>
+        <p:spPr>
+          <a:xfrm>
+            <a:off x="3956050" y="4184650"/>
+            <a:ext cx="2514600" cy="0"/>
+          </a:xfrm>
+          <a:prstGeom prst="line">
+            <a:avLst/>
+          </a:prstGeom>
+          <a:ln w="12700"/>
+        </p:spPr>
+        <p:style>
+          <a:lnRef idx="2">
+            <a:schemeClr val="accent1"/>
+          </a:lnRef>
+          <a:fillRef idx="0">
+            <a:schemeClr val="accent1"/>
+          </a:fillRef>
+          <a:effectRef idx="1">
+            <a:schemeClr val="accent1"/>
+          </a:effectRef>
+          <a:fontRef idx="minor">
+            <a:schemeClr val="tx1"/>
+          </a:fontRef>
+        </p:style>
+      </p:cxnSp>
+      <p:sp>
+        <p:nvSpPr>
+          <p:cNvPr id="11" name="Freeform 10">
+            <a:extLst>
+              <a:ext uri="{FF2B5EF4-FFF2-40B4-BE49-F238E27FC236}">
+                <a16:creationId xmlns:a16="http://schemas.microsoft.com/office/drawing/2014/main" id="{CA6BBB28-8A2C-2B16-ED48-36AFB117E064}"/>
+              </a:ext>
+            </a:extLst>
+          </p:cNvPr>
+          <p:cNvSpPr/>
+          <p:nvPr/>
+        </p:nvSpPr>
+        <p:spPr>
+          <a:xfrm>
+            <a:off x="6311900" y="2406650"/>
+            <a:ext cx="274763" cy="1774825"/>
+          </a:xfrm>
+          <a:custGeom>
+            <a:avLst/>
+            <a:gdLst>
+              <a:gd name="connsiteX0" fmla="*/ 22225 w 274763"/>
+              <a:gd name="connsiteY0" fmla="*/ 0 h 1774825"/>
+              <a:gd name="connsiteX1" fmla="*/ 9525 w 274763"/>
+              <a:gd name="connsiteY1" fmla="*/ 41275 h 1774825"/>
+              <a:gd name="connsiteX2" fmla="*/ 0 w 274763"/>
+              <a:gd name="connsiteY2" fmla="*/ 60325 h 1774825"/>
+              <a:gd name="connsiteX3" fmla="*/ 3175 w 274763"/>
+              <a:gd name="connsiteY3" fmla="*/ 85725 h 1774825"/>
+              <a:gd name="connsiteX4" fmla="*/ 25400 w 274763"/>
+              <a:gd name="connsiteY4" fmla="*/ 111125 h 1774825"/>
+              <a:gd name="connsiteX5" fmla="*/ 44450 w 274763"/>
+              <a:gd name="connsiteY5" fmla="*/ 120650 h 1774825"/>
+              <a:gd name="connsiteX6" fmla="*/ 69850 w 274763"/>
+              <a:gd name="connsiteY6" fmla="*/ 149225 h 1774825"/>
+              <a:gd name="connsiteX7" fmla="*/ 63500 w 274763"/>
+              <a:gd name="connsiteY7" fmla="*/ 219075 h 1774825"/>
+              <a:gd name="connsiteX8" fmla="*/ 57150 w 274763"/>
+              <a:gd name="connsiteY8" fmla="*/ 263525 h 1774825"/>
+              <a:gd name="connsiteX9" fmla="*/ 53975 w 274763"/>
+              <a:gd name="connsiteY9" fmla="*/ 301625 h 1774825"/>
+              <a:gd name="connsiteX10" fmla="*/ 57150 w 274763"/>
+              <a:gd name="connsiteY10" fmla="*/ 390525 h 1774825"/>
+              <a:gd name="connsiteX11" fmla="*/ 63500 w 274763"/>
+              <a:gd name="connsiteY11" fmla="*/ 403225 h 1774825"/>
+              <a:gd name="connsiteX12" fmla="*/ 88900 w 274763"/>
+              <a:gd name="connsiteY12" fmla="*/ 415925 h 1774825"/>
+              <a:gd name="connsiteX13" fmla="*/ 101600 w 274763"/>
+              <a:gd name="connsiteY13" fmla="*/ 422275 h 1774825"/>
+              <a:gd name="connsiteX14" fmla="*/ 120650 w 274763"/>
+              <a:gd name="connsiteY14" fmla="*/ 428625 h 1774825"/>
+              <a:gd name="connsiteX15" fmla="*/ 130175 w 274763"/>
+              <a:gd name="connsiteY15" fmla="*/ 431800 h 1774825"/>
+              <a:gd name="connsiteX16" fmla="*/ 139700 w 274763"/>
+              <a:gd name="connsiteY16" fmla="*/ 441325 h 1774825"/>
+              <a:gd name="connsiteX17" fmla="*/ 142875 w 274763"/>
+              <a:gd name="connsiteY17" fmla="*/ 485775 h 1774825"/>
+              <a:gd name="connsiteX18" fmla="*/ 139700 w 274763"/>
+              <a:gd name="connsiteY18" fmla="*/ 501650 h 1774825"/>
+              <a:gd name="connsiteX19" fmla="*/ 133350 w 274763"/>
+              <a:gd name="connsiteY19" fmla="*/ 520700 h 1774825"/>
+              <a:gd name="connsiteX20" fmla="*/ 139700 w 274763"/>
+              <a:gd name="connsiteY20" fmla="*/ 669925 h 1774825"/>
+              <a:gd name="connsiteX21" fmla="*/ 142875 w 274763"/>
+              <a:gd name="connsiteY21" fmla="*/ 708025 h 1774825"/>
+              <a:gd name="connsiteX22" fmla="*/ 152400 w 274763"/>
+              <a:gd name="connsiteY22" fmla="*/ 717550 h 1774825"/>
+              <a:gd name="connsiteX23" fmla="*/ 184150 w 274763"/>
+              <a:gd name="connsiteY23" fmla="*/ 727075 h 1774825"/>
+              <a:gd name="connsiteX24" fmla="*/ 206375 w 274763"/>
+              <a:gd name="connsiteY24" fmla="*/ 733425 h 1774825"/>
+              <a:gd name="connsiteX25" fmla="*/ 215900 w 274763"/>
+              <a:gd name="connsiteY25" fmla="*/ 742950 h 1774825"/>
+              <a:gd name="connsiteX26" fmla="*/ 225425 w 274763"/>
+              <a:gd name="connsiteY26" fmla="*/ 749300 h 1774825"/>
+              <a:gd name="connsiteX27" fmla="*/ 228600 w 274763"/>
+              <a:gd name="connsiteY27" fmla="*/ 758825 h 1774825"/>
+              <a:gd name="connsiteX28" fmla="*/ 234950 w 274763"/>
+              <a:gd name="connsiteY28" fmla="*/ 768350 h 1774825"/>
+              <a:gd name="connsiteX29" fmla="*/ 231775 w 274763"/>
+              <a:gd name="connsiteY29" fmla="*/ 803275 h 1774825"/>
+              <a:gd name="connsiteX30" fmla="*/ 228600 w 274763"/>
+              <a:gd name="connsiteY30" fmla="*/ 815975 h 1774825"/>
+              <a:gd name="connsiteX31" fmla="*/ 225425 w 274763"/>
+              <a:gd name="connsiteY31" fmla="*/ 841375 h 1774825"/>
+              <a:gd name="connsiteX32" fmla="*/ 219075 w 274763"/>
+              <a:gd name="connsiteY32" fmla="*/ 898525 h 1774825"/>
+              <a:gd name="connsiteX33" fmla="*/ 212725 w 274763"/>
+              <a:gd name="connsiteY33" fmla="*/ 977900 h 1774825"/>
+              <a:gd name="connsiteX34" fmla="*/ 206375 w 274763"/>
+              <a:gd name="connsiteY34" fmla="*/ 996950 h 1774825"/>
+              <a:gd name="connsiteX35" fmla="*/ 196850 w 274763"/>
+              <a:gd name="connsiteY35" fmla="*/ 1025525 h 1774825"/>
+              <a:gd name="connsiteX36" fmla="*/ 193675 w 274763"/>
+              <a:gd name="connsiteY36" fmla="*/ 1035050 h 1774825"/>
+              <a:gd name="connsiteX37" fmla="*/ 190500 w 274763"/>
+              <a:gd name="connsiteY37" fmla="*/ 1044575 h 1774825"/>
+              <a:gd name="connsiteX38" fmla="*/ 193675 w 274763"/>
+              <a:gd name="connsiteY38" fmla="*/ 1066800 h 1774825"/>
+              <a:gd name="connsiteX39" fmla="*/ 212725 w 274763"/>
+              <a:gd name="connsiteY39" fmla="*/ 1079500 h 1774825"/>
+              <a:gd name="connsiteX40" fmla="*/ 222250 w 274763"/>
+              <a:gd name="connsiteY40" fmla="*/ 1085850 h 1774825"/>
+              <a:gd name="connsiteX41" fmla="*/ 234950 w 274763"/>
+              <a:gd name="connsiteY41" fmla="*/ 1089025 h 1774825"/>
+              <a:gd name="connsiteX42" fmla="*/ 260350 w 274763"/>
+              <a:gd name="connsiteY42" fmla="*/ 1098550 h 1774825"/>
+              <a:gd name="connsiteX43" fmla="*/ 269875 w 274763"/>
+              <a:gd name="connsiteY43" fmla="*/ 1212850 h 1774825"/>
+              <a:gd name="connsiteX44" fmla="*/ 266700 w 274763"/>
+              <a:gd name="connsiteY44" fmla="*/ 1263650 h 1774825"/>
+              <a:gd name="connsiteX45" fmla="*/ 238125 w 274763"/>
+              <a:gd name="connsiteY45" fmla="*/ 1292225 h 1774825"/>
+              <a:gd name="connsiteX46" fmla="*/ 219075 w 274763"/>
+              <a:gd name="connsiteY46" fmla="*/ 1327150 h 1774825"/>
+              <a:gd name="connsiteX47" fmla="*/ 215900 w 274763"/>
+              <a:gd name="connsiteY47" fmla="*/ 1339850 h 1774825"/>
+              <a:gd name="connsiteX48" fmla="*/ 209550 w 274763"/>
+              <a:gd name="connsiteY48" fmla="*/ 1431925 h 1774825"/>
+              <a:gd name="connsiteX49" fmla="*/ 212725 w 274763"/>
+              <a:gd name="connsiteY49" fmla="*/ 1463675 h 1774825"/>
+              <a:gd name="connsiteX50" fmla="*/ 206375 w 274763"/>
+              <a:gd name="connsiteY50" fmla="*/ 1495425 h 1774825"/>
+              <a:gd name="connsiteX51" fmla="*/ 200025 w 274763"/>
+              <a:gd name="connsiteY51" fmla="*/ 1504950 h 1774825"/>
+              <a:gd name="connsiteX52" fmla="*/ 193675 w 274763"/>
+              <a:gd name="connsiteY52" fmla="*/ 1530350 h 1774825"/>
+              <a:gd name="connsiteX53" fmla="*/ 190500 w 274763"/>
+              <a:gd name="connsiteY53" fmla="*/ 1543050 h 1774825"/>
+              <a:gd name="connsiteX54" fmla="*/ 177800 w 274763"/>
+              <a:gd name="connsiteY54" fmla="*/ 1577975 h 1774825"/>
+              <a:gd name="connsiteX55" fmla="*/ 171450 w 274763"/>
+              <a:gd name="connsiteY55" fmla="*/ 1603375 h 1774825"/>
+              <a:gd name="connsiteX56" fmla="*/ 174625 w 274763"/>
+              <a:gd name="connsiteY56" fmla="*/ 1628775 h 1774825"/>
+              <a:gd name="connsiteX57" fmla="*/ 187325 w 274763"/>
+              <a:gd name="connsiteY57" fmla="*/ 1647825 h 1774825"/>
+              <a:gd name="connsiteX58" fmla="*/ 190500 w 274763"/>
+              <a:gd name="connsiteY58" fmla="*/ 1657350 h 1774825"/>
+              <a:gd name="connsiteX59" fmla="*/ 187325 w 274763"/>
+              <a:gd name="connsiteY59" fmla="*/ 1695450 h 1774825"/>
+              <a:gd name="connsiteX60" fmla="*/ 184150 w 274763"/>
+              <a:gd name="connsiteY60" fmla="*/ 1708150 h 1774825"/>
+              <a:gd name="connsiteX61" fmla="*/ 174625 w 274763"/>
+              <a:gd name="connsiteY61" fmla="*/ 1736725 h 1774825"/>
+              <a:gd name="connsiteX62" fmla="*/ 165100 w 274763"/>
+              <a:gd name="connsiteY62" fmla="*/ 1755775 h 1774825"/>
+              <a:gd name="connsiteX63" fmla="*/ 161925 w 274763"/>
+              <a:gd name="connsiteY63" fmla="*/ 1765300 h 1774825"/>
+              <a:gd name="connsiteX64" fmla="*/ 155575 w 274763"/>
+              <a:gd name="connsiteY64" fmla="*/ 1774825 h 1774825"/>
+            </a:gdLst>
+            <a:ahLst/>
+            <a:cxnLst>
+              <a:cxn ang="0">
+                <a:pos x="connsiteX0" y="connsiteY0"/>
+              </a:cxn>
+              <a:cxn ang="0">
+                <a:pos x="connsiteX1" y="connsiteY1"/>
+              </a:cxn>
+              <a:cxn ang="0">
+                <a:pos x="connsiteX2" y="connsiteY2"/>
+              </a:cxn>
+              <a:cxn ang="0">
+                <a:pos x="connsiteX3" y="connsiteY3"/>
+              </a:cxn>
+              <a:cxn ang="0">
+                <a:pos x="connsiteX4" y="connsiteY4"/>
+              </a:cxn>
+              <a:cxn ang="0">
+                <a:pos x="connsiteX5" y="connsiteY5"/>
+              </a:cxn>
+              <a:cxn ang="0">
+                <a:pos x="connsiteX6" y="connsiteY6"/>
+              </a:cxn>
+              <a:cxn ang="0">
+                <a:pos x="connsiteX7" y="connsiteY7"/>
+              </a:cxn>
+              <a:cxn ang="0">
+                <a:pos x="connsiteX8" y="connsiteY8"/>
+              </a:cxn>
+              <a:cxn ang="0">
+                <a:pos x="connsiteX9" y="connsiteY9"/>
+              </a:cxn>
+              <a:cxn ang="0">
+                <a:pos x="connsiteX10" y="connsiteY10"/>
+              </a:cxn>
+              <a:cxn ang="0">
+                <a:pos x="connsiteX11" y="connsiteY11"/>
+              </a:cxn>
+              <a:cxn ang="0">
+                <a:pos x="connsiteX12" y="connsiteY12"/>
+              </a:cxn>
+              <a:cxn ang="0">
+                <a:pos x="connsiteX13" y="connsiteY13"/>
+              </a:cxn>
+              <a:cxn ang="0">
+                <a:pos x="connsiteX14" y="connsiteY14"/>
+              </a:cxn>
+              <a:cxn ang="0">
+                <a:pos x="connsiteX15" y="connsiteY15"/>
+              </a:cxn>
+              <a:cxn ang="0">
+                <a:pos x="connsiteX16" y="connsiteY16"/>
+              </a:cxn>
+              <a:cxn ang="0">
+                <a:pos x="connsiteX17" y="connsiteY17"/>
+              </a:cxn>
+              <a:cxn ang="0">
+                <a:pos x="connsiteX18" y="connsiteY18"/>
+              </a:cxn>
+              <a:cxn ang="0">
+                <a:pos x="connsiteX19" y="connsiteY19"/>
+              </a:cxn>
+              <a:cxn ang="0">
+                <a:pos x="connsiteX20" y="connsiteY20"/>
+              </a:cxn>
+              <a:cxn ang="0">
+                <a:pos x="connsiteX21" y="connsiteY21"/>
+              </a:cxn>
+              <a:cxn ang="0">
+                <a:pos x="connsiteX22" y="connsiteY22"/>
+              </a:cxn>
+              <a:cxn ang="0">
+                <a:pos x="connsiteX23" y="connsiteY23"/>
+              </a:cxn>
+              <a:cxn ang="0">
+                <a:pos x="connsiteX24" y="connsiteY24"/>
+              </a:cxn>
+              <a:cxn ang="0">
+                <a:pos x="connsiteX25" y="connsiteY25"/>
+              </a:cxn>
+              <a:cxn ang="0">
+                <a:pos x="connsiteX26" y="connsiteY26"/>
+              </a:cxn>
+              <a:cxn ang="0">
+                <a:pos x="connsiteX27" y="connsiteY27"/>
+              </a:cxn>
+              <a:cxn ang="0">
+                <a:pos x="connsiteX28" y="connsiteY28"/>
+              </a:cxn>
+              <a:cxn ang="0">
+                <a:pos x="connsiteX29" y="connsiteY29"/>
+              </a:cxn>
+              <a:cxn ang="0">
+                <a:pos x="connsiteX30" y="connsiteY30"/>
+              </a:cxn>
+              <a:cxn ang="0">
+                <a:pos x="connsiteX31" y="connsiteY31"/>
+              </a:cxn>
+              <a:cxn ang="0">
+                <a:pos x="connsiteX32" y="connsiteY32"/>
+              </a:cxn>
+              <a:cxn ang="0">
+                <a:pos x="connsiteX33" y="connsiteY33"/>
+              </a:cxn>
+              <a:cxn ang="0">
+                <a:pos x="connsiteX34" y="connsiteY34"/>
+              </a:cxn>
+              <a:cxn ang="0">
+                <a:pos x="connsiteX35" y="connsiteY35"/>
+              </a:cxn>
+              <a:cxn ang="0">
+                <a:pos x="connsiteX36" y="connsiteY36"/>
+              </a:cxn>
+              <a:cxn ang="0">
+                <a:pos x="connsiteX37" y="connsiteY37"/>
+              </a:cxn>
+              <a:cxn ang="0">
+                <a:pos x="connsiteX38" y="connsiteY38"/>
+              </a:cxn>
+              <a:cxn ang="0">
+                <a:pos x="connsiteX39" y="connsiteY39"/>
+              </a:cxn>
+              <a:cxn ang="0">
+                <a:pos x="connsiteX40" y="connsiteY40"/>
+              </a:cxn>
+              <a:cxn ang="0">
+                <a:pos x="connsiteX41" y="connsiteY41"/>
+              </a:cxn>
+              <a:cxn ang="0">
+                <a:pos x="connsiteX42" y="connsiteY42"/>
+              </a:cxn>
+              <a:cxn ang="0">
+                <a:pos x="connsiteX43" y="connsiteY43"/>
+              </a:cxn>
+              <a:cxn ang="0">
+                <a:pos x="connsiteX44" y="connsiteY44"/>
+              </a:cxn>
+              <a:cxn ang="0">
+                <a:pos x="connsiteX45" y="connsiteY45"/>
+              </a:cxn>
+              <a:cxn ang="0">
+                <a:pos x="connsiteX46" y="connsiteY46"/>
+              </a:cxn>
+              <a:cxn ang="0">
+                <a:pos x="connsiteX47" y="connsiteY47"/>
+              </a:cxn>
+              <a:cxn ang="0">
+                <a:pos x="connsiteX48" y="connsiteY48"/>
+              </a:cxn>
+              <a:cxn ang="0">
+                <a:pos x="connsiteX49" y="connsiteY49"/>
+              </a:cxn>
+              <a:cxn ang="0">
+                <a:pos x="connsiteX50" y="connsiteY50"/>
+              </a:cxn>
+              <a:cxn ang="0">
+                <a:pos x="connsiteX51" y="connsiteY51"/>
+              </a:cxn>
+              <a:cxn ang="0">
+                <a:pos x="connsiteX52" y="connsiteY52"/>
+              </a:cxn>
+              <a:cxn ang="0">
+                <a:pos x="connsiteX53" y="connsiteY53"/>
+              </a:cxn>
+              <a:cxn ang="0">
+                <a:pos x="connsiteX54" y="connsiteY54"/>
+              </a:cxn>
+              <a:cxn ang="0">
+                <a:pos x="connsiteX55" y="connsiteY55"/>
+              </a:cxn>
+              <a:cxn ang="0">
+                <a:pos x="connsiteX56" y="connsiteY56"/>
+              </a:cxn>
+              <a:cxn ang="0">
+                <a:pos x="connsiteX57" y="connsiteY57"/>
+              </a:cxn>
+              <a:cxn ang="0">
+                <a:pos x="connsiteX58" y="connsiteY58"/>
+              </a:cxn>
+              <a:cxn ang="0">
+                <a:pos x="connsiteX59" y="connsiteY59"/>
+              </a:cxn>
+              <a:cxn ang="0">
+                <a:pos x="connsiteX60" y="connsiteY60"/>
+              </a:cxn>
+              <a:cxn ang="0">
+                <a:pos x="connsiteX61" y="connsiteY61"/>
+              </a:cxn>
+              <a:cxn ang="0">
+                <a:pos x="connsiteX62" y="connsiteY62"/>
+              </a:cxn>
+              <a:cxn ang="0">
+                <a:pos x="connsiteX63" y="connsiteY63"/>
+              </a:cxn>
+              <a:cxn ang="0">
+                <a:pos x="connsiteX64" y="connsiteY64"/>
+              </a:cxn>
+            </a:cxnLst>
+            <a:rect l="l" t="t" r="r" b="b"/>
+            <a:pathLst>
+              <a:path w="274763" h="1774825">
+                <a:moveTo>
+                  <a:pt x="22225" y="0"/>
+                </a:moveTo>
+                <a:cubicBezTo>
+                  <a:pt x="21622" y="2112"/>
+                  <a:pt x="11722" y="37980"/>
+                  <a:pt x="9525" y="41275"/>
+                </a:cubicBezTo>
+                <a:cubicBezTo>
+                  <a:pt x="1319" y="53585"/>
+                  <a:pt x="4382" y="47180"/>
+                  <a:pt x="0" y="60325"/>
+                </a:cubicBezTo>
+                <a:cubicBezTo>
+                  <a:pt x="1058" y="68792"/>
+                  <a:pt x="305" y="77690"/>
+                  <a:pt x="3175" y="85725"/>
+                </a:cubicBezTo>
+                <a:cubicBezTo>
+                  <a:pt x="7316" y="97321"/>
+                  <a:pt x="14863" y="105856"/>
+                  <a:pt x="25400" y="111125"/>
+                </a:cubicBezTo>
+                <a:cubicBezTo>
+                  <a:pt x="38009" y="117430"/>
+                  <a:pt x="32751" y="110251"/>
+                  <a:pt x="44450" y="120650"/>
+                </a:cubicBezTo>
+                <a:cubicBezTo>
+                  <a:pt x="62244" y="136467"/>
+                  <a:pt x="60199" y="134748"/>
+                  <a:pt x="69850" y="149225"/>
+                </a:cubicBezTo>
+                <a:cubicBezTo>
+                  <a:pt x="67785" y="176068"/>
+                  <a:pt x="66917" y="193445"/>
+                  <a:pt x="63500" y="219075"/>
+                </a:cubicBezTo>
+                <a:cubicBezTo>
+                  <a:pt x="58574" y="256021"/>
+                  <a:pt x="61585" y="219173"/>
+                  <a:pt x="57150" y="263525"/>
+                </a:cubicBezTo>
+                <a:cubicBezTo>
+                  <a:pt x="55882" y="276206"/>
+                  <a:pt x="55033" y="288925"/>
+                  <a:pt x="53975" y="301625"/>
+                </a:cubicBezTo>
+                <a:cubicBezTo>
+                  <a:pt x="55033" y="331258"/>
+                  <a:pt x="54382" y="361002"/>
+                  <a:pt x="57150" y="390525"/>
+                </a:cubicBezTo>
+                <a:cubicBezTo>
+                  <a:pt x="57592" y="395237"/>
+                  <a:pt x="59804" y="400268"/>
+                  <a:pt x="63500" y="403225"/>
+                </a:cubicBezTo>
+                <a:cubicBezTo>
+                  <a:pt x="70892" y="409138"/>
+                  <a:pt x="80433" y="411692"/>
+                  <a:pt x="88900" y="415925"/>
+                </a:cubicBezTo>
+                <a:cubicBezTo>
+                  <a:pt x="93133" y="418042"/>
+                  <a:pt x="97110" y="420778"/>
+                  <a:pt x="101600" y="422275"/>
+                </a:cubicBezTo>
+                <a:lnTo>
+                  <a:pt x="120650" y="428625"/>
+                </a:lnTo>
+                <a:lnTo>
+                  <a:pt x="130175" y="431800"/>
+                </a:lnTo>
+                <a:cubicBezTo>
+                  <a:pt x="133350" y="434975"/>
+                  <a:pt x="136825" y="437876"/>
+                  <a:pt x="139700" y="441325"/>
+                </a:cubicBezTo>
+                <a:cubicBezTo>
+                  <a:pt x="152578" y="456779"/>
+                  <a:pt x="146261" y="458684"/>
+                  <a:pt x="142875" y="485775"/>
+                </a:cubicBezTo>
+                <a:cubicBezTo>
+                  <a:pt x="142206" y="491130"/>
+                  <a:pt x="141120" y="496444"/>
+                  <a:pt x="139700" y="501650"/>
+                </a:cubicBezTo>
+                <a:cubicBezTo>
+                  <a:pt x="137939" y="508108"/>
+                  <a:pt x="133350" y="520700"/>
+                  <a:pt x="133350" y="520700"/>
+                </a:cubicBezTo>
+                <a:cubicBezTo>
+                  <a:pt x="137814" y="685877"/>
+                  <a:pt x="132355" y="589132"/>
+                  <a:pt x="139700" y="669925"/>
+                </a:cubicBezTo>
+                <a:cubicBezTo>
+                  <a:pt x="140854" y="682617"/>
+                  <a:pt x="139591" y="695711"/>
+                  <a:pt x="142875" y="708025"/>
+                </a:cubicBezTo>
+                <a:cubicBezTo>
+                  <a:pt x="144032" y="712364"/>
+                  <a:pt x="148592" y="715170"/>
+                  <a:pt x="152400" y="717550"/>
+                </a:cubicBezTo>
+                <a:cubicBezTo>
+                  <a:pt x="162869" y="724093"/>
+                  <a:pt x="172549" y="724497"/>
+                  <a:pt x="184150" y="727075"/>
+                </a:cubicBezTo>
+                <a:cubicBezTo>
+                  <a:pt x="196110" y="729733"/>
+                  <a:pt x="195768" y="729889"/>
+                  <a:pt x="206375" y="733425"/>
+                </a:cubicBezTo>
+                <a:cubicBezTo>
+                  <a:pt x="209550" y="736600"/>
+                  <a:pt x="212451" y="740075"/>
+                  <a:pt x="215900" y="742950"/>
+                </a:cubicBezTo>
+                <a:cubicBezTo>
+                  <a:pt x="218831" y="745393"/>
+                  <a:pt x="223041" y="746320"/>
+                  <a:pt x="225425" y="749300"/>
+                </a:cubicBezTo>
+                <a:cubicBezTo>
+                  <a:pt x="227516" y="751913"/>
+                  <a:pt x="227103" y="755832"/>
+                  <a:pt x="228600" y="758825"/>
+                </a:cubicBezTo>
+                <a:cubicBezTo>
+                  <a:pt x="230307" y="762238"/>
+                  <a:pt x="232833" y="765175"/>
+                  <a:pt x="234950" y="768350"/>
+                </a:cubicBezTo>
+                <a:cubicBezTo>
+                  <a:pt x="233892" y="779992"/>
+                  <a:pt x="233320" y="791688"/>
+                  <a:pt x="231775" y="803275"/>
+                </a:cubicBezTo>
+                <a:cubicBezTo>
+                  <a:pt x="231198" y="807600"/>
+                  <a:pt x="229317" y="811671"/>
+                  <a:pt x="228600" y="815975"/>
+                </a:cubicBezTo>
+                <a:cubicBezTo>
+                  <a:pt x="227197" y="824391"/>
+                  <a:pt x="226403" y="832899"/>
+                  <a:pt x="225425" y="841375"/>
+                </a:cubicBezTo>
+                <a:cubicBezTo>
+                  <a:pt x="223228" y="860416"/>
+                  <a:pt x="219075" y="898525"/>
+                  <a:pt x="219075" y="898525"/>
+                </a:cubicBezTo>
+                <a:cubicBezTo>
+                  <a:pt x="218266" y="913889"/>
+                  <a:pt x="218346" y="955417"/>
+                  <a:pt x="212725" y="977900"/>
+                </a:cubicBezTo>
+                <a:cubicBezTo>
+                  <a:pt x="211102" y="984394"/>
+                  <a:pt x="208492" y="990600"/>
+                  <a:pt x="206375" y="996950"/>
+                </a:cubicBezTo>
+                <a:lnTo>
+                  <a:pt x="196850" y="1025525"/>
+                </a:lnTo>
+                <a:lnTo>
+                  <a:pt x="193675" y="1035050"/>
+                </a:lnTo>
+                <a:lnTo>
+                  <a:pt x="190500" y="1044575"/>
+                </a:lnTo>
+                <a:cubicBezTo>
+                  <a:pt x="191558" y="1051983"/>
+                  <a:pt x="190896" y="1059852"/>
+                  <a:pt x="193675" y="1066800"/>
+                </a:cubicBezTo>
+                <a:cubicBezTo>
+                  <a:pt x="198189" y="1078085"/>
+                  <a:pt x="204439" y="1075357"/>
+                  <a:pt x="212725" y="1079500"/>
+                </a:cubicBezTo>
+                <a:cubicBezTo>
+                  <a:pt x="216138" y="1081207"/>
+                  <a:pt x="218743" y="1084347"/>
+                  <a:pt x="222250" y="1085850"/>
+                </a:cubicBezTo>
+                <a:cubicBezTo>
+                  <a:pt x="226261" y="1087569"/>
+                  <a:pt x="230864" y="1087493"/>
+                  <a:pt x="234950" y="1089025"/>
+                </a:cubicBezTo>
+                <a:cubicBezTo>
+                  <a:pt x="268156" y="1101477"/>
+                  <a:pt x="227751" y="1090400"/>
+                  <a:pt x="260350" y="1098550"/>
+                </a:cubicBezTo>
+                <a:cubicBezTo>
+                  <a:pt x="285722" y="1136609"/>
+                  <a:pt x="269875" y="1109197"/>
+                  <a:pt x="269875" y="1212850"/>
+                </a:cubicBezTo>
+                <a:cubicBezTo>
+                  <a:pt x="269875" y="1229816"/>
+                  <a:pt x="271844" y="1247482"/>
+                  <a:pt x="266700" y="1263650"/>
+                </a:cubicBezTo>
+                <a:cubicBezTo>
+                  <a:pt x="258366" y="1289844"/>
+                  <a:pt x="247055" y="1274366"/>
+                  <a:pt x="238125" y="1292225"/>
+                </a:cubicBezTo>
+                <a:cubicBezTo>
+                  <a:pt x="223718" y="1321038"/>
+                  <a:pt x="230676" y="1309749"/>
+                  <a:pt x="219075" y="1327150"/>
+                </a:cubicBezTo>
+                <a:cubicBezTo>
+                  <a:pt x="218017" y="1331383"/>
+                  <a:pt x="216295" y="1335504"/>
+                  <a:pt x="215900" y="1339850"/>
+                </a:cubicBezTo>
+                <a:cubicBezTo>
+                  <a:pt x="213115" y="1370488"/>
+                  <a:pt x="209550" y="1431925"/>
+                  <a:pt x="209550" y="1431925"/>
+                </a:cubicBezTo>
+                <a:cubicBezTo>
+                  <a:pt x="210608" y="1442508"/>
+                  <a:pt x="212725" y="1453039"/>
+                  <a:pt x="212725" y="1463675"/>
+                </a:cubicBezTo>
+                <a:cubicBezTo>
+                  <a:pt x="212725" y="1469525"/>
+                  <a:pt x="210285" y="1487605"/>
+                  <a:pt x="206375" y="1495425"/>
+                </a:cubicBezTo>
+                <a:cubicBezTo>
+                  <a:pt x="204668" y="1498838"/>
+                  <a:pt x="201732" y="1501537"/>
+                  <a:pt x="200025" y="1504950"/>
+                </a:cubicBezTo>
+                <a:cubicBezTo>
+                  <a:pt x="196621" y="1511758"/>
+                  <a:pt x="195124" y="1523829"/>
+                  <a:pt x="193675" y="1530350"/>
+                </a:cubicBezTo>
+                <a:cubicBezTo>
+                  <a:pt x="192728" y="1534610"/>
+                  <a:pt x="191699" y="1538854"/>
+                  <a:pt x="190500" y="1543050"/>
+                </a:cubicBezTo>
+                <a:cubicBezTo>
+                  <a:pt x="187086" y="1555000"/>
+                  <a:pt x="181070" y="1565985"/>
+                  <a:pt x="177800" y="1577975"/>
+                </a:cubicBezTo>
+                <a:cubicBezTo>
+                  <a:pt x="175504" y="1586395"/>
+                  <a:pt x="171450" y="1603375"/>
+                  <a:pt x="171450" y="1603375"/>
+                </a:cubicBezTo>
+                <a:cubicBezTo>
+                  <a:pt x="172508" y="1611842"/>
+                  <a:pt x="171755" y="1620740"/>
+                  <a:pt x="174625" y="1628775"/>
+                </a:cubicBezTo>
+                <a:cubicBezTo>
+                  <a:pt x="177192" y="1635962"/>
+                  <a:pt x="184912" y="1640585"/>
+                  <a:pt x="187325" y="1647825"/>
+                </a:cubicBezTo>
+                <a:lnTo>
+                  <a:pt x="190500" y="1657350"/>
+                </a:lnTo>
+                <a:cubicBezTo>
+                  <a:pt x="189442" y="1670050"/>
+                  <a:pt x="188906" y="1682804"/>
+                  <a:pt x="187325" y="1695450"/>
+                </a:cubicBezTo>
+                <a:cubicBezTo>
+                  <a:pt x="186784" y="1699780"/>
+                  <a:pt x="185404" y="1703970"/>
+                  <a:pt x="184150" y="1708150"/>
+                </a:cubicBezTo>
+                <a:cubicBezTo>
+                  <a:pt x="181265" y="1717767"/>
+                  <a:pt x="177800" y="1727200"/>
+                  <a:pt x="174625" y="1736725"/>
+                </a:cubicBezTo>
+                <a:cubicBezTo>
+                  <a:pt x="166645" y="1760666"/>
+                  <a:pt x="177410" y="1731156"/>
+                  <a:pt x="165100" y="1755775"/>
+                </a:cubicBezTo>
+                <a:cubicBezTo>
+                  <a:pt x="163603" y="1758768"/>
+                  <a:pt x="163422" y="1762307"/>
+                  <a:pt x="161925" y="1765300"/>
+                </a:cubicBezTo>
+                <a:cubicBezTo>
+                  <a:pt x="160218" y="1768713"/>
+                  <a:pt x="155575" y="1774825"/>
+                  <a:pt x="155575" y="1774825"/>
+                </a:cubicBezTo>
+              </a:path>
+            </a:pathLst>
+          </a:custGeom>
+          <a:noFill/>
+          <a:ln w="6350"/>
+        </p:spPr>
+        <p:style>
+          <a:lnRef idx="2">
+            <a:schemeClr val="accent1">
+              <a:shade val="15000"/>
+            </a:schemeClr>
+          </a:lnRef>
+          <a:fillRef idx="1">
+            <a:schemeClr val="accent1"/>
+          </a:fillRef>
+          <a:effectRef idx="0">
+            <a:schemeClr val="accent1"/>
+          </a:effectRef>
+          <a:fontRef idx="minor">
+            <a:schemeClr val="lt1"/>
+          </a:fontRef>
+        </p:style>
+        <p:txBody>
+          <a:bodyPr rtlCol="0" anchor="ctr"/>
+          <a:lstStyle/>
+          <a:p>
+            <a:pPr algn="ctr"/>
+            <a:endParaRPr lang="en-US"/>
+          </a:p>
+        </p:txBody>
+      </p:sp>
+      <p:sp>
+        <p:nvSpPr>
+          <p:cNvPr id="13" name="Freeform 12">
+            <a:extLst>
+              <a:ext uri="{FF2B5EF4-FFF2-40B4-BE49-F238E27FC236}">
+                <a16:creationId xmlns:a16="http://schemas.microsoft.com/office/drawing/2014/main" id="{F2B6B2F1-029A-365E-AD91-43BDC3D892CA}"/>
+              </a:ext>
+            </a:extLst>
+          </p:cNvPr>
+          <p:cNvSpPr/>
+          <p:nvPr/>
+        </p:nvSpPr>
+        <p:spPr>
+          <a:xfrm>
+            <a:off x="4895850" y="2578100"/>
+            <a:ext cx="250995" cy="520700"/>
+          </a:xfrm>
+          <a:custGeom>
+            <a:avLst/>
+            <a:gdLst>
+              <a:gd name="connsiteX0" fmla="*/ 9525 w 250995"/>
+              <a:gd name="connsiteY0" fmla="*/ 0 h 520700"/>
+              <a:gd name="connsiteX1" fmla="*/ 120650 w 250995"/>
+              <a:gd name="connsiteY1" fmla="*/ 9525 h 520700"/>
+              <a:gd name="connsiteX2" fmla="*/ 171450 w 250995"/>
+              <a:gd name="connsiteY2" fmla="*/ 38100 h 520700"/>
+              <a:gd name="connsiteX3" fmla="*/ 234950 w 250995"/>
+              <a:gd name="connsiteY3" fmla="*/ 98425 h 520700"/>
+              <a:gd name="connsiteX4" fmla="*/ 250825 w 250995"/>
+              <a:gd name="connsiteY4" fmla="*/ 193675 h 520700"/>
+              <a:gd name="connsiteX5" fmla="*/ 228600 w 250995"/>
+              <a:gd name="connsiteY5" fmla="*/ 292100 h 520700"/>
+              <a:gd name="connsiteX6" fmla="*/ 184150 w 250995"/>
+              <a:gd name="connsiteY6" fmla="*/ 346075 h 520700"/>
+              <a:gd name="connsiteX7" fmla="*/ 120650 w 250995"/>
+              <a:gd name="connsiteY7" fmla="*/ 390525 h 520700"/>
+              <a:gd name="connsiteX8" fmla="*/ 88900 w 250995"/>
+              <a:gd name="connsiteY8" fmla="*/ 412750 h 520700"/>
+              <a:gd name="connsiteX9" fmla="*/ 57150 w 250995"/>
+              <a:gd name="connsiteY9" fmla="*/ 447675 h 520700"/>
+              <a:gd name="connsiteX10" fmla="*/ 28575 w 250995"/>
+              <a:gd name="connsiteY10" fmla="*/ 488950 h 520700"/>
+              <a:gd name="connsiteX11" fmla="*/ 0 w 250995"/>
+              <a:gd name="connsiteY11" fmla="*/ 520700 h 520700"/>
+            </a:gdLst>
+            <a:ahLst/>
+            <a:cxnLst>
+              <a:cxn ang="0">
+                <a:pos x="connsiteX0" y="connsiteY0"/>
+              </a:cxn>
+              <a:cxn ang="0">
+                <a:pos x="connsiteX1" y="connsiteY1"/>
+              </a:cxn>
+              <a:cxn ang="0">
+                <a:pos x="connsiteX2" y="connsiteY2"/>
+              </a:cxn>
+              <a:cxn ang="0">
+                <a:pos x="connsiteX3" y="connsiteY3"/>
+              </a:cxn>
+              <a:cxn ang="0">
+                <a:pos x="connsiteX4" y="connsiteY4"/>
+              </a:cxn>
+              <a:cxn ang="0">
+                <a:pos x="connsiteX5" y="connsiteY5"/>
+              </a:cxn>
+              <a:cxn ang="0">
+                <a:pos x="connsiteX6" y="connsiteY6"/>
+              </a:cxn>
+              <a:cxn ang="0">
+                <a:pos x="connsiteX7" y="connsiteY7"/>
+              </a:cxn>
+              <a:cxn ang="0">
+                <a:pos x="connsiteX8" y="connsiteY8"/>
+              </a:cxn>
+              <a:cxn ang="0">
+                <a:pos x="connsiteX9" y="connsiteY9"/>
+              </a:cxn>
+              <a:cxn ang="0">
+                <a:pos x="connsiteX10" y="connsiteY10"/>
+              </a:cxn>
+              <a:cxn ang="0">
+                <a:pos x="connsiteX11" y="connsiteY11"/>
+              </a:cxn>
+            </a:cxnLst>
+            <a:rect l="l" t="t" r="r" b="b"/>
+            <a:pathLst>
+              <a:path w="250995" h="520700">
+                <a:moveTo>
+                  <a:pt x="9525" y="0"/>
+                </a:moveTo>
+                <a:cubicBezTo>
+                  <a:pt x="51594" y="1587"/>
+                  <a:pt x="93663" y="3175"/>
+                  <a:pt x="120650" y="9525"/>
+                </a:cubicBezTo>
+                <a:cubicBezTo>
+                  <a:pt x="147637" y="15875"/>
+                  <a:pt x="152400" y="23283"/>
+                  <a:pt x="171450" y="38100"/>
+                </a:cubicBezTo>
+                <a:cubicBezTo>
+                  <a:pt x="190500" y="52917"/>
+                  <a:pt x="221721" y="72496"/>
+                  <a:pt x="234950" y="98425"/>
+                </a:cubicBezTo>
+                <a:cubicBezTo>
+                  <a:pt x="248179" y="124354"/>
+                  <a:pt x="251883" y="161396"/>
+                  <a:pt x="250825" y="193675"/>
+                </a:cubicBezTo>
+                <a:cubicBezTo>
+                  <a:pt x="249767" y="225954"/>
+                  <a:pt x="239712" y="266700"/>
+                  <a:pt x="228600" y="292100"/>
+                </a:cubicBezTo>
+                <a:cubicBezTo>
+                  <a:pt x="217488" y="317500"/>
+                  <a:pt x="202142" y="329671"/>
+                  <a:pt x="184150" y="346075"/>
+                </a:cubicBezTo>
+                <a:cubicBezTo>
+                  <a:pt x="166158" y="362479"/>
+                  <a:pt x="120650" y="390525"/>
+                  <a:pt x="120650" y="390525"/>
+                </a:cubicBezTo>
+                <a:cubicBezTo>
+                  <a:pt x="104775" y="401638"/>
+                  <a:pt x="99483" y="403225"/>
+                  <a:pt x="88900" y="412750"/>
+                </a:cubicBezTo>
+                <a:cubicBezTo>
+                  <a:pt x="78317" y="422275"/>
+                  <a:pt x="67204" y="434975"/>
+                  <a:pt x="57150" y="447675"/>
+                </a:cubicBezTo>
+                <a:cubicBezTo>
+                  <a:pt x="47096" y="460375"/>
+                  <a:pt x="38100" y="476779"/>
+                  <a:pt x="28575" y="488950"/>
+                </a:cubicBezTo>
+                <a:cubicBezTo>
+                  <a:pt x="19050" y="501121"/>
+                  <a:pt x="9525" y="510910"/>
+                  <a:pt x="0" y="520700"/>
+                </a:cubicBezTo>
+              </a:path>
+            </a:pathLst>
+          </a:custGeom>
+          <a:noFill/>
+          <a:ln w="6350">
+            <a:solidFill>
+              <a:schemeClr val="accent2">
+                <a:lumMod val="50000"/>
+              </a:schemeClr>
+            </a:solidFill>
+          </a:ln>
+        </p:spPr>
+        <p:style>
+          <a:lnRef idx="2">
+            <a:schemeClr val="accent1">
+              <a:shade val="15000"/>
+            </a:schemeClr>
+          </a:lnRef>
+          <a:fillRef idx="1">
+            <a:schemeClr val="accent1"/>
+          </a:fillRef>
+          <a:effectRef idx="0">
+            <a:schemeClr val="accent1"/>
+          </a:effectRef>
+          <a:fontRef idx="minor">
+            <a:schemeClr val="lt1"/>
+          </a:fontRef>
+        </p:style>
+        <p:txBody>
+          <a:bodyPr rtlCol="0" anchor="ctr"/>
+          <a:lstStyle/>
+          <a:p>
+            <a:pPr algn="ctr"/>
+            <a:endParaRPr lang="en-US"/>
+          </a:p>
+        </p:txBody>
+      </p:sp>
+      <p:sp>
+        <p:nvSpPr>
+          <p:cNvPr id="14" name="Freeform 13">
+            <a:extLst>
+              <a:ext uri="{FF2B5EF4-FFF2-40B4-BE49-F238E27FC236}">
+                <a16:creationId xmlns:a16="http://schemas.microsoft.com/office/drawing/2014/main" id="{4B2F8A3C-9437-C7E6-68D7-E1118E49C51A}"/>
+              </a:ext>
+            </a:extLst>
+          </p:cNvPr>
+          <p:cNvSpPr/>
+          <p:nvPr/>
+        </p:nvSpPr>
+        <p:spPr>
+          <a:xfrm>
+            <a:off x="4895850" y="2498727"/>
+            <a:ext cx="368554" cy="727073"/>
+          </a:xfrm>
+          <a:custGeom>
+            <a:avLst/>
+            <a:gdLst>
+              <a:gd name="connsiteX0" fmla="*/ 9525 w 250995"/>
+              <a:gd name="connsiteY0" fmla="*/ 0 h 520700"/>
+              <a:gd name="connsiteX1" fmla="*/ 120650 w 250995"/>
+              <a:gd name="connsiteY1" fmla="*/ 9525 h 520700"/>
+              <a:gd name="connsiteX2" fmla="*/ 171450 w 250995"/>
+              <a:gd name="connsiteY2" fmla="*/ 38100 h 520700"/>
+              <a:gd name="connsiteX3" fmla="*/ 234950 w 250995"/>
+              <a:gd name="connsiteY3" fmla="*/ 98425 h 520700"/>
+              <a:gd name="connsiteX4" fmla="*/ 250825 w 250995"/>
+              <a:gd name="connsiteY4" fmla="*/ 193675 h 520700"/>
+              <a:gd name="connsiteX5" fmla="*/ 228600 w 250995"/>
+              <a:gd name="connsiteY5" fmla="*/ 292100 h 520700"/>
+              <a:gd name="connsiteX6" fmla="*/ 184150 w 250995"/>
+              <a:gd name="connsiteY6" fmla="*/ 346075 h 520700"/>
+              <a:gd name="connsiteX7" fmla="*/ 120650 w 250995"/>
+              <a:gd name="connsiteY7" fmla="*/ 390525 h 520700"/>
+              <a:gd name="connsiteX8" fmla="*/ 88900 w 250995"/>
+              <a:gd name="connsiteY8" fmla="*/ 412750 h 520700"/>
+              <a:gd name="connsiteX9" fmla="*/ 57150 w 250995"/>
+              <a:gd name="connsiteY9" fmla="*/ 447675 h 520700"/>
+              <a:gd name="connsiteX10" fmla="*/ 28575 w 250995"/>
+              <a:gd name="connsiteY10" fmla="*/ 488950 h 520700"/>
+              <a:gd name="connsiteX11" fmla="*/ 0 w 250995"/>
+              <a:gd name="connsiteY11" fmla="*/ 520700 h 520700"/>
+            </a:gdLst>
+            <a:ahLst/>
+            <a:cxnLst>
+              <a:cxn ang="0">
+                <a:pos x="connsiteX0" y="connsiteY0"/>
+              </a:cxn>
+              <a:cxn ang="0">
+                <a:pos x="connsiteX1" y="connsiteY1"/>
+              </a:cxn>
+              <a:cxn ang="0">
+                <a:pos x="connsiteX2" y="connsiteY2"/>
+              </a:cxn>
+              <a:cxn ang="0">
+                <a:pos x="connsiteX3" y="connsiteY3"/>
+              </a:cxn>
+              <a:cxn ang="0">
+                <a:pos x="connsiteX4" y="connsiteY4"/>
+              </a:cxn>
+              <a:cxn ang="0">
+                <a:pos x="connsiteX5" y="connsiteY5"/>
+              </a:cxn>
+              <a:cxn ang="0">
+                <a:pos x="connsiteX6" y="connsiteY6"/>
+              </a:cxn>
+              <a:cxn ang="0">
+                <a:pos x="connsiteX7" y="connsiteY7"/>
+              </a:cxn>
+              <a:cxn ang="0">
+                <a:pos x="connsiteX8" y="connsiteY8"/>
+              </a:cxn>
+              <a:cxn ang="0">
+                <a:pos x="connsiteX9" y="connsiteY9"/>
+              </a:cxn>
+              <a:cxn ang="0">
+                <a:pos x="connsiteX10" y="connsiteY10"/>
+              </a:cxn>
+              <a:cxn ang="0">
+                <a:pos x="connsiteX11" y="connsiteY11"/>
+              </a:cxn>
+            </a:cxnLst>
+            <a:rect l="l" t="t" r="r" b="b"/>
+            <a:pathLst>
+              <a:path w="250995" h="520700">
+                <a:moveTo>
+                  <a:pt x="9525" y="0"/>
+                </a:moveTo>
+                <a:cubicBezTo>
+                  <a:pt x="51594" y="1587"/>
+                  <a:pt x="93663" y="3175"/>
+                  <a:pt x="120650" y="9525"/>
+                </a:cubicBezTo>
+                <a:cubicBezTo>
+                  <a:pt x="147637" y="15875"/>
+                  <a:pt x="152400" y="23283"/>
+                  <a:pt x="171450" y="38100"/>
+                </a:cubicBezTo>
+                <a:cubicBezTo>
+                  <a:pt x="190500" y="52917"/>
+                  <a:pt x="221721" y="72496"/>
+                  <a:pt x="234950" y="98425"/>
+                </a:cubicBezTo>
+                <a:cubicBezTo>
+                  <a:pt x="248179" y="124354"/>
+                  <a:pt x="251883" y="161396"/>
+                  <a:pt x="250825" y="193675"/>
+                </a:cubicBezTo>
+                <a:cubicBezTo>
+                  <a:pt x="249767" y="225954"/>
+                  <a:pt x="239712" y="266700"/>
+                  <a:pt x="228600" y="292100"/>
+                </a:cubicBezTo>
+                <a:cubicBezTo>
+                  <a:pt x="217488" y="317500"/>
+                  <a:pt x="202142" y="329671"/>
+                  <a:pt x="184150" y="346075"/>
+                </a:cubicBezTo>
+                <a:cubicBezTo>
+                  <a:pt x="166158" y="362479"/>
+                  <a:pt x="120650" y="390525"/>
+                  <a:pt x="120650" y="390525"/>
+                </a:cubicBezTo>
+                <a:cubicBezTo>
+                  <a:pt x="104775" y="401638"/>
+                  <a:pt x="99483" y="403225"/>
+                  <a:pt x="88900" y="412750"/>
+                </a:cubicBezTo>
+                <a:cubicBezTo>
+                  <a:pt x="78317" y="422275"/>
+                  <a:pt x="67204" y="434975"/>
+                  <a:pt x="57150" y="447675"/>
+                </a:cubicBezTo>
+                <a:cubicBezTo>
+                  <a:pt x="47096" y="460375"/>
+                  <a:pt x="38100" y="476779"/>
+                  <a:pt x="28575" y="488950"/>
+                </a:cubicBezTo>
+                <a:cubicBezTo>
+                  <a:pt x="19050" y="501121"/>
+                  <a:pt x="9525" y="510910"/>
+                  <a:pt x="0" y="520700"/>
+                </a:cubicBezTo>
+              </a:path>
+            </a:pathLst>
+          </a:custGeom>
+          <a:noFill/>
+          <a:ln w="6350">
+            <a:solidFill>
+              <a:schemeClr val="accent2">
+                <a:lumMod val="50000"/>
+              </a:schemeClr>
+            </a:solidFill>
+          </a:ln>
+        </p:spPr>
+        <p:style>
+          <a:lnRef idx="2">
+            <a:schemeClr val="accent1">
+              <a:shade val="15000"/>
+            </a:schemeClr>
+          </a:lnRef>
+          <a:fillRef idx="1">
+            <a:schemeClr val="accent1"/>
+          </a:fillRef>
+          <a:effectRef idx="0">
+            <a:schemeClr val="accent1"/>
+          </a:effectRef>
+          <a:fontRef idx="minor">
+            <a:schemeClr val="lt1"/>
+          </a:fontRef>
+        </p:style>
+        <p:txBody>
+          <a:bodyPr rtlCol="0" anchor="ctr"/>
+          <a:lstStyle/>
+          <a:p>
+            <a:pPr algn="ctr"/>
+            <a:endParaRPr lang="en-US"/>
+          </a:p>
+        </p:txBody>
+      </p:sp>
+      <p:sp>
+        <p:nvSpPr>
+          <p:cNvPr id="15" name="Freeform 14">
+            <a:extLst>
+              <a:ext uri="{FF2B5EF4-FFF2-40B4-BE49-F238E27FC236}">
+                <a16:creationId xmlns:a16="http://schemas.microsoft.com/office/drawing/2014/main" id="{FD4A6D33-96EC-455C-B413-39B0FA6C67AF}"/>
+              </a:ext>
+            </a:extLst>
+          </p:cNvPr>
+          <p:cNvSpPr/>
+          <p:nvPr/>
+        </p:nvSpPr>
+        <p:spPr>
+          <a:xfrm>
+            <a:off x="4895850" y="2663810"/>
+            <a:ext cx="158742" cy="304830"/>
+          </a:xfrm>
+          <a:custGeom>
+            <a:avLst/>
+            <a:gdLst>
+              <a:gd name="connsiteX0" fmla="*/ 9525 w 250995"/>
+              <a:gd name="connsiteY0" fmla="*/ 0 h 520700"/>
+              <a:gd name="connsiteX1" fmla="*/ 120650 w 250995"/>
+              <a:gd name="connsiteY1" fmla="*/ 9525 h 520700"/>
+              <a:gd name="connsiteX2" fmla="*/ 171450 w 250995"/>
+              <a:gd name="connsiteY2" fmla="*/ 38100 h 520700"/>
+              <a:gd name="connsiteX3" fmla="*/ 234950 w 250995"/>
+              <a:gd name="connsiteY3" fmla="*/ 98425 h 520700"/>
+              <a:gd name="connsiteX4" fmla="*/ 250825 w 250995"/>
+              <a:gd name="connsiteY4" fmla="*/ 193675 h 520700"/>
+              <a:gd name="connsiteX5" fmla="*/ 228600 w 250995"/>
+              <a:gd name="connsiteY5" fmla="*/ 292100 h 520700"/>
+              <a:gd name="connsiteX6" fmla="*/ 184150 w 250995"/>
+              <a:gd name="connsiteY6" fmla="*/ 346075 h 520700"/>
+              <a:gd name="connsiteX7" fmla="*/ 120650 w 250995"/>
+              <a:gd name="connsiteY7" fmla="*/ 390525 h 520700"/>
+              <a:gd name="connsiteX8" fmla="*/ 88900 w 250995"/>
+              <a:gd name="connsiteY8" fmla="*/ 412750 h 520700"/>
+              <a:gd name="connsiteX9" fmla="*/ 57150 w 250995"/>
+              <a:gd name="connsiteY9" fmla="*/ 447675 h 520700"/>
+              <a:gd name="connsiteX10" fmla="*/ 28575 w 250995"/>
+              <a:gd name="connsiteY10" fmla="*/ 488950 h 520700"/>
+              <a:gd name="connsiteX11" fmla="*/ 0 w 250995"/>
+              <a:gd name="connsiteY11" fmla="*/ 520700 h 520700"/>
+            </a:gdLst>
+            <a:ahLst/>
+            <a:cxnLst>
+              <a:cxn ang="0">
+                <a:pos x="connsiteX0" y="connsiteY0"/>
+              </a:cxn>
+              <a:cxn ang="0">
+                <a:pos x="connsiteX1" y="connsiteY1"/>
+              </a:cxn>
+              <a:cxn ang="0">
+                <a:pos x="connsiteX2" y="connsiteY2"/>
+              </a:cxn>
+              <a:cxn ang="0">
+                <a:pos x="connsiteX3" y="connsiteY3"/>
+              </a:cxn>
+              <a:cxn ang="0">
+                <a:pos x="connsiteX4" y="connsiteY4"/>
+              </a:cxn>
+              <a:cxn ang="0">
+                <a:pos x="connsiteX5" y="connsiteY5"/>
+              </a:cxn>
+              <a:cxn ang="0">
+                <a:pos x="connsiteX6" y="connsiteY6"/>
+              </a:cxn>
+              <a:cxn ang="0">
+                <a:pos x="connsiteX7" y="connsiteY7"/>
+              </a:cxn>
+              <a:cxn ang="0">
+                <a:pos x="connsiteX8" y="connsiteY8"/>
+              </a:cxn>
+              <a:cxn ang="0">
+                <a:pos x="connsiteX9" y="connsiteY9"/>
+              </a:cxn>
+              <a:cxn ang="0">
+                <a:pos x="connsiteX10" y="connsiteY10"/>
+              </a:cxn>
+              <a:cxn ang="0">
+                <a:pos x="connsiteX11" y="connsiteY11"/>
+              </a:cxn>
+            </a:cxnLst>
+            <a:rect l="l" t="t" r="r" b="b"/>
+            <a:pathLst>
+              <a:path w="250995" h="520700">
+                <a:moveTo>
+                  <a:pt x="9525" y="0"/>
+                </a:moveTo>
+                <a:cubicBezTo>
+                  <a:pt x="51594" y="1587"/>
+                  <a:pt x="93663" y="3175"/>
+                  <a:pt x="120650" y="9525"/>
+                </a:cubicBezTo>
+                <a:cubicBezTo>
+                  <a:pt x="147637" y="15875"/>
+                  <a:pt x="152400" y="23283"/>
+                  <a:pt x="171450" y="38100"/>
+                </a:cubicBezTo>
+                <a:cubicBezTo>
+                  <a:pt x="190500" y="52917"/>
+                  <a:pt x="221721" y="72496"/>
+                  <a:pt x="234950" y="98425"/>
+                </a:cubicBezTo>
+                <a:cubicBezTo>
+                  <a:pt x="248179" y="124354"/>
+                  <a:pt x="251883" y="161396"/>
+                  <a:pt x="250825" y="193675"/>
+                </a:cubicBezTo>
+                <a:cubicBezTo>
+                  <a:pt x="249767" y="225954"/>
+                  <a:pt x="239712" y="266700"/>
+                  <a:pt x="228600" y="292100"/>
+                </a:cubicBezTo>
+                <a:cubicBezTo>
+                  <a:pt x="217488" y="317500"/>
+                  <a:pt x="202142" y="329671"/>
+                  <a:pt x="184150" y="346075"/>
+                </a:cubicBezTo>
+                <a:cubicBezTo>
+                  <a:pt x="166158" y="362479"/>
+                  <a:pt x="120650" y="390525"/>
+                  <a:pt x="120650" y="390525"/>
+                </a:cubicBezTo>
+                <a:cubicBezTo>
+                  <a:pt x="104775" y="401638"/>
+                  <a:pt x="99483" y="403225"/>
+                  <a:pt x="88900" y="412750"/>
+                </a:cubicBezTo>
+                <a:cubicBezTo>
+                  <a:pt x="78317" y="422275"/>
+                  <a:pt x="67204" y="434975"/>
+                  <a:pt x="57150" y="447675"/>
+                </a:cubicBezTo>
+                <a:cubicBezTo>
+                  <a:pt x="47096" y="460375"/>
+                  <a:pt x="38100" y="476779"/>
+                  <a:pt x="28575" y="488950"/>
+                </a:cubicBezTo>
+                <a:cubicBezTo>
+                  <a:pt x="19050" y="501121"/>
+                  <a:pt x="9525" y="510910"/>
+                  <a:pt x="0" y="520700"/>
+                </a:cubicBezTo>
+              </a:path>
+            </a:pathLst>
+          </a:custGeom>
+          <a:noFill/>
+          <a:ln w="6350">
+            <a:solidFill>
+              <a:schemeClr val="accent2">
+                <a:lumMod val="50000"/>
+              </a:schemeClr>
+            </a:solidFill>
+          </a:ln>
+        </p:spPr>
+        <p:style>
+          <a:lnRef idx="2">
+            <a:schemeClr val="accent1">
+              <a:shade val="15000"/>
+            </a:schemeClr>
+          </a:lnRef>
+          <a:fillRef idx="1">
+            <a:schemeClr val="accent1"/>
+          </a:fillRef>
+          <a:effectRef idx="0">
+            <a:schemeClr val="accent1"/>
+          </a:effectRef>
+          <a:fontRef idx="minor">
+            <a:schemeClr val="lt1"/>
+          </a:fontRef>
+        </p:style>
+        <p:txBody>
+          <a:bodyPr rtlCol="0" anchor="ctr"/>
+          <a:lstStyle/>
+          <a:p>
+            <a:pPr algn="ctr"/>
+            <a:endParaRPr lang="en-US"/>
+          </a:p>
+        </p:txBody>
+      </p:sp>
+    </p:spTree>
+    <p:extLst>
+      <p:ext uri="{BB962C8B-B14F-4D97-AF65-F5344CB8AC3E}">
+        <p14:creationId xmlns:p14="http://schemas.microsoft.com/office/powerpoint/2010/main" val="1880835565"/>
+      </p:ext>
+    </p:extLst>
+  </p:cSld>
+  <p:clrMapOvr>
+    <a:masterClrMapping/>
+  </p:clrMapOvr>
+</p:sld>
+</file>
+
 <file path=ppt/theme/theme1.xml><?xml version="1.0" encoding="utf-8"?>
 <a:theme xmlns:a="http://schemas.openxmlformats.org/drawingml/2006/main" name="Office Theme">
   <a:themeElements>

</xml_diff>

<commit_message>
update doc and figures
</commit_message>
<xml_diff>
--- a/docs/Figures_for_FastMarchingMethod_for_Outpainting.pptx
+++ b/docs/Figures_for_FastMarchingMethod_for_Outpainting.pptx
@@ -6721,6 +6721,4726 @@
           </a:p>
         </p:txBody>
       </p:sp>
+      <p:sp>
+        <p:nvSpPr>
+          <p:cNvPr id="16" name="Freeform 15">
+            <a:extLst>
+              <a:ext uri="{FF2B5EF4-FFF2-40B4-BE49-F238E27FC236}">
+                <a16:creationId xmlns:a16="http://schemas.microsoft.com/office/drawing/2014/main" id="{6EEB34FF-6330-E26D-C471-1F8CFA44A32A}"/>
+              </a:ext>
+            </a:extLst>
+          </p:cNvPr>
+          <p:cNvSpPr/>
+          <p:nvPr/>
+        </p:nvSpPr>
+        <p:spPr>
+          <a:xfrm>
+            <a:off x="4905375" y="3257358"/>
+            <a:ext cx="433476" cy="470106"/>
+          </a:xfrm>
+          <a:custGeom>
+            <a:avLst/>
+            <a:gdLst>
+              <a:gd name="connsiteX0" fmla="*/ 3175 w 433476"/>
+              <a:gd name="connsiteY0" fmla="*/ 63692 h 425245"/>
+              <a:gd name="connsiteX1" fmla="*/ 142875 w 433476"/>
+              <a:gd name="connsiteY1" fmla="*/ 12892 h 425245"/>
+              <a:gd name="connsiteX2" fmla="*/ 238125 w 433476"/>
+              <a:gd name="connsiteY2" fmla="*/ 192 h 425245"/>
+              <a:gd name="connsiteX3" fmla="*/ 311150 w 433476"/>
+              <a:gd name="connsiteY3" fmla="*/ 19242 h 425245"/>
+              <a:gd name="connsiteX4" fmla="*/ 400050 w 433476"/>
+              <a:gd name="connsiteY4" fmla="*/ 98617 h 425245"/>
+              <a:gd name="connsiteX5" fmla="*/ 431800 w 433476"/>
+              <a:gd name="connsiteY5" fmla="*/ 203392 h 425245"/>
+              <a:gd name="connsiteX6" fmla="*/ 422275 w 433476"/>
+              <a:gd name="connsiteY6" fmla="*/ 285942 h 425245"/>
+              <a:gd name="connsiteX7" fmla="*/ 365125 w 433476"/>
+              <a:gd name="connsiteY7" fmla="*/ 368492 h 425245"/>
+              <a:gd name="connsiteX8" fmla="*/ 298450 w 433476"/>
+              <a:gd name="connsiteY8" fmla="*/ 419292 h 425245"/>
+              <a:gd name="connsiteX9" fmla="*/ 193675 w 433476"/>
+              <a:gd name="connsiteY9" fmla="*/ 422467 h 425245"/>
+              <a:gd name="connsiteX10" fmla="*/ 101600 w 433476"/>
+              <a:gd name="connsiteY10" fmla="*/ 403417 h 425245"/>
+              <a:gd name="connsiteX11" fmla="*/ 60325 w 433476"/>
+              <a:gd name="connsiteY11" fmla="*/ 390717 h 425245"/>
+              <a:gd name="connsiteX12" fmla="*/ 0 w 433476"/>
+              <a:gd name="connsiteY12" fmla="*/ 355792 h 425245"/>
+            </a:gdLst>
+            <a:ahLst/>
+            <a:cxnLst>
+              <a:cxn ang="0">
+                <a:pos x="connsiteX0" y="connsiteY0"/>
+              </a:cxn>
+              <a:cxn ang="0">
+                <a:pos x="connsiteX1" y="connsiteY1"/>
+              </a:cxn>
+              <a:cxn ang="0">
+                <a:pos x="connsiteX2" y="connsiteY2"/>
+              </a:cxn>
+              <a:cxn ang="0">
+                <a:pos x="connsiteX3" y="connsiteY3"/>
+              </a:cxn>
+              <a:cxn ang="0">
+                <a:pos x="connsiteX4" y="connsiteY4"/>
+              </a:cxn>
+              <a:cxn ang="0">
+                <a:pos x="connsiteX5" y="connsiteY5"/>
+              </a:cxn>
+              <a:cxn ang="0">
+                <a:pos x="connsiteX6" y="connsiteY6"/>
+              </a:cxn>
+              <a:cxn ang="0">
+                <a:pos x="connsiteX7" y="connsiteY7"/>
+              </a:cxn>
+              <a:cxn ang="0">
+                <a:pos x="connsiteX8" y="connsiteY8"/>
+              </a:cxn>
+              <a:cxn ang="0">
+                <a:pos x="connsiteX9" y="connsiteY9"/>
+              </a:cxn>
+              <a:cxn ang="0">
+                <a:pos x="connsiteX10" y="connsiteY10"/>
+              </a:cxn>
+              <a:cxn ang="0">
+                <a:pos x="connsiteX11" y="connsiteY11"/>
+              </a:cxn>
+              <a:cxn ang="0">
+                <a:pos x="connsiteX12" y="connsiteY12"/>
+              </a:cxn>
+            </a:cxnLst>
+            <a:rect l="l" t="t" r="r" b="b"/>
+            <a:pathLst>
+              <a:path w="433476" h="425245">
+                <a:moveTo>
+                  <a:pt x="3175" y="63692"/>
+                </a:moveTo>
+                <a:cubicBezTo>
+                  <a:pt x="53446" y="43583"/>
+                  <a:pt x="103717" y="23475"/>
+                  <a:pt x="142875" y="12892"/>
+                </a:cubicBezTo>
+                <a:cubicBezTo>
+                  <a:pt x="182033" y="2309"/>
+                  <a:pt x="210079" y="-866"/>
+                  <a:pt x="238125" y="192"/>
+                </a:cubicBezTo>
+                <a:cubicBezTo>
+                  <a:pt x="266171" y="1250"/>
+                  <a:pt x="284163" y="2838"/>
+                  <a:pt x="311150" y="19242"/>
+                </a:cubicBezTo>
+                <a:cubicBezTo>
+                  <a:pt x="338137" y="35646"/>
+                  <a:pt x="379942" y="67925"/>
+                  <a:pt x="400050" y="98617"/>
+                </a:cubicBezTo>
+                <a:cubicBezTo>
+                  <a:pt x="420158" y="129309"/>
+                  <a:pt x="428096" y="172171"/>
+                  <a:pt x="431800" y="203392"/>
+                </a:cubicBezTo>
+                <a:cubicBezTo>
+                  <a:pt x="435504" y="234613"/>
+                  <a:pt x="433387" y="258425"/>
+                  <a:pt x="422275" y="285942"/>
+                </a:cubicBezTo>
+                <a:cubicBezTo>
+                  <a:pt x="411163" y="313459"/>
+                  <a:pt x="385762" y="346267"/>
+                  <a:pt x="365125" y="368492"/>
+                </a:cubicBezTo>
+                <a:cubicBezTo>
+                  <a:pt x="344488" y="390717"/>
+                  <a:pt x="327025" y="410296"/>
+                  <a:pt x="298450" y="419292"/>
+                </a:cubicBezTo>
+                <a:cubicBezTo>
+                  <a:pt x="269875" y="428288"/>
+                  <a:pt x="226483" y="425113"/>
+                  <a:pt x="193675" y="422467"/>
+                </a:cubicBezTo>
+                <a:cubicBezTo>
+                  <a:pt x="160867" y="419821"/>
+                  <a:pt x="123825" y="408709"/>
+                  <a:pt x="101600" y="403417"/>
+                </a:cubicBezTo>
+                <a:cubicBezTo>
+                  <a:pt x="79375" y="398125"/>
+                  <a:pt x="77258" y="398654"/>
+                  <a:pt x="60325" y="390717"/>
+                </a:cubicBezTo>
+                <a:cubicBezTo>
+                  <a:pt x="43392" y="382780"/>
+                  <a:pt x="21696" y="369286"/>
+                  <a:pt x="0" y="355792"/>
+                </a:cubicBezTo>
+              </a:path>
+            </a:pathLst>
+          </a:custGeom>
+          <a:noFill/>
+          <a:ln w="6350"/>
+        </p:spPr>
+        <p:style>
+          <a:lnRef idx="2">
+            <a:schemeClr val="accent1">
+              <a:shade val="15000"/>
+            </a:schemeClr>
+          </a:lnRef>
+          <a:fillRef idx="1">
+            <a:schemeClr val="accent1"/>
+          </a:fillRef>
+          <a:effectRef idx="0">
+            <a:schemeClr val="accent1"/>
+          </a:effectRef>
+          <a:fontRef idx="minor">
+            <a:schemeClr val="lt1"/>
+          </a:fontRef>
+        </p:style>
+        <p:txBody>
+          <a:bodyPr rtlCol="0" anchor="ctr"/>
+          <a:lstStyle/>
+          <a:p>
+            <a:pPr algn="ctr"/>
+            <a:endParaRPr lang="en-US"/>
+          </a:p>
+        </p:txBody>
+      </p:sp>
+      <p:sp>
+        <p:nvSpPr>
+          <p:cNvPr id="17" name="Freeform 16">
+            <a:extLst>
+              <a:ext uri="{FF2B5EF4-FFF2-40B4-BE49-F238E27FC236}">
+                <a16:creationId xmlns:a16="http://schemas.microsoft.com/office/drawing/2014/main" id="{FF5517CC-69E2-DE2D-2761-313715B3F512}"/>
+              </a:ext>
+            </a:extLst>
+          </p:cNvPr>
+          <p:cNvSpPr/>
+          <p:nvPr/>
+        </p:nvSpPr>
+        <p:spPr>
+          <a:xfrm>
+            <a:off x="4902201" y="3410362"/>
+            <a:ext cx="120632" cy="143358"/>
+          </a:xfrm>
+          <a:custGeom>
+            <a:avLst/>
+            <a:gdLst>
+              <a:gd name="connsiteX0" fmla="*/ 3175 w 433476"/>
+              <a:gd name="connsiteY0" fmla="*/ 63692 h 425245"/>
+              <a:gd name="connsiteX1" fmla="*/ 142875 w 433476"/>
+              <a:gd name="connsiteY1" fmla="*/ 12892 h 425245"/>
+              <a:gd name="connsiteX2" fmla="*/ 238125 w 433476"/>
+              <a:gd name="connsiteY2" fmla="*/ 192 h 425245"/>
+              <a:gd name="connsiteX3" fmla="*/ 311150 w 433476"/>
+              <a:gd name="connsiteY3" fmla="*/ 19242 h 425245"/>
+              <a:gd name="connsiteX4" fmla="*/ 400050 w 433476"/>
+              <a:gd name="connsiteY4" fmla="*/ 98617 h 425245"/>
+              <a:gd name="connsiteX5" fmla="*/ 431800 w 433476"/>
+              <a:gd name="connsiteY5" fmla="*/ 203392 h 425245"/>
+              <a:gd name="connsiteX6" fmla="*/ 422275 w 433476"/>
+              <a:gd name="connsiteY6" fmla="*/ 285942 h 425245"/>
+              <a:gd name="connsiteX7" fmla="*/ 365125 w 433476"/>
+              <a:gd name="connsiteY7" fmla="*/ 368492 h 425245"/>
+              <a:gd name="connsiteX8" fmla="*/ 298450 w 433476"/>
+              <a:gd name="connsiteY8" fmla="*/ 419292 h 425245"/>
+              <a:gd name="connsiteX9" fmla="*/ 193675 w 433476"/>
+              <a:gd name="connsiteY9" fmla="*/ 422467 h 425245"/>
+              <a:gd name="connsiteX10" fmla="*/ 101600 w 433476"/>
+              <a:gd name="connsiteY10" fmla="*/ 403417 h 425245"/>
+              <a:gd name="connsiteX11" fmla="*/ 60325 w 433476"/>
+              <a:gd name="connsiteY11" fmla="*/ 390717 h 425245"/>
+              <a:gd name="connsiteX12" fmla="*/ 0 w 433476"/>
+              <a:gd name="connsiteY12" fmla="*/ 355792 h 425245"/>
+            </a:gdLst>
+            <a:ahLst/>
+            <a:cxnLst>
+              <a:cxn ang="0">
+                <a:pos x="connsiteX0" y="connsiteY0"/>
+              </a:cxn>
+              <a:cxn ang="0">
+                <a:pos x="connsiteX1" y="connsiteY1"/>
+              </a:cxn>
+              <a:cxn ang="0">
+                <a:pos x="connsiteX2" y="connsiteY2"/>
+              </a:cxn>
+              <a:cxn ang="0">
+                <a:pos x="connsiteX3" y="connsiteY3"/>
+              </a:cxn>
+              <a:cxn ang="0">
+                <a:pos x="connsiteX4" y="connsiteY4"/>
+              </a:cxn>
+              <a:cxn ang="0">
+                <a:pos x="connsiteX5" y="connsiteY5"/>
+              </a:cxn>
+              <a:cxn ang="0">
+                <a:pos x="connsiteX6" y="connsiteY6"/>
+              </a:cxn>
+              <a:cxn ang="0">
+                <a:pos x="connsiteX7" y="connsiteY7"/>
+              </a:cxn>
+              <a:cxn ang="0">
+                <a:pos x="connsiteX8" y="connsiteY8"/>
+              </a:cxn>
+              <a:cxn ang="0">
+                <a:pos x="connsiteX9" y="connsiteY9"/>
+              </a:cxn>
+              <a:cxn ang="0">
+                <a:pos x="connsiteX10" y="connsiteY10"/>
+              </a:cxn>
+              <a:cxn ang="0">
+                <a:pos x="connsiteX11" y="connsiteY11"/>
+              </a:cxn>
+              <a:cxn ang="0">
+                <a:pos x="connsiteX12" y="connsiteY12"/>
+              </a:cxn>
+            </a:cxnLst>
+            <a:rect l="l" t="t" r="r" b="b"/>
+            <a:pathLst>
+              <a:path w="433476" h="425245">
+                <a:moveTo>
+                  <a:pt x="3175" y="63692"/>
+                </a:moveTo>
+                <a:cubicBezTo>
+                  <a:pt x="53446" y="43583"/>
+                  <a:pt x="103717" y="23475"/>
+                  <a:pt x="142875" y="12892"/>
+                </a:cubicBezTo>
+                <a:cubicBezTo>
+                  <a:pt x="182033" y="2309"/>
+                  <a:pt x="210079" y="-866"/>
+                  <a:pt x="238125" y="192"/>
+                </a:cubicBezTo>
+                <a:cubicBezTo>
+                  <a:pt x="266171" y="1250"/>
+                  <a:pt x="284163" y="2838"/>
+                  <a:pt x="311150" y="19242"/>
+                </a:cubicBezTo>
+                <a:cubicBezTo>
+                  <a:pt x="338137" y="35646"/>
+                  <a:pt x="379942" y="67925"/>
+                  <a:pt x="400050" y="98617"/>
+                </a:cubicBezTo>
+                <a:cubicBezTo>
+                  <a:pt x="420158" y="129309"/>
+                  <a:pt x="428096" y="172171"/>
+                  <a:pt x="431800" y="203392"/>
+                </a:cubicBezTo>
+                <a:cubicBezTo>
+                  <a:pt x="435504" y="234613"/>
+                  <a:pt x="433387" y="258425"/>
+                  <a:pt x="422275" y="285942"/>
+                </a:cubicBezTo>
+                <a:cubicBezTo>
+                  <a:pt x="411163" y="313459"/>
+                  <a:pt x="385762" y="346267"/>
+                  <a:pt x="365125" y="368492"/>
+                </a:cubicBezTo>
+                <a:cubicBezTo>
+                  <a:pt x="344488" y="390717"/>
+                  <a:pt x="327025" y="410296"/>
+                  <a:pt x="298450" y="419292"/>
+                </a:cubicBezTo>
+                <a:cubicBezTo>
+                  <a:pt x="269875" y="428288"/>
+                  <a:pt x="226483" y="425113"/>
+                  <a:pt x="193675" y="422467"/>
+                </a:cubicBezTo>
+                <a:cubicBezTo>
+                  <a:pt x="160867" y="419821"/>
+                  <a:pt x="123825" y="408709"/>
+                  <a:pt x="101600" y="403417"/>
+                </a:cubicBezTo>
+                <a:cubicBezTo>
+                  <a:pt x="79375" y="398125"/>
+                  <a:pt x="77258" y="398654"/>
+                  <a:pt x="60325" y="390717"/>
+                </a:cubicBezTo>
+                <a:cubicBezTo>
+                  <a:pt x="43392" y="382780"/>
+                  <a:pt x="21696" y="369286"/>
+                  <a:pt x="0" y="355792"/>
+                </a:cubicBezTo>
+              </a:path>
+            </a:pathLst>
+          </a:custGeom>
+          <a:noFill/>
+          <a:ln w="6350"/>
+        </p:spPr>
+        <p:style>
+          <a:lnRef idx="2">
+            <a:schemeClr val="accent1">
+              <a:shade val="15000"/>
+            </a:schemeClr>
+          </a:lnRef>
+          <a:fillRef idx="1">
+            <a:schemeClr val="accent1"/>
+          </a:fillRef>
+          <a:effectRef idx="0">
+            <a:schemeClr val="accent1"/>
+          </a:effectRef>
+          <a:fontRef idx="minor">
+            <a:schemeClr val="lt1"/>
+          </a:fontRef>
+        </p:style>
+        <p:txBody>
+          <a:bodyPr rtlCol="0" anchor="ctr"/>
+          <a:lstStyle/>
+          <a:p>
+            <a:pPr algn="ctr"/>
+            <a:endParaRPr lang="en-US"/>
+          </a:p>
+        </p:txBody>
+      </p:sp>
+      <p:sp>
+        <p:nvSpPr>
+          <p:cNvPr id="18" name="Freeform 17">
+            <a:extLst>
+              <a:ext uri="{FF2B5EF4-FFF2-40B4-BE49-F238E27FC236}">
+                <a16:creationId xmlns:a16="http://schemas.microsoft.com/office/drawing/2014/main" id="{DE00B97F-DAE2-8655-B694-56A9D926F041}"/>
+              </a:ext>
+            </a:extLst>
+          </p:cNvPr>
+          <p:cNvSpPr/>
+          <p:nvPr/>
+        </p:nvSpPr>
+        <p:spPr>
+          <a:xfrm>
+            <a:off x="4905375" y="3337130"/>
+            <a:ext cx="241291" cy="294174"/>
+          </a:xfrm>
+          <a:custGeom>
+            <a:avLst/>
+            <a:gdLst>
+              <a:gd name="connsiteX0" fmla="*/ 3175 w 433476"/>
+              <a:gd name="connsiteY0" fmla="*/ 63692 h 425245"/>
+              <a:gd name="connsiteX1" fmla="*/ 142875 w 433476"/>
+              <a:gd name="connsiteY1" fmla="*/ 12892 h 425245"/>
+              <a:gd name="connsiteX2" fmla="*/ 238125 w 433476"/>
+              <a:gd name="connsiteY2" fmla="*/ 192 h 425245"/>
+              <a:gd name="connsiteX3" fmla="*/ 311150 w 433476"/>
+              <a:gd name="connsiteY3" fmla="*/ 19242 h 425245"/>
+              <a:gd name="connsiteX4" fmla="*/ 400050 w 433476"/>
+              <a:gd name="connsiteY4" fmla="*/ 98617 h 425245"/>
+              <a:gd name="connsiteX5" fmla="*/ 431800 w 433476"/>
+              <a:gd name="connsiteY5" fmla="*/ 203392 h 425245"/>
+              <a:gd name="connsiteX6" fmla="*/ 422275 w 433476"/>
+              <a:gd name="connsiteY6" fmla="*/ 285942 h 425245"/>
+              <a:gd name="connsiteX7" fmla="*/ 365125 w 433476"/>
+              <a:gd name="connsiteY7" fmla="*/ 368492 h 425245"/>
+              <a:gd name="connsiteX8" fmla="*/ 298450 w 433476"/>
+              <a:gd name="connsiteY8" fmla="*/ 419292 h 425245"/>
+              <a:gd name="connsiteX9" fmla="*/ 193675 w 433476"/>
+              <a:gd name="connsiteY9" fmla="*/ 422467 h 425245"/>
+              <a:gd name="connsiteX10" fmla="*/ 101600 w 433476"/>
+              <a:gd name="connsiteY10" fmla="*/ 403417 h 425245"/>
+              <a:gd name="connsiteX11" fmla="*/ 60325 w 433476"/>
+              <a:gd name="connsiteY11" fmla="*/ 390717 h 425245"/>
+              <a:gd name="connsiteX12" fmla="*/ 0 w 433476"/>
+              <a:gd name="connsiteY12" fmla="*/ 355792 h 425245"/>
+            </a:gdLst>
+            <a:ahLst/>
+            <a:cxnLst>
+              <a:cxn ang="0">
+                <a:pos x="connsiteX0" y="connsiteY0"/>
+              </a:cxn>
+              <a:cxn ang="0">
+                <a:pos x="connsiteX1" y="connsiteY1"/>
+              </a:cxn>
+              <a:cxn ang="0">
+                <a:pos x="connsiteX2" y="connsiteY2"/>
+              </a:cxn>
+              <a:cxn ang="0">
+                <a:pos x="connsiteX3" y="connsiteY3"/>
+              </a:cxn>
+              <a:cxn ang="0">
+                <a:pos x="connsiteX4" y="connsiteY4"/>
+              </a:cxn>
+              <a:cxn ang="0">
+                <a:pos x="connsiteX5" y="connsiteY5"/>
+              </a:cxn>
+              <a:cxn ang="0">
+                <a:pos x="connsiteX6" y="connsiteY6"/>
+              </a:cxn>
+              <a:cxn ang="0">
+                <a:pos x="connsiteX7" y="connsiteY7"/>
+              </a:cxn>
+              <a:cxn ang="0">
+                <a:pos x="connsiteX8" y="connsiteY8"/>
+              </a:cxn>
+              <a:cxn ang="0">
+                <a:pos x="connsiteX9" y="connsiteY9"/>
+              </a:cxn>
+              <a:cxn ang="0">
+                <a:pos x="connsiteX10" y="connsiteY10"/>
+              </a:cxn>
+              <a:cxn ang="0">
+                <a:pos x="connsiteX11" y="connsiteY11"/>
+              </a:cxn>
+              <a:cxn ang="0">
+                <a:pos x="connsiteX12" y="connsiteY12"/>
+              </a:cxn>
+            </a:cxnLst>
+            <a:rect l="l" t="t" r="r" b="b"/>
+            <a:pathLst>
+              <a:path w="433476" h="425245">
+                <a:moveTo>
+                  <a:pt x="3175" y="63692"/>
+                </a:moveTo>
+                <a:cubicBezTo>
+                  <a:pt x="53446" y="43583"/>
+                  <a:pt x="103717" y="23475"/>
+                  <a:pt x="142875" y="12892"/>
+                </a:cubicBezTo>
+                <a:cubicBezTo>
+                  <a:pt x="182033" y="2309"/>
+                  <a:pt x="210079" y="-866"/>
+                  <a:pt x="238125" y="192"/>
+                </a:cubicBezTo>
+                <a:cubicBezTo>
+                  <a:pt x="266171" y="1250"/>
+                  <a:pt x="284163" y="2838"/>
+                  <a:pt x="311150" y="19242"/>
+                </a:cubicBezTo>
+                <a:cubicBezTo>
+                  <a:pt x="338137" y="35646"/>
+                  <a:pt x="379942" y="67925"/>
+                  <a:pt x="400050" y="98617"/>
+                </a:cubicBezTo>
+                <a:cubicBezTo>
+                  <a:pt x="420158" y="129309"/>
+                  <a:pt x="428096" y="172171"/>
+                  <a:pt x="431800" y="203392"/>
+                </a:cubicBezTo>
+                <a:cubicBezTo>
+                  <a:pt x="435504" y="234613"/>
+                  <a:pt x="433387" y="258425"/>
+                  <a:pt x="422275" y="285942"/>
+                </a:cubicBezTo>
+                <a:cubicBezTo>
+                  <a:pt x="411163" y="313459"/>
+                  <a:pt x="385762" y="346267"/>
+                  <a:pt x="365125" y="368492"/>
+                </a:cubicBezTo>
+                <a:cubicBezTo>
+                  <a:pt x="344488" y="390717"/>
+                  <a:pt x="327025" y="410296"/>
+                  <a:pt x="298450" y="419292"/>
+                </a:cubicBezTo>
+                <a:cubicBezTo>
+                  <a:pt x="269875" y="428288"/>
+                  <a:pt x="226483" y="425113"/>
+                  <a:pt x="193675" y="422467"/>
+                </a:cubicBezTo>
+                <a:cubicBezTo>
+                  <a:pt x="160867" y="419821"/>
+                  <a:pt x="123825" y="408709"/>
+                  <a:pt x="101600" y="403417"/>
+                </a:cubicBezTo>
+                <a:cubicBezTo>
+                  <a:pt x="79375" y="398125"/>
+                  <a:pt x="77258" y="398654"/>
+                  <a:pt x="60325" y="390717"/>
+                </a:cubicBezTo>
+                <a:cubicBezTo>
+                  <a:pt x="43392" y="382780"/>
+                  <a:pt x="21696" y="369286"/>
+                  <a:pt x="0" y="355792"/>
+                </a:cubicBezTo>
+              </a:path>
+            </a:pathLst>
+          </a:custGeom>
+          <a:noFill/>
+          <a:ln w="6350"/>
+        </p:spPr>
+        <p:style>
+          <a:lnRef idx="2">
+            <a:schemeClr val="accent1">
+              <a:shade val="15000"/>
+            </a:schemeClr>
+          </a:lnRef>
+          <a:fillRef idx="1">
+            <a:schemeClr val="accent1"/>
+          </a:fillRef>
+          <a:effectRef idx="0">
+            <a:schemeClr val="accent1"/>
+          </a:effectRef>
+          <a:fontRef idx="minor">
+            <a:schemeClr val="lt1"/>
+          </a:fontRef>
+        </p:style>
+        <p:txBody>
+          <a:bodyPr rtlCol="0" anchor="ctr"/>
+          <a:lstStyle/>
+          <a:p>
+            <a:pPr algn="ctr"/>
+            <a:endParaRPr lang="en-US"/>
+          </a:p>
+        </p:txBody>
+      </p:sp>
+      <p:sp>
+        <p:nvSpPr>
+          <p:cNvPr id="19" name="Freeform 18">
+            <a:extLst>
+              <a:ext uri="{FF2B5EF4-FFF2-40B4-BE49-F238E27FC236}">
+                <a16:creationId xmlns:a16="http://schemas.microsoft.com/office/drawing/2014/main" id="{F4AE32CF-958F-B3B8-847F-285E366D3B0B}"/>
+              </a:ext>
+            </a:extLst>
+          </p:cNvPr>
+          <p:cNvSpPr/>
+          <p:nvPr/>
+        </p:nvSpPr>
+        <p:spPr>
+          <a:xfrm>
+            <a:off x="4905375" y="2409825"/>
+            <a:ext cx="546121" cy="1393824"/>
+          </a:xfrm>
+          <a:custGeom>
+            <a:avLst/>
+            <a:gdLst>
+              <a:gd name="connsiteX0" fmla="*/ 152400 w 546121"/>
+              <a:gd name="connsiteY0" fmla="*/ 0 h 1368451"/>
+              <a:gd name="connsiteX1" fmla="*/ 276225 w 546121"/>
+              <a:gd name="connsiteY1" fmla="*/ 22225 h 1368451"/>
+              <a:gd name="connsiteX2" fmla="*/ 361950 w 546121"/>
+              <a:gd name="connsiteY2" fmla="*/ 79375 h 1368451"/>
+              <a:gd name="connsiteX3" fmla="*/ 438150 w 546121"/>
+              <a:gd name="connsiteY3" fmla="*/ 149225 h 1368451"/>
+              <a:gd name="connsiteX4" fmla="*/ 476250 w 546121"/>
+              <a:gd name="connsiteY4" fmla="*/ 234950 h 1368451"/>
+              <a:gd name="connsiteX5" fmla="*/ 485775 w 546121"/>
+              <a:gd name="connsiteY5" fmla="*/ 339725 h 1368451"/>
+              <a:gd name="connsiteX6" fmla="*/ 469900 w 546121"/>
+              <a:gd name="connsiteY6" fmla="*/ 466725 h 1368451"/>
+              <a:gd name="connsiteX7" fmla="*/ 438150 w 546121"/>
+              <a:gd name="connsiteY7" fmla="*/ 549275 h 1368451"/>
+              <a:gd name="connsiteX8" fmla="*/ 374650 w 546121"/>
+              <a:gd name="connsiteY8" fmla="*/ 628650 h 1368451"/>
+              <a:gd name="connsiteX9" fmla="*/ 311150 w 546121"/>
+              <a:gd name="connsiteY9" fmla="*/ 669925 h 1368451"/>
+              <a:gd name="connsiteX10" fmla="*/ 222250 w 546121"/>
+              <a:gd name="connsiteY10" fmla="*/ 717550 h 1368451"/>
+              <a:gd name="connsiteX11" fmla="*/ 174625 w 546121"/>
+              <a:gd name="connsiteY11" fmla="*/ 758825 h 1368451"/>
+              <a:gd name="connsiteX12" fmla="*/ 142875 w 546121"/>
+              <a:gd name="connsiteY12" fmla="*/ 784225 h 1368451"/>
+              <a:gd name="connsiteX13" fmla="*/ 212725 w 546121"/>
+              <a:gd name="connsiteY13" fmla="*/ 752475 h 1368451"/>
+              <a:gd name="connsiteX14" fmla="*/ 314325 w 546121"/>
+              <a:gd name="connsiteY14" fmla="*/ 742950 h 1368451"/>
+              <a:gd name="connsiteX15" fmla="*/ 390525 w 546121"/>
+              <a:gd name="connsiteY15" fmla="*/ 781050 h 1368451"/>
+              <a:gd name="connsiteX16" fmla="*/ 463550 w 546121"/>
+              <a:gd name="connsiteY16" fmla="*/ 831850 h 1368451"/>
+              <a:gd name="connsiteX17" fmla="*/ 508000 w 546121"/>
+              <a:gd name="connsiteY17" fmla="*/ 911225 h 1368451"/>
+              <a:gd name="connsiteX18" fmla="*/ 523875 w 546121"/>
+              <a:gd name="connsiteY18" fmla="*/ 974725 h 1368451"/>
+              <a:gd name="connsiteX19" fmla="*/ 546100 w 546121"/>
+              <a:gd name="connsiteY19" fmla="*/ 1057275 h 1368451"/>
+              <a:gd name="connsiteX20" fmla="*/ 527050 w 546121"/>
+              <a:gd name="connsiteY20" fmla="*/ 1155700 h 1368451"/>
+              <a:gd name="connsiteX21" fmla="*/ 485775 w 546121"/>
+              <a:gd name="connsiteY21" fmla="*/ 1241425 h 1368451"/>
+              <a:gd name="connsiteX22" fmla="*/ 422275 w 546121"/>
+              <a:gd name="connsiteY22" fmla="*/ 1301750 h 1368451"/>
+              <a:gd name="connsiteX23" fmla="*/ 371475 w 546121"/>
+              <a:gd name="connsiteY23" fmla="*/ 1336675 h 1368451"/>
+              <a:gd name="connsiteX24" fmla="*/ 307975 w 546121"/>
+              <a:gd name="connsiteY24" fmla="*/ 1355725 h 1368451"/>
+              <a:gd name="connsiteX25" fmla="*/ 231775 w 546121"/>
+              <a:gd name="connsiteY25" fmla="*/ 1368425 h 1368451"/>
+              <a:gd name="connsiteX26" fmla="*/ 168275 w 546121"/>
+              <a:gd name="connsiteY26" fmla="*/ 1358900 h 1368451"/>
+              <a:gd name="connsiteX27" fmla="*/ 107950 w 546121"/>
+              <a:gd name="connsiteY27" fmla="*/ 1352550 h 1368451"/>
+              <a:gd name="connsiteX28" fmla="*/ 57150 w 546121"/>
+              <a:gd name="connsiteY28" fmla="*/ 1339850 h 1368451"/>
+              <a:gd name="connsiteX29" fmla="*/ 0 w 546121"/>
+              <a:gd name="connsiteY29" fmla="*/ 1323975 h 1368451"/>
+            </a:gdLst>
+            <a:ahLst/>
+            <a:cxnLst>
+              <a:cxn ang="0">
+                <a:pos x="connsiteX0" y="connsiteY0"/>
+              </a:cxn>
+              <a:cxn ang="0">
+                <a:pos x="connsiteX1" y="connsiteY1"/>
+              </a:cxn>
+              <a:cxn ang="0">
+                <a:pos x="connsiteX2" y="connsiteY2"/>
+              </a:cxn>
+              <a:cxn ang="0">
+                <a:pos x="connsiteX3" y="connsiteY3"/>
+              </a:cxn>
+              <a:cxn ang="0">
+                <a:pos x="connsiteX4" y="connsiteY4"/>
+              </a:cxn>
+              <a:cxn ang="0">
+                <a:pos x="connsiteX5" y="connsiteY5"/>
+              </a:cxn>
+              <a:cxn ang="0">
+                <a:pos x="connsiteX6" y="connsiteY6"/>
+              </a:cxn>
+              <a:cxn ang="0">
+                <a:pos x="connsiteX7" y="connsiteY7"/>
+              </a:cxn>
+              <a:cxn ang="0">
+                <a:pos x="connsiteX8" y="connsiteY8"/>
+              </a:cxn>
+              <a:cxn ang="0">
+                <a:pos x="connsiteX9" y="connsiteY9"/>
+              </a:cxn>
+              <a:cxn ang="0">
+                <a:pos x="connsiteX10" y="connsiteY10"/>
+              </a:cxn>
+              <a:cxn ang="0">
+                <a:pos x="connsiteX11" y="connsiteY11"/>
+              </a:cxn>
+              <a:cxn ang="0">
+                <a:pos x="connsiteX12" y="connsiteY12"/>
+              </a:cxn>
+              <a:cxn ang="0">
+                <a:pos x="connsiteX13" y="connsiteY13"/>
+              </a:cxn>
+              <a:cxn ang="0">
+                <a:pos x="connsiteX14" y="connsiteY14"/>
+              </a:cxn>
+              <a:cxn ang="0">
+                <a:pos x="connsiteX15" y="connsiteY15"/>
+              </a:cxn>
+              <a:cxn ang="0">
+                <a:pos x="connsiteX16" y="connsiteY16"/>
+              </a:cxn>
+              <a:cxn ang="0">
+                <a:pos x="connsiteX17" y="connsiteY17"/>
+              </a:cxn>
+              <a:cxn ang="0">
+                <a:pos x="connsiteX18" y="connsiteY18"/>
+              </a:cxn>
+              <a:cxn ang="0">
+                <a:pos x="connsiteX19" y="connsiteY19"/>
+              </a:cxn>
+              <a:cxn ang="0">
+                <a:pos x="connsiteX20" y="connsiteY20"/>
+              </a:cxn>
+              <a:cxn ang="0">
+                <a:pos x="connsiteX21" y="connsiteY21"/>
+              </a:cxn>
+              <a:cxn ang="0">
+                <a:pos x="connsiteX22" y="connsiteY22"/>
+              </a:cxn>
+              <a:cxn ang="0">
+                <a:pos x="connsiteX23" y="connsiteY23"/>
+              </a:cxn>
+              <a:cxn ang="0">
+                <a:pos x="connsiteX24" y="connsiteY24"/>
+              </a:cxn>
+              <a:cxn ang="0">
+                <a:pos x="connsiteX25" y="connsiteY25"/>
+              </a:cxn>
+              <a:cxn ang="0">
+                <a:pos x="connsiteX26" y="connsiteY26"/>
+              </a:cxn>
+              <a:cxn ang="0">
+                <a:pos x="connsiteX27" y="connsiteY27"/>
+              </a:cxn>
+              <a:cxn ang="0">
+                <a:pos x="connsiteX28" y="connsiteY28"/>
+              </a:cxn>
+              <a:cxn ang="0">
+                <a:pos x="connsiteX29" y="connsiteY29"/>
+              </a:cxn>
+            </a:cxnLst>
+            <a:rect l="l" t="t" r="r" b="b"/>
+            <a:pathLst>
+              <a:path w="546121" h="1368451">
+                <a:moveTo>
+                  <a:pt x="152400" y="0"/>
+                </a:moveTo>
+                <a:cubicBezTo>
+                  <a:pt x="196850" y="4498"/>
+                  <a:pt x="241300" y="8996"/>
+                  <a:pt x="276225" y="22225"/>
+                </a:cubicBezTo>
+                <a:cubicBezTo>
+                  <a:pt x="311150" y="35454"/>
+                  <a:pt x="334963" y="58208"/>
+                  <a:pt x="361950" y="79375"/>
+                </a:cubicBezTo>
+                <a:cubicBezTo>
+                  <a:pt x="388938" y="100542"/>
+                  <a:pt x="419100" y="123296"/>
+                  <a:pt x="438150" y="149225"/>
+                </a:cubicBezTo>
+                <a:cubicBezTo>
+                  <a:pt x="457200" y="175154"/>
+                  <a:pt x="468313" y="203200"/>
+                  <a:pt x="476250" y="234950"/>
+                </a:cubicBezTo>
+                <a:cubicBezTo>
+                  <a:pt x="484187" y="266700"/>
+                  <a:pt x="486833" y="301096"/>
+                  <a:pt x="485775" y="339725"/>
+                </a:cubicBezTo>
+                <a:cubicBezTo>
+                  <a:pt x="484717" y="378354"/>
+                  <a:pt x="477837" y="431800"/>
+                  <a:pt x="469900" y="466725"/>
+                </a:cubicBezTo>
+                <a:cubicBezTo>
+                  <a:pt x="461963" y="501650"/>
+                  <a:pt x="454025" y="522288"/>
+                  <a:pt x="438150" y="549275"/>
+                </a:cubicBezTo>
+                <a:cubicBezTo>
+                  <a:pt x="422275" y="576263"/>
+                  <a:pt x="395817" y="608542"/>
+                  <a:pt x="374650" y="628650"/>
+                </a:cubicBezTo>
+                <a:cubicBezTo>
+                  <a:pt x="353483" y="648758"/>
+                  <a:pt x="336550" y="655108"/>
+                  <a:pt x="311150" y="669925"/>
+                </a:cubicBezTo>
+                <a:cubicBezTo>
+                  <a:pt x="285750" y="684742"/>
+                  <a:pt x="245004" y="702733"/>
+                  <a:pt x="222250" y="717550"/>
+                </a:cubicBezTo>
+                <a:cubicBezTo>
+                  <a:pt x="199496" y="732367"/>
+                  <a:pt x="187854" y="747713"/>
+                  <a:pt x="174625" y="758825"/>
+                </a:cubicBezTo>
+                <a:cubicBezTo>
+                  <a:pt x="161396" y="769937"/>
+                  <a:pt x="136525" y="785283"/>
+                  <a:pt x="142875" y="784225"/>
+                </a:cubicBezTo>
+                <a:cubicBezTo>
+                  <a:pt x="149225" y="783167"/>
+                  <a:pt x="184150" y="759354"/>
+                  <a:pt x="212725" y="752475"/>
+                </a:cubicBezTo>
+                <a:cubicBezTo>
+                  <a:pt x="241300" y="745596"/>
+                  <a:pt x="284692" y="738188"/>
+                  <a:pt x="314325" y="742950"/>
+                </a:cubicBezTo>
+                <a:cubicBezTo>
+                  <a:pt x="343958" y="747712"/>
+                  <a:pt x="365654" y="766233"/>
+                  <a:pt x="390525" y="781050"/>
+                </a:cubicBezTo>
+                <a:cubicBezTo>
+                  <a:pt x="415396" y="795867"/>
+                  <a:pt x="443971" y="810154"/>
+                  <a:pt x="463550" y="831850"/>
+                </a:cubicBezTo>
+                <a:cubicBezTo>
+                  <a:pt x="483129" y="853546"/>
+                  <a:pt x="497946" y="887413"/>
+                  <a:pt x="508000" y="911225"/>
+                </a:cubicBezTo>
+                <a:cubicBezTo>
+                  <a:pt x="518054" y="935037"/>
+                  <a:pt x="517525" y="950383"/>
+                  <a:pt x="523875" y="974725"/>
+                </a:cubicBezTo>
+                <a:cubicBezTo>
+                  <a:pt x="530225" y="999067"/>
+                  <a:pt x="545571" y="1027113"/>
+                  <a:pt x="546100" y="1057275"/>
+                </a:cubicBezTo>
+                <a:cubicBezTo>
+                  <a:pt x="546629" y="1087438"/>
+                  <a:pt x="537104" y="1125008"/>
+                  <a:pt x="527050" y="1155700"/>
+                </a:cubicBezTo>
+                <a:cubicBezTo>
+                  <a:pt x="516996" y="1186392"/>
+                  <a:pt x="503238" y="1217083"/>
+                  <a:pt x="485775" y="1241425"/>
+                </a:cubicBezTo>
+                <a:cubicBezTo>
+                  <a:pt x="468312" y="1265767"/>
+                  <a:pt x="441325" y="1285875"/>
+                  <a:pt x="422275" y="1301750"/>
+                </a:cubicBezTo>
+                <a:cubicBezTo>
+                  <a:pt x="403225" y="1317625"/>
+                  <a:pt x="390525" y="1327679"/>
+                  <a:pt x="371475" y="1336675"/>
+                </a:cubicBezTo>
+                <a:cubicBezTo>
+                  <a:pt x="352425" y="1345671"/>
+                  <a:pt x="331258" y="1350433"/>
+                  <a:pt x="307975" y="1355725"/>
+                </a:cubicBezTo>
+                <a:cubicBezTo>
+                  <a:pt x="284692" y="1361017"/>
+                  <a:pt x="255058" y="1367896"/>
+                  <a:pt x="231775" y="1368425"/>
+                </a:cubicBezTo>
+                <a:cubicBezTo>
+                  <a:pt x="208492" y="1368954"/>
+                  <a:pt x="188912" y="1361546"/>
+                  <a:pt x="168275" y="1358900"/>
+                </a:cubicBezTo>
+                <a:cubicBezTo>
+                  <a:pt x="147638" y="1356254"/>
+                  <a:pt x="126471" y="1355725"/>
+                  <a:pt x="107950" y="1352550"/>
+                </a:cubicBezTo>
+                <a:cubicBezTo>
+                  <a:pt x="89429" y="1349375"/>
+                  <a:pt x="75142" y="1344613"/>
+                  <a:pt x="57150" y="1339850"/>
+                </a:cubicBezTo>
+                <a:cubicBezTo>
+                  <a:pt x="39158" y="1335088"/>
+                  <a:pt x="19579" y="1329531"/>
+                  <a:pt x="0" y="1323975"/>
+                </a:cubicBezTo>
+              </a:path>
+            </a:pathLst>
+          </a:custGeom>
+          <a:noFill/>
+          <a:ln w="6350"/>
+        </p:spPr>
+        <p:style>
+          <a:lnRef idx="2">
+            <a:schemeClr val="accent1">
+              <a:shade val="15000"/>
+            </a:schemeClr>
+          </a:lnRef>
+          <a:fillRef idx="1">
+            <a:schemeClr val="accent1"/>
+          </a:fillRef>
+          <a:effectRef idx="0">
+            <a:schemeClr val="accent1"/>
+          </a:effectRef>
+          <a:fontRef idx="minor">
+            <a:schemeClr val="lt1"/>
+          </a:fontRef>
+        </p:style>
+        <p:txBody>
+          <a:bodyPr rtlCol="0" anchor="ctr"/>
+          <a:lstStyle/>
+          <a:p>
+            <a:pPr algn="ctr"/>
+            <a:endParaRPr lang="en-US"/>
+          </a:p>
+        </p:txBody>
+      </p:sp>
+      <p:sp>
+        <p:nvSpPr>
+          <p:cNvPr id="20" name="Freeform 19">
+            <a:extLst>
+              <a:ext uri="{FF2B5EF4-FFF2-40B4-BE49-F238E27FC236}">
+                <a16:creationId xmlns:a16="http://schemas.microsoft.com/office/drawing/2014/main" id="{1EFED2B8-3758-EB67-96D8-E8C5CC5EF9FE}"/>
+              </a:ext>
+            </a:extLst>
+          </p:cNvPr>
+          <p:cNvSpPr/>
+          <p:nvPr/>
+        </p:nvSpPr>
+        <p:spPr>
+          <a:xfrm>
+            <a:off x="4902200" y="2743250"/>
+            <a:ext cx="60753" cy="126950"/>
+          </a:xfrm>
+          <a:custGeom>
+            <a:avLst/>
+            <a:gdLst>
+              <a:gd name="connsiteX0" fmla="*/ 3175 w 60753"/>
+              <a:gd name="connsiteY0" fmla="*/ 3125 h 126950"/>
+              <a:gd name="connsiteX1" fmla="*/ 53975 w 60753"/>
+              <a:gd name="connsiteY1" fmla="*/ 9475 h 126950"/>
+              <a:gd name="connsiteX2" fmla="*/ 57150 w 60753"/>
+              <a:gd name="connsiteY2" fmla="*/ 82500 h 126950"/>
+              <a:gd name="connsiteX3" fmla="*/ 25400 w 60753"/>
+              <a:gd name="connsiteY3" fmla="*/ 95200 h 126950"/>
+              <a:gd name="connsiteX4" fmla="*/ 0 w 60753"/>
+              <a:gd name="connsiteY4" fmla="*/ 126950 h 126950"/>
+            </a:gdLst>
+            <a:ahLst/>
+            <a:cxnLst>
+              <a:cxn ang="0">
+                <a:pos x="connsiteX0" y="connsiteY0"/>
+              </a:cxn>
+              <a:cxn ang="0">
+                <a:pos x="connsiteX1" y="connsiteY1"/>
+              </a:cxn>
+              <a:cxn ang="0">
+                <a:pos x="connsiteX2" y="connsiteY2"/>
+              </a:cxn>
+              <a:cxn ang="0">
+                <a:pos x="connsiteX3" y="connsiteY3"/>
+              </a:cxn>
+              <a:cxn ang="0">
+                <a:pos x="connsiteX4" y="connsiteY4"/>
+              </a:cxn>
+            </a:cxnLst>
+            <a:rect l="l" t="t" r="r" b="b"/>
+            <a:pathLst>
+              <a:path w="60753" h="126950">
+                <a:moveTo>
+                  <a:pt x="3175" y="3125"/>
+                </a:moveTo>
+                <a:cubicBezTo>
+                  <a:pt x="24077" y="-315"/>
+                  <a:pt x="44979" y="-3754"/>
+                  <a:pt x="53975" y="9475"/>
+                </a:cubicBezTo>
+                <a:cubicBezTo>
+                  <a:pt x="62971" y="22704"/>
+                  <a:pt x="61913" y="68212"/>
+                  <a:pt x="57150" y="82500"/>
+                </a:cubicBezTo>
+                <a:cubicBezTo>
+                  <a:pt x="52387" y="96788"/>
+                  <a:pt x="34925" y="87792"/>
+                  <a:pt x="25400" y="95200"/>
+                </a:cubicBezTo>
+                <a:cubicBezTo>
+                  <a:pt x="15875" y="102608"/>
+                  <a:pt x="7937" y="114779"/>
+                  <a:pt x="0" y="126950"/>
+                </a:cubicBezTo>
+              </a:path>
+            </a:pathLst>
+          </a:custGeom>
+          <a:noFill/>
+          <a:ln w="6350"/>
+        </p:spPr>
+        <p:style>
+          <a:lnRef idx="2">
+            <a:schemeClr val="accent1">
+              <a:shade val="15000"/>
+            </a:schemeClr>
+          </a:lnRef>
+          <a:fillRef idx="1">
+            <a:schemeClr val="accent1"/>
+          </a:fillRef>
+          <a:effectRef idx="0">
+            <a:schemeClr val="accent1"/>
+          </a:effectRef>
+          <a:fontRef idx="minor">
+            <a:schemeClr val="lt1"/>
+          </a:fontRef>
+        </p:style>
+        <p:txBody>
+          <a:bodyPr rtlCol="0" anchor="ctr"/>
+          <a:lstStyle/>
+          <a:p>
+            <a:pPr algn="ctr"/>
+            <a:endParaRPr lang="en-US"/>
+          </a:p>
+        </p:txBody>
+      </p:sp>
+      <p:sp>
+        <p:nvSpPr>
+          <p:cNvPr id="21" name="Freeform 20">
+            <a:extLst>
+              <a:ext uri="{FF2B5EF4-FFF2-40B4-BE49-F238E27FC236}">
+                <a16:creationId xmlns:a16="http://schemas.microsoft.com/office/drawing/2014/main" id="{9AAC3148-2EE2-6551-5C6E-C189C785B816}"/>
+              </a:ext>
+            </a:extLst>
+          </p:cNvPr>
+          <p:cNvSpPr/>
+          <p:nvPr/>
+        </p:nvSpPr>
+        <p:spPr>
+          <a:xfrm>
+            <a:off x="4908550" y="3631305"/>
+            <a:ext cx="736450" cy="562870"/>
+          </a:xfrm>
+          <a:custGeom>
+            <a:avLst/>
+            <a:gdLst>
+              <a:gd name="connsiteX0" fmla="*/ 0 w 736450"/>
+              <a:gd name="connsiteY0" fmla="*/ 194570 h 562870"/>
+              <a:gd name="connsiteX1" fmla="*/ 85725 w 736450"/>
+              <a:gd name="connsiteY1" fmla="*/ 226320 h 562870"/>
+              <a:gd name="connsiteX2" fmla="*/ 168275 w 736450"/>
+              <a:gd name="connsiteY2" fmla="*/ 239020 h 562870"/>
+              <a:gd name="connsiteX3" fmla="*/ 260350 w 736450"/>
+              <a:gd name="connsiteY3" fmla="*/ 251720 h 562870"/>
+              <a:gd name="connsiteX4" fmla="*/ 333375 w 736450"/>
+              <a:gd name="connsiteY4" fmla="*/ 245370 h 562870"/>
+              <a:gd name="connsiteX5" fmla="*/ 434975 w 736450"/>
+              <a:gd name="connsiteY5" fmla="*/ 213620 h 562870"/>
+              <a:gd name="connsiteX6" fmla="*/ 501650 w 736450"/>
+              <a:gd name="connsiteY6" fmla="*/ 181870 h 562870"/>
+              <a:gd name="connsiteX7" fmla="*/ 542925 w 736450"/>
+              <a:gd name="connsiteY7" fmla="*/ 146945 h 562870"/>
+              <a:gd name="connsiteX8" fmla="*/ 600075 w 736450"/>
+              <a:gd name="connsiteY8" fmla="*/ 108845 h 562870"/>
+              <a:gd name="connsiteX9" fmla="*/ 704850 w 736450"/>
+              <a:gd name="connsiteY9" fmla="*/ 35820 h 562870"/>
+              <a:gd name="connsiteX10" fmla="*/ 733425 w 736450"/>
+              <a:gd name="connsiteY10" fmla="*/ 4070 h 562870"/>
+              <a:gd name="connsiteX11" fmla="*/ 644525 w 736450"/>
+              <a:gd name="connsiteY11" fmla="*/ 124720 h 562870"/>
+              <a:gd name="connsiteX12" fmla="*/ 508000 w 736450"/>
+              <a:gd name="connsiteY12" fmla="*/ 251720 h 562870"/>
+              <a:gd name="connsiteX13" fmla="*/ 381000 w 736450"/>
+              <a:gd name="connsiteY13" fmla="*/ 324745 h 562870"/>
+              <a:gd name="connsiteX14" fmla="*/ 263525 w 736450"/>
+              <a:gd name="connsiteY14" fmla="*/ 388245 h 562870"/>
+              <a:gd name="connsiteX15" fmla="*/ 174625 w 736450"/>
+              <a:gd name="connsiteY15" fmla="*/ 445395 h 562870"/>
+              <a:gd name="connsiteX16" fmla="*/ 104775 w 736450"/>
+              <a:gd name="connsiteY16" fmla="*/ 496195 h 562870"/>
+              <a:gd name="connsiteX17" fmla="*/ 69850 w 736450"/>
+              <a:gd name="connsiteY17" fmla="*/ 543820 h 562870"/>
+              <a:gd name="connsiteX18" fmla="*/ 53975 w 736450"/>
+              <a:gd name="connsiteY18" fmla="*/ 562870 h 562870"/>
+            </a:gdLst>
+            <a:ahLst/>
+            <a:cxnLst>
+              <a:cxn ang="0">
+                <a:pos x="connsiteX0" y="connsiteY0"/>
+              </a:cxn>
+              <a:cxn ang="0">
+                <a:pos x="connsiteX1" y="connsiteY1"/>
+              </a:cxn>
+              <a:cxn ang="0">
+                <a:pos x="connsiteX2" y="connsiteY2"/>
+              </a:cxn>
+              <a:cxn ang="0">
+                <a:pos x="connsiteX3" y="connsiteY3"/>
+              </a:cxn>
+              <a:cxn ang="0">
+                <a:pos x="connsiteX4" y="connsiteY4"/>
+              </a:cxn>
+              <a:cxn ang="0">
+                <a:pos x="connsiteX5" y="connsiteY5"/>
+              </a:cxn>
+              <a:cxn ang="0">
+                <a:pos x="connsiteX6" y="connsiteY6"/>
+              </a:cxn>
+              <a:cxn ang="0">
+                <a:pos x="connsiteX7" y="connsiteY7"/>
+              </a:cxn>
+              <a:cxn ang="0">
+                <a:pos x="connsiteX8" y="connsiteY8"/>
+              </a:cxn>
+              <a:cxn ang="0">
+                <a:pos x="connsiteX9" y="connsiteY9"/>
+              </a:cxn>
+              <a:cxn ang="0">
+                <a:pos x="connsiteX10" y="connsiteY10"/>
+              </a:cxn>
+              <a:cxn ang="0">
+                <a:pos x="connsiteX11" y="connsiteY11"/>
+              </a:cxn>
+              <a:cxn ang="0">
+                <a:pos x="connsiteX12" y="connsiteY12"/>
+              </a:cxn>
+              <a:cxn ang="0">
+                <a:pos x="connsiteX13" y="connsiteY13"/>
+              </a:cxn>
+              <a:cxn ang="0">
+                <a:pos x="connsiteX14" y="connsiteY14"/>
+              </a:cxn>
+              <a:cxn ang="0">
+                <a:pos x="connsiteX15" y="connsiteY15"/>
+              </a:cxn>
+              <a:cxn ang="0">
+                <a:pos x="connsiteX16" y="connsiteY16"/>
+              </a:cxn>
+              <a:cxn ang="0">
+                <a:pos x="connsiteX17" y="connsiteY17"/>
+              </a:cxn>
+              <a:cxn ang="0">
+                <a:pos x="connsiteX18" y="connsiteY18"/>
+              </a:cxn>
+            </a:cxnLst>
+            <a:rect l="l" t="t" r="r" b="b"/>
+            <a:pathLst>
+              <a:path w="736450" h="562870">
+                <a:moveTo>
+                  <a:pt x="0" y="194570"/>
+                </a:moveTo>
+                <a:cubicBezTo>
+                  <a:pt x="28839" y="206741"/>
+                  <a:pt x="57679" y="218912"/>
+                  <a:pt x="85725" y="226320"/>
+                </a:cubicBezTo>
+                <a:cubicBezTo>
+                  <a:pt x="113771" y="233728"/>
+                  <a:pt x="168275" y="239020"/>
+                  <a:pt x="168275" y="239020"/>
+                </a:cubicBezTo>
+                <a:cubicBezTo>
+                  <a:pt x="197379" y="243253"/>
+                  <a:pt x="232833" y="250662"/>
+                  <a:pt x="260350" y="251720"/>
+                </a:cubicBezTo>
+                <a:cubicBezTo>
+                  <a:pt x="287867" y="252778"/>
+                  <a:pt x="304271" y="251720"/>
+                  <a:pt x="333375" y="245370"/>
+                </a:cubicBezTo>
+                <a:cubicBezTo>
+                  <a:pt x="362479" y="239020"/>
+                  <a:pt x="406929" y="224203"/>
+                  <a:pt x="434975" y="213620"/>
+                </a:cubicBezTo>
+                <a:cubicBezTo>
+                  <a:pt x="463021" y="203037"/>
+                  <a:pt x="483659" y="192982"/>
+                  <a:pt x="501650" y="181870"/>
+                </a:cubicBezTo>
+                <a:cubicBezTo>
+                  <a:pt x="519641" y="170758"/>
+                  <a:pt x="526521" y="159116"/>
+                  <a:pt x="542925" y="146945"/>
+                </a:cubicBezTo>
+                <a:cubicBezTo>
+                  <a:pt x="559329" y="134774"/>
+                  <a:pt x="573088" y="127366"/>
+                  <a:pt x="600075" y="108845"/>
+                </a:cubicBezTo>
+                <a:cubicBezTo>
+                  <a:pt x="627062" y="90324"/>
+                  <a:pt x="682625" y="53282"/>
+                  <a:pt x="704850" y="35820"/>
+                </a:cubicBezTo>
+                <a:cubicBezTo>
+                  <a:pt x="727075" y="18358"/>
+                  <a:pt x="743479" y="-10747"/>
+                  <a:pt x="733425" y="4070"/>
+                </a:cubicBezTo>
+                <a:cubicBezTo>
+                  <a:pt x="723371" y="18887"/>
+                  <a:pt x="682096" y="83445"/>
+                  <a:pt x="644525" y="124720"/>
+                </a:cubicBezTo>
+                <a:cubicBezTo>
+                  <a:pt x="606954" y="165995"/>
+                  <a:pt x="551921" y="218383"/>
+                  <a:pt x="508000" y="251720"/>
+                </a:cubicBezTo>
+                <a:cubicBezTo>
+                  <a:pt x="464079" y="285058"/>
+                  <a:pt x="421746" y="301991"/>
+                  <a:pt x="381000" y="324745"/>
+                </a:cubicBezTo>
+                <a:cubicBezTo>
+                  <a:pt x="340254" y="347499"/>
+                  <a:pt x="297921" y="368137"/>
+                  <a:pt x="263525" y="388245"/>
+                </a:cubicBezTo>
+                <a:cubicBezTo>
+                  <a:pt x="229129" y="408353"/>
+                  <a:pt x="201083" y="427403"/>
+                  <a:pt x="174625" y="445395"/>
+                </a:cubicBezTo>
+                <a:cubicBezTo>
+                  <a:pt x="148167" y="463387"/>
+                  <a:pt x="122238" y="479791"/>
+                  <a:pt x="104775" y="496195"/>
+                </a:cubicBezTo>
+                <a:cubicBezTo>
+                  <a:pt x="87313" y="512599"/>
+                  <a:pt x="69850" y="543820"/>
+                  <a:pt x="69850" y="543820"/>
+                </a:cubicBezTo>
+                <a:cubicBezTo>
+                  <a:pt x="61383" y="554932"/>
+                  <a:pt x="57679" y="558901"/>
+                  <a:pt x="53975" y="562870"/>
+                </a:cubicBezTo>
+              </a:path>
+            </a:pathLst>
+          </a:custGeom>
+          <a:noFill/>
+          <a:ln w="6350"/>
+        </p:spPr>
+        <p:style>
+          <a:lnRef idx="2">
+            <a:schemeClr val="accent1">
+              <a:shade val="15000"/>
+            </a:schemeClr>
+          </a:lnRef>
+          <a:fillRef idx="1">
+            <a:schemeClr val="accent1"/>
+          </a:fillRef>
+          <a:effectRef idx="0">
+            <a:schemeClr val="accent1"/>
+          </a:effectRef>
+          <a:fontRef idx="minor">
+            <a:schemeClr val="lt1"/>
+          </a:fontRef>
+        </p:style>
+        <p:txBody>
+          <a:bodyPr rtlCol="0" anchor="ctr"/>
+          <a:lstStyle/>
+          <a:p>
+            <a:pPr algn="ctr"/>
+            <a:endParaRPr lang="en-US"/>
+          </a:p>
+        </p:txBody>
+      </p:sp>
+      <p:sp>
+        <p:nvSpPr>
+          <p:cNvPr id="22" name="Freeform 21">
+            <a:extLst>
+              <a:ext uri="{FF2B5EF4-FFF2-40B4-BE49-F238E27FC236}">
+                <a16:creationId xmlns:a16="http://schemas.microsoft.com/office/drawing/2014/main" id="{7A295F6D-B21C-1CF6-4F51-02534ED7D222}"/>
+              </a:ext>
+            </a:extLst>
+          </p:cNvPr>
+          <p:cNvSpPr/>
+          <p:nvPr/>
+        </p:nvSpPr>
+        <p:spPr>
+          <a:xfrm>
+            <a:off x="4895850" y="3902075"/>
+            <a:ext cx="353941" cy="282575"/>
+          </a:xfrm>
+          <a:custGeom>
+            <a:avLst/>
+            <a:gdLst>
+              <a:gd name="connsiteX0" fmla="*/ 0 w 353941"/>
+              <a:gd name="connsiteY0" fmla="*/ 0 h 282575"/>
+              <a:gd name="connsiteX1" fmla="*/ 82550 w 353941"/>
+              <a:gd name="connsiteY1" fmla="*/ 31750 h 282575"/>
+              <a:gd name="connsiteX2" fmla="*/ 136525 w 353941"/>
+              <a:gd name="connsiteY2" fmla="*/ 34925 h 282575"/>
+              <a:gd name="connsiteX3" fmla="*/ 219075 w 353941"/>
+              <a:gd name="connsiteY3" fmla="*/ 44450 h 282575"/>
+              <a:gd name="connsiteX4" fmla="*/ 266700 w 353941"/>
+              <a:gd name="connsiteY4" fmla="*/ 41275 h 282575"/>
+              <a:gd name="connsiteX5" fmla="*/ 317500 w 353941"/>
+              <a:gd name="connsiteY5" fmla="*/ 34925 h 282575"/>
+              <a:gd name="connsiteX6" fmla="*/ 352425 w 353941"/>
+              <a:gd name="connsiteY6" fmla="*/ 28575 h 282575"/>
+              <a:gd name="connsiteX7" fmla="*/ 266700 w 353941"/>
+              <a:gd name="connsiteY7" fmla="*/ 69850 h 282575"/>
+              <a:gd name="connsiteX8" fmla="*/ 196850 w 353941"/>
+              <a:gd name="connsiteY8" fmla="*/ 101600 h 282575"/>
+              <a:gd name="connsiteX9" fmla="*/ 120650 w 353941"/>
+              <a:gd name="connsiteY9" fmla="*/ 146050 h 282575"/>
+              <a:gd name="connsiteX10" fmla="*/ 88900 w 353941"/>
+              <a:gd name="connsiteY10" fmla="*/ 174625 h 282575"/>
+              <a:gd name="connsiteX11" fmla="*/ 63500 w 353941"/>
+              <a:gd name="connsiteY11" fmla="*/ 206375 h 282575"/>
+              <a:gd name="connsiteX12" fmla="*/ 47625 w 353941"/>
+              <a:gd name="connsiteY12" fmla="*/ 231775 h 282575"/>
+              <a:gd name="connsiteX13" fmla="*/ 22225 w 353941"/>
+              <a:gd name="connsiteY13" fmla="*/ 266700 h 282575"/>
+              <a:gd name="connsiteX14" fmla="*/ 12700 w 353941"/>
+              <a:gd name="connsiteY14" fmla="*/ 282575 h 282575"/>
+            </a:gdLst>
+            <a:ahLst/>
+            <a:cxnLst>
+              <a:cxn ang="0">
+                <a:pos x="connsiteX0" y="connsiteY0"/>
+              </a:cxn>
+              <a:cxn ang="0">
+                <a:pos x="connsiteX1" y="connsiteY1"/>
+              </a:cxn>
+              <a:cxn ang="0">
+                <a:pos x="connsiteX2" y="connsiteY2"/>
+              </a:cxn>
+              <a:cxn ang="0">
+                <a:pos x="connsiteX3" y="connsiteY3"/>
+              </a:cxn>
+              <a:cxn ang="0">
+                <a:pos x="connsiteX4" y="connsiteY4"/>
+              </a:cxn>
+              <a:cxn ang="0">
+                <a:pos x="connsiteX5" y="connsiteY5"/>
+              </a:cxn>
+              <a:cxn ang="0">
+                <a:pos x="connsiteX6" y="connsiteY6"/>
+              </a:cxn>
+              <a:cxn ang="0">
+                <a:pos x="connsiteX7" y="connsiteY7"/>
+              </a:cxn>
+              <a:cxn ang="0">
+                <a:pos x="connsiteX8" y="connsiteY8"/>
+              </a:cxn>
+              <a:cxn ang="0">
+                <a:pos x="connsiteX9" y="connsiteY9"/>
+              </a:cxn>
+              <a:cxn ang="0">
+                <a:pos x="connsiteX10" y="connsiteY10"/>
+              </a:cxn>
+              <a:cxn ang="0">
+                <a:pos x="connsiteX11" y="connsiteY11"/>
+              </a:cxn>
+              <a:cxn ang="0">
+                <a:pos x="connsiteX12" y="connsiteY12"/>
+              </a:cxn>
+              <a:cxn ang="0">
+                <a:pos x="connsiteX13" y="connsiteY13"/>
+              </a:cxn>
+              <a:cxn ang="0">
+                <a:pos x="connsiteX14" y="connsiteY14"/>
+              </a:cxn>
+            </a:cxnLst>
+            <a:rect l="l" t="t" r="r" b="b"/>
+            <a:pathLst>
+              <a:path w="353941" h="282575">
+                <a:moveTo>
+                  <a:pt x="0" y="0"/>
+                </a:moveTo>
+                <a:cubicBezTo>
+                  <a:pt x="29898" y="12964"/>
+                  <a:pt x="59796" y="25929"/>
+                  <a:pt x="82550" y="31750"/>
+                </a:cubicBezTo>
+                <a:cubicBezTo>
+                  <a:pt x="105304" y="37571"/>
+                  <a:pt x="113771" y="32808"/>
+                  <a:pt x="136525" y="34925"/>
+                </a:cubicBezTo>
+                <a:cubicBezTo>
+                  <a:pt x="159279" y="37042"/>
+                  <a:pt x="197379" y="43392"/>
+                  <a:pt x="219075" y="44450"/>
+                </a:cubicBezTo>
+                <a:cubicBezTo>
+                  <a:pt x="240771" y="45508"/>
+                  <a:pt x="250296" y="42862"/>
+                  <a:pt x="266700" y="41275"/>
+                </a:cubicBezTo>
+                <a:cubicBezTo>
+                  <a:pt x="283104" y="39688"/>
+                  <a:pt x="303213" y="37042"/>
+                  <a:pt x="317500" y="34925"/>
+                </a:cubicBezTo>
+                <a:cubicBezTo>
+                  <a:pt x="331788" y="32808"/>
+                  <a:pt x="360892" y="22754"/>
+                  <a:pt x="352425" y="28575"/>
+                </a:cubicBezTo>
+                <a:cubicBezTo>
+                  <a:pt x="343958" y="34396"/>
+                  <a:pt x="292629" y="57679"/>
+                  <a:pt x="266700" y="69850"/>
+                </a:cubicBezTo>
+                <a:cubicBezTo>
+                  <a:pt x="240771" y="82021"/>
+                  <a:pt x="221192" y="88900"/>
+                  <a:pt x="196850" y="101600"/>
+                </a:cubicBezTo>
+                <a:cubicBezTo>
+                  <a:pt x="172508" y="114300"/>
+                  <a:pt x="138642" y="133879"/>
+                  <a:pt x="120650" y="146050"/>
+                </a:cubicBezTo>
+                <a:cubicBezTo>
+                  <a:pt x="102658" y="158221"/>
+                  <a:pt x="98425" y="164571"/>
+                  <a:pt x="88900" y="174625"/>
+                </a:cubicBezTo>
+                <a:cubicBezTo>
+                  <a:pt x="79375" y="184679"/>
+                  <a:pt x="70379" y="196850"/>
+                  <a:pt x="63500" y="206375"/>
+                </a:cubicBezTo>
+                <a:cubicBezTo>
+                  <a:pt x="56621" y="215900"/>
+                  <a:pt x="54504" y="221721"/>
+                  <a:pt x="47625" y="231775"/>
+                </a:cubicBezTo>
+                <a:cubicBezTo>
+                  <a:pt x="40746" y="241829"/>
+                  <a:pt x="22225" y="266700"/>
+                  <a:pt x="22225" y="266700"/>
+                </a:cubicBezTo>
+                <a:cubicBezTo>
+                  <a:pt x="16404" y="275167"/>
+                  <a:pt x="14552" y="278871"/>
+                  <a:pt x="12700" y="282575"/>
+                </a:cubicBezTo>
+              </a:path>
+            </a:pathLst>
+          </a:custGeom>
+          <a:noFill/>
+          <a:ln w="6350"/>
+        </p:spPr>
+        <p:style>
+          <a:lnRef idx="2">
+            <a:schemeClr val="accent1">
+              <a:shade val="15000"/>
+            </a:schemeClr>
+          </a:lnRef>
+          <a:fillRef idx="1">
+            <a:schemeClr val="accent1"/>
+          </a:fillRef>
+          <a:effectRef idx="0">
+            <a:schemeClr val="accent1"/>
+          </a:effectRef>
+          <a:fontRef idx="minor">
+            <a:schemeClr val="lt1"/>
+          </a:fontRef>
+        </p:style>
+        <p:txBody>
+          <a:bodyPr rtlCol="0" anchor="ctr"/>
+          <a:lstStyle/>
+          <a:p>
+            <a:pPr algn="ctr"/>
+            <a:endParaRPr lang="en-US"/>
+          </a:p>
+        </p:txBody>
+      </p:sp>
+      <p:sp>
+        <p:nvSpPr>
+          <p:cNvPr id="23" name="Freeform 22">
+            <a:extLst>
+              <a:ext uri="{FF2B5EF4-FFF2-40B4-BE49-F238E27FC236}">
+                <a16:creationId xmlns:a16="http://schemas.microsoft.com/office/drawing/2014/main" id="{BEC42E94-5C67-5758-9D35-F0A082662410}"/>
+              </a:ext>
+            </a:extLst>
+          </p:cNvPr>
+          <p:cNvSpPr/>
+          <p:nvPr/>
+        </p:nvSpPr>
+        <p:spPr>
+          <a:xfrm>
+            <a:off x="4892675" y="3995708"/>
+            <a:ext cx="117813" cy="112742"/>
+          </a:xfrm>
+          <a:custGeom>
+            <a:avLst/>
+            <a:gdLst>
+              <a:gd name="connsiteX0" fmla="*/ 6350 w 117813"/>
+              <a:gd name="connsiteY0" fmla="*/ 11142 h 112742"/>
+              <a:gd name="connsiteX1" fmla="*/ 66675 w 117813"/>
+              <a:gd name="connsiteY1" fmla="*/ 11142 h 112742"/>
+              <a:gd name="connsiteX2" fmla="*/ 117475 w 117813"/>
+              <a:gd name="connsiteY2" fmla="*/ 1617 h 112742"/>
+              <a:gd name="connsiteX3" fmla="*/ 41275 w 117813"/>
+              <a:gd name="connsiteY3" fmla="*/ 49242 h 112742"/>
+              <a:gd name="connsiteX4" fmla="*/ 15875 w 117813"/>
+              <a:gd name="connsiteY4" fmla="*/ 93692 h 112742"/>
+              <a:gd name="connsiteX5" fmla="*/ 0 w 117813"/>
+              <a:gd name="connsiteY5" fmla="*/ 112742 h 112742"/>
+            </a:gdLst>
+            <a:ahLst/>
+            <a:cxnLst>
+              <a:cxn ang="0">
+                <a:pos x="connsiteX0" y="connsiteY0"/>
+              </a:cxn>
+              <a:cxn ang="0">
+                <a:pos x="connsiteX1" y="connsiteY1"/>
+              </a:cxn>
+              <a:cxn ang="0">
+                <a:pos x="connsiteX2" y="connsiteY2"/>
+              </a:cxn>
+              <a:cxn ang="0">
+                <a:pos x="connsiteX3" y="connsiteY3"/>
+              </a:cxn>
+              <a:cxn ang="0">
+                <a:pos x="connsiteX4" y="connsiteY4"/>
+              </a:cxn>
+              <a:cxn ang="0">
+                <a:pos x="connsiteX5" y="connsiteY5"/>
+              </a:cxn>
+            </a:cxnLst>
+            <a:rect l="l" t="t" r="r" b="b"/>
+            <a:pathLst>
+              <a:path w="117813" h="112742">
+                <a:moveTo>
+                  <a:pt x="6350" y="11142"/>
+                </a:moveTo>
+                <a:cubicBezTo>
+                  <a:pt x="27252" y="11935"/>
+                  <a:pt x="48154" y="12729"/>
+                  <a:pt x="66675" y="11142"/>
+                </a:cubicBezTo>
+                <a:cubicBezTo>
+                  <a:pt x="85196" y="9555"/>
+                  <a:pt x="121708" y="-4733"/>
+                  <a:pt x="117475" y="1617"/>
+                </a:cubicBezTo>
+                <a:cubicBezTo>
+                  <a:pt x="113242" y="7967"/>
+                  <a:pt x="58208" y="33896"/>
+                  <a:pt x="41275" y="49242"/>
+                </a:cubicBezTo>
+                <a:cubicBezTo>
+                  <a:pt x="24342" y="64588"/>
+                  <a:pt x="15875" y="93692"/>
+                  <a:pt x="15875" y="93692"/>
+                </a:cubicBezTo>
+                <a:cubicBezTo>
+                  <a:pt x="8996" y="104275"/>
+                  <a:pt x="4498" y="108508"/>
+                  <a:pt x="0" y="112742"/>
+                </a:cubicBezTo>
+              </a:path>
+            </a:pathLst>
+          </a:custGeom>
+          <a:noFill/>
+          <a:ln w="6350"/>
+        </p:spPr>
+        <p:style>
+          <a:lnRef idx="2">
+            <a:schemeClr val="accent1">
+              <a:shade val="15000"/>
+            </a:schemeClr>
+          </a:lnRef>
+          <a:fillRef idx="1">
+            <a:schemeClr val="accent1"/>
+          </a:fillRef>
+          <a:effectRef idx="0">
+            <a:schemeClr val="accent1"/>
+          </a:effectRef>
+          <a:fontRef idx="minor">
+            <a:schemeClr val="lt1"/>
+          </a:fontRef>
+        </p:style>
+        <p:txBody>
+          <a:bodyPr rtlCol="0" anchor="ctr"/>
+          <a:lstStyle/>
+          <a:p>
+            <a:pPr algn="ctr"/>
+            <a:endParaRPr lang="en-US"/>
+          </a:p>
+        </p:txBody>
+      </p:sp>
+      <p:sp>
+        <p:nvSpPr>
+          <p:cNvPr id="24" name="Freeform 23">
+            <a:extLst>
+              <a:ext uri="{FF2B5EF4-FFF2-40B4-BE49-F238E27FC236}">
+                <a16:creationId xmlns:a16="http://schemas.microsoft.com/office/drawing/2014/main" id="{4C40038D-1E16-AE18-DDD6-EFDF8E826550}"/>
+              </a:ext>
+            </a:extLst>
+          </p:cNvPr>
+          <p:cNvSpPr/>
+          <p:nvPr/>
+        </p:nvSpPr>
+        <p:spPr>
+          <a:xfrm>
+            <a:off x="4775200" y="2867025"/>
+            <a:ext cx="123825" cy="133350"/>
+          </a:xfrm>
+          <a:custGeom>
+            <a:avLst/>
+            <a:gdLst>
+              <a:gd name="connsiteX0" fmla="*/ 123825 w 123825"/>
+              <a:gd name="connsiteY0" fmla="*/ 0 h 133350"/>
+              <a:gd name="connsiteX1" fmla="*/ 88900 w 123825"/>
+              <a:gd name="connsiteY1" fmla="*/ 38100 h 133350"/>
+              <a:gd name="connsiteX2" fmla="*/ 50800 w 123825"/>
+              <a:gd name="connsiteY2" fmla="*/ 73025 h 133350"/>
+              <a:gd name="connsiteX3" fmla="*/ 28575 w 123825"/>
+              <a:gd name="connsiteY3" fmla="*/ 95250 h 133350"/>
+              <a:gd name="connsiteX4" fmla="*/ 0 w 123825"/>
+              <a:gd name="connsiteY4" fmla="*/ 133350 h 133350"/>
+            </a:gdLst>
+            <a:ahLst/>
+            <a:cxnLst>
+              <a:cxn ang="0">
+                <a:pos x="connsiteX0" y="connsiteY0"/>
+              </a:cxn>
+              <a:cxn ang="0">
+                <a:pos x="connsiteX1" y="connsiteY1"/>
+              </a:cxn>
+              <a:cxn ang="0">
+                <a:pos x="connsiteX2" y="connsiteY2"/>
+              </a:cxn>
+              <a:cxn ang="0">
+                <a:pos x="connsiteX3" y="connsiteY3"/>
+              </a:cxn>
+              <a:cxn ang="0">
+                <a:pos x="connsiteX4" y="connsiteY4"/>
+              </a:cxn>
+            </a:cxnLst>
+            <a:rect l="l" t="t" r="r" b="b"/>
+            <a:pathLst>
+              <a:path w="123825" h="133350">
+                <a:moveTo>
+                  <a:pt x="123825" y="0"/>
+                </a:moveTo>
+                <a:cubicBezTo>
+                  <a:pt x="112448" y="12964"/>
+                  <a:pt x="101071" y="25929"/>
+                  <a:pt x="88900" y="38100"/>
+                </a:cubicBezTo>
+                <a:cubicBezTo>
+                  <a:pt x="76729" y="50271"/>
+                  <a:pt x="60854" y="63500"/>
+                  <a:pt x="50800" y="73025"/>
+                </a:cubicBezTo>
+                <a:cubicBezTo>
+                  <a:pt x="40746" y="82550"/>
+                  <a:pt x="37042" y="85196"/>
+                  <a:pt x="28575" y="95250"/>
+                </a:cubicBezTo>
+                <a:cubicBezTo>
+                  <a:pt x="20108" y="105304"/>
+                  <a:pt x="10054" y="119327"/>
+                  <a:pt x="0" y="133350"/>
+                </a:cubicBezTo>
+              </a:path>
+            </a:pathLst>
+          </a:custGeom>
+          <a:noFill/>
+          <a:ln w="6350">
+            <a:prstDash val="dash"/>
+          </a:ln>
+        </p:spPr>
+        <p:style>
+          <a:lnRef idx="2">
+            <a:schemeClr val="accent1">
+              <a:shade val="15000"/>
+            </a:schemeClr>
+          </a:lnRef>
+          <a:fillRef idx="1">
+            <a:schemeClr val="accent1"/>
+          </a:fillRef>
+          <a:effectRef idx="0">
+            <a:schemeClr val="accent1"/>
+          </a:effectRef>
+          <a:fontRef idx="minor">
+            <a:schemeClr val="lt1"/>
+          </a:fontRef>
+        </p:style>
+        <p:txBody>
+          <a:bodyPr rtlCol="0" anchor="ctr"/>
+          <a:lstStyle/>
+          <a:p>
+            <a:pPr algn="ctr"/>
+            <a:endParaRPr lang="en-US"/>
+          </a:p>
+        </p:txBody>
+      </p:sp>
+      <p:sp>
+        <p:nvSpPr>
+          <p:cNvPr id="26" name="Freeform 25">
+            <a:extLst>
+              <a:ext uri="{FF2B5EF4-FFF2-40B4-BE49-F238E27FC236}">
+                <a16:creationId xmlns:a16="http://schemas.microsoft.com/office/drawing/2014/main" id="{F541C119-9862-B52C-9032-B7A7CE49F26E}"/>
+              </a:ext>
+            </a:extLst>
+          </p:cNvPr>
+          <p:cNvSpPr/>
+          <p:nvPr/>
+        </p:nvSpPr>
+        <p:spPr>
+          <a:xfrm>
+            <a:off x="4841418" y="3429000"/>
+            <a:ext cx="67131" cy="103878"/>
+          </a:xfrm>
+          <a:custGeom>
+            <a:avLst/>
+            <a:gdLst>
+              <a:gd name="connsiteX0" fmla="*/ 57613 w 67138"/>
+              <a:gd name="connsiteY0" fmla="*/ 0 h 114300"/>
+              <a:gd name="connsiteX1" fmla="*/ 13163 w 67138"/>
+              <a:gd name="connsiteY1" fmla="*/ 28575 h 114300"/>
+              <a:gd name="connsiteX2" fmla="*/ 463 w 67138"/>
+              <a:gd name="connsiteY2" fmla="*/ 73025 h 114300"/>
+              <a:gd name="connsiteX3" fmla="*/ 25863 w 67138"/>
+              <a:gd name="connsiteY3" fmla="*/ 104775 h 114300"/>
+              <a:gd name="connsiteX4" fmla="*/ 67138 w 67138"/>
+              <a:gd name="connsiteY4" fmla="*/ 114300 h 114300"/>
+            </a:gdLst>
+            <a:ahLst/>
+            <a:cxnLst>
+              <a:cxn ang="0">
+                <a:pos x="connsiteX0" y="connsiteY0"/>
+              </a:cxn>
+              <a:cxn ang="0">
+                <a:pos x="connsiteX1" y="connsiteY1"/>
+              </a:cxn>
+              <a:cxn ang="0">
+                <a:pos x="connsiteX2" y="connsiteY2"/>
+              </a:cxn>
+              <a:cxn ang="0">
+                <a:pos x="connsiteX3" y="connsiteY3"/>
+              </a:cxn>
+              <a:cxn ang="0">
+                <a:pos x="connsiteX4" y="connsiteY4"/>
+              </a:cxn>
+            </a:cxnLst>
+            <a:rect l="l" t="t" r="r" b="b"/>
+            <a:pathLst>
+              <a:path w="67138" h="114300">
+                <a:moveTo>
+                  <a:pt x="57613" y="0"/>
+                </a:moveTo>
+                <a:cubicBezTo>
+                  <a:pt x="40150" y="8202"/>
+                  <a:pt x="22688" y="16404"/>
+                  <a:pt x="13163" y="28575"/>
+                </a:cubicBezTo>
+                <a:cubicBezTo>
+                  <a:pt x="3638" y="40746"/>
+                  <a:pt x="-1654" y="60325"/>
+                  <a:pt x="463" y="73025"/>
+                </a:cubicBezTo>
+                <a:cubicBezTo>
+                  <a:pt x="2580" y="85725"/>
+                  <a:pt x="14751" y="97896"/>
+                  <a:pt x="25863" y="104775"/>
+                </a:cubicBezTo>
+                <a:cubicBezTo>
+                  <a:pt x="36975" y="111654"/>
+                  <a:pt x="52056" y="112977"/>
+                  <a:pt x="67138" y="114300"/>
+                </a:cubicBezTo>
+              </a:path>
+            </a:pathLst>
+          </a:custGeom>
+          <a:noFill/>
+          <a:ln w="6350">
+            <a:prstDash val="dash"/>
+          </a:ln>
+        </p:spPr>
+        <p:style>
+          <a:lnRef idx="2">
+            <a:schemeClr val="accent1">
+              <a:shade val="15000"/>
+            </a:schemeClr>
+          </a:lnRef>
+          <a:fillRef idx="1">
+            <a:schemeClr val="accent1"/>
+          </a:fillRef>
+          <a:effectRef idx="0">
+            <a:schemeClr val="accent1"/>
+          </a:effectRef>
+          <a:fontRef idx="minor">
+            <a:schemeClr val="lt1"/>
+          </a:fontRef>
+        </p:style>
+        <p:txBody>
+          <a:bodyPr rtlCol="0" anchor="ctr"/>
+          <a:lstStyle/>
+          <a:p>
+            <a:pPr algn="ctr"/>
+            <a:endParaRPr lang="en-US"/>
+          </a:p>
+        </p:txBody>
+      </p:sp>
+      <p:sp>
+        <p:nvSpPr>
+          <p:cNvPr id="28" name="Freeform 27">
+            <a:extLst>
+              <a:ext uri="{FF2B5EF4-FFF2-40B4-BE49-F238E27FC236}">
+                <a16:creationId xmlns:a16="http://schemas.microsoft.com/office/drawing/2014/main" id="{40DDB2E3-C2C1-6899-B495-4A18B069C00E}"/>
+              </a:ext>
+            </a:extLst>
+          </p:cNvPr>
+          <p:cNvSpPr/>
+          <p:nvPr/>
+        </p:nvSpPr>
+        <p:spPr>
+          <a:xfrm>
+            <a:off x="4810085" y="3384544"/>
+            <a:ext cx="82570" cy="190514"/>
+          </a:xfrm>
+          <a:custGeom>
+            <a:avLst/>
+            <a:gdLst>
+              <a:gd name="connsiteX0" fmla="*/ 101660 w 101660"/>
+              <a:gd name="connsiteY0" fmla="*/ 0 h 209550"/>
+              <a:gd name="connsiteX1" fmla="*/ 19110 w 101660"/>
+              <a:gd name="connsiteY1" fmla="*/ 41275 h 209550"/>
+              <a:gd name="connsiteX2" fmla="*/ 60 w 101660"/>
+              <a:gd name="connsiteY2" fmla="*/ 104775 h 209550"/>
+              <a:gd name="connsiteX3" fmla="*/ 22285 w 101660"/>
+              <a:gd name="connsiteY3" fmla="*/ 171450 h 209550"/>
+              <a:gd name="connsiteX4" fmla="*/ 69910 w 101660"/>
+              <a:gd name="connsiteY4" fmla="*/ 196850 h 209550"/>
+              <a:gd name="connsiteX5" fmla="*/ 82610 w 101660"/>
+              <a:gd name="connsiteY5" fmla="*/ 200025 h 209550"/>
+              <a:gd name="connsiteX6" fmla="*/ 101660 w 101660"/>
+              <a:gd name="connsiteY6" fmla="*/ 209550 h 209550"/>
+            </a:gdLst>
+            <a:ahLst/>
+            <a:cxnLst>
+              <a:cxn ang="0">
+                <a:pos x="connsiteX0" y="connsiteY0"/>
+              </a:cxn>
+              <a:cxn ang="0">
+                <a:pos x="connsiteX1" y="connsiteY1"/>
+              </a:cxn>
+              <a:cxn ang="0">
+                <a:pos x="connsiteX2" y="connsiteY2"/>
+              </a:cxn>
+              <a:cxn ang="0">
+                <a:pos x="connsiteX3" y="connsiteY3"/>
+              </a:cxn>
+              <a:cxn ang="0">
+                <a:pos x="connsiteX4" y="connsiteY4"/>
+              </a:cxn>
+              <a:cxn ang="0">
+                <a:pos x="connsiteX5" y="connsiteY5"/>
+              </a:cxn>
+              <a:cxn ang="0">
+                <a:pos x="connsiteX6" y="connsiteY6"/>
+              </a:cxn>
+            </a:cxnLst>
+            <a:rect l="l" t="t" r="r" b="b"/>
+            <a:pathLst>
+              <a:path w="101660" h="209550">
+                <a:moveTo>
+                  <a:pt x="101660" y="0"/>
+                </a:moveTo>
+                <a:cubicBezTo>
+                  <a:pt x="68851" y="11906"/>
+                  <a:pt x="36043" y="23813"/>
+                  <a:pt x="19110" y="41275"/>
+                </a:cubicBezTo>
+                <a:cubicBezTo>
+                  <a:pt x="2177" y="58737"/>
+                  <a:pt x="-469" y="83079"/>
+                  <a:pt x="60" y="104775"/>
+                </a:cubicBezTo>
+                <a:cubicBezTo>
+                  <a:pt x="589" y="126471"/>
+                  <a:pt x="10643" y="156104"/>
+                  <a:pt x="22285" y="171450"/>
+                </a:cubicBezTo>
+                <a:cubicBezTo>
+                  <a:pt x="33927" y="186796"/>
+                  <a:pt x="69910" y="196850"/>
+                  <a:pt x="69910" y="196850"/>
+                </a:cubicBezTo>
+                <a:cubicBezTo>
+                  <a:pt x="79964" y="201613"/>
+                  <a:pt x="82610" y="200025"/>
+                  <a:pt x="82610" y="200025"/>
+                </a:cubicBezTo>
+                <a:cubicBezTo>
+                  <a:pt x="87902" y="202142"/>
+                  <a:pt x="94781" y="205846"/>
+                  <a:pt x="101660" y="209550"/>
+                </a:cubicBezTo>
+              </a:path>
+            </a:pathLst>
+          </a:custGeom>
+          <a:noFill/>
+          <a:ln w="6350">
+            <a:prstDash val="dash"/>
+          </a:ln>
+        </p:spPr>
+        <p:style>
+          <a:lnRef idx="2">
+            <a:schemeClr val="accent1">
+              <a:shade val="15000"/>
+            </a:schemeClr>
+          </a:lnRef>
+          <a:fillRef idx="1">
+            <a:schemeClr val="accent1"/>
+          </a:fillRef>
+          <a:effectRef idx="0">
+            <a:schemeClr val="accent1"/>
+          </a:effectRef>
+          <a:fontRef idx="minor">
+            <a:schemeClr val="lt1"/>
+          </a:fontRef>
+        </p:style>
+        <p:txBody>
+          <a:bodyPr rtlCol="0" anchor="ctr"/>
+          <a:lstStyle/>
+          <a:p>
+            <a:pPr algn="ctr"/>
+            <a:endParaRPr lang="en-US"/>
+          </a:p>
+        </p:txBody>
+      </p:sp>
+      <p:sp>
+        <p:nvSpPr>
+          <p:cNvPr id="29" name="Freeform 28">
+            <a:extLst>
+              <a:ext uri="{FF2B5EF4-FFF2-40B4-BE49-F238E27FC236}">
+                <a16:creationId xmlns:a16="http://schemas.microsoft.com/office/drawing/2014/main" id="{1ECB003F-BC16-CC8B-466A-D48C018904CA}"/>
+              </a:ext>
+            </a:extLst>
+          </p:cNvPr>
+          <p:cNvSpPr/>
+          <p:nvPr/>
+        </p:nvSpPr>
+        <p:spPr>
+          <a:xfrm>
+            <a:off x="4752526" y="3330575"/>
+            <a:ext cx="149674" cy="317500"/>
+          </a:xfrm>
+          <a:custGeom>
+            <a:avLst/>
+            <a:gdLst>
+              <a:gd name="connsiteX0" fmla="*/ 146499 w 149674"/>
+              <a:gd name="connsiteY0" fmla="*/ 0 h 317500"/>
+              <a:gd name="connsiteX1" fmla="*/ 89349 w 149674"/>
+              <a:gd name="connsiteY1" fmla="*/ 25400 h 317500"/>
+              <a:gd name="connsiteX2" fmla="*/ 32199 w 149674"/>
+              <a:gd name="connsiteY2" fmla="*/ 57150 h 317500"/>
+              <a:gd name="connsiteX3" fmla="*/ 449 w 149674"/>
+              <a:gd name="connsiteY3" fmla="*/ 127000 h 317500"/>
+              <a:gd name="connsiteX4" fmla="*/ 16324 w 149674"/>
+              <a:gd name="connsiteY4" fmla="*/ 193675 h 317500"/>
+              <a:gd name="connsiteX5" fmla="*/ 54424 w 149674"/>
+              <a:gd name="connsiteY5" fmla="*/ 241300 h 317500"/>
+              <a:gd name="connsiteX6" fmla="*/ 86174 w 149674"/>
+              <a:gd name="connsiteY6" fmla="*/ 273050 h 317500"/>
+              <a:gd name="connsiteX7" fmla="*/ 111574 w 149674"/>
+              <a:gd name="connsiteY7" fmla="*/ 288925 h 317500"/>
+              <a:gd name="connsiteX8" fmla="*/ 149674 w 149674"/>
+              <a:gd name="connsiteY8" fmla="*/ 317500 h 317500"/>
+            </a:gdLst>
+            <a:ahLst/>
+            <a:cxnLst>
+              <a:cxn ang="0">
+                <a:pos x="connsiteX0" y="connsiteY0"/>
+              </a:cxn>
+              <a:cxn ang="0">
+                <a:pos x="connsiteX1" y="connsiteY1"/>
+              </a:cxn>
+              <a:cxn ang="0">
+                <a:pos x="connsiteX2" y="connsiteY2"/>
+              </a:cxn>
+              <a:cxn ang="0">
+                <a:pos x="connsiteX3" y="connsiteY3"/>
+              </a:cxn>
+              <a:cxn ang="0">
+                <a:pos x="connsiteX4" y="connsiteY4"/>
+              </a:cxn>
+              <a:cxn ang="0">
+                <a:pos x="connsiteX5" y="connsiteY5"/>
+              </a:cxn>
+              <a:cxn ang="0">
+                <a:pos x="connsiteX6" y="connsiteY6"/>
+              </a:cxn>
+              <a:cxn ang="0">
+                <a:pos x="connsiteX7" y="connsiteY7"/>
+              </a:cxn>
+              <a:cxn ang="0">
+                <a:pos x="connsiteX8" y="connsiteY8"/>
+              </a:cxn>
+            </a:cxnLst>
+            <a:rect l="l" t="t" r="r" b="b"/>
+            <a:pathLst>
+              <a:path w="149674" h="317500">
+                <a:moveTo>
+                  <a:pt x="146499" y="0"/>
+                </a:moveTo>
+                <a:cubicBezTo>
+                  <a:pt x="127449" y="7937"/>
+                  <a:pt x="108399" y="15875"/>
+                  <a:pt x="89349" y="25400"/>
+                </a:cubicBezTo>
+                <a:cubicBezTo>
+                  <a:pt x="70299" y="34925"/>
+                  <a:pt x="47016" y="40217"/>
+                  <a:pt x="32199" y="57150"/>
+                </a:cubicBezTo>
+                <a:cubicBezTo>
+                  <a:pt x="17382" y="74083"/>
+                  <a:pt x="3095" y="104246"/>
+                  <a:pt x="449" y="127000"/>
+                </a:cubicBezTo>
+                <a:cubicBezTo>
+                  <a:pt x="-2197" y="149754"/>
+                  <a:pt x="7328" y="174625"/>
+                  <a:pt x="16324" y="193675"/>
+                </a:cubicBezTo>
+                <a:cubicBezTo>
+                  <a:pt x="25320" y="212725"/>
+                  <a:pt x="42782" y="228071"/>
+                  <a:pt x="54424" y="241300"/>
+                </a:cubicBezTo>
+                <a:cubicBezTo>
+                  <a:pt x="66066" y="254529"/>
+                  <a:pt x="76649" y="265113"/>
+                  <a:pt x="86174" y="273050"/>
+                </a:cubicBezTo>
+                <a:cubicBezTo>
+                  <a:pt x="95699" y="280987"/>
+                  <a:pt x="100991" y="281517"/>
+                  <a:pt x="111574" y="288925"/>
+                </a:cubicBezTo>
+                <a:cubicBezTo>
+                  <a:pt x="122157" y="296333"/>
+                  <a:pt x="135915" y="306916"/>
+                  <a:pt x="149674" y="317500"/>
+                </a:cubicBezTo>
+              </a:path>
+            </a:pathLst>
+          </a:custGeom>
+          <a:noFill/>
+          <a:ln w="6350">
+            <a:prstDash val="dash"/>
+          </a:ln>
+        </p:spPr>
+        <p:style>
+          <a:lnRef idx="2">
+            <a:schemeClr val="accent1">
+              <a:shade val="15000"/>
+            </a:schemeClr>
+          </a:lnRef>
+          <a:fillRef idx="1">
+            <a:schemeClr val="accent1"/>
+          </a:fillRef>
+          <a:effectRef idx="0">
+            <a:schemeClr val="accent1"/>
+          </a:effectRef>
+          <a:fontRef idx="minor">
+            <a:schemeClr val="lt1"/>
+          </a:fontRef>
+        </p:style>
+        <p:txBody>
+          <a:bodyPr rtlCol="0" anchor="ctr"/>
+          <a:lstStyle/>
+          <a:p>
+            <a:pPr algn="ctr"/>
+            <a:endParaRPr lang="en-US"/>
+          </a:p>
+        </p:txBody>
+      </p:sp>
+      <p:sp>
+        <p:nvSpPr>
+          <p:cNvPr id="30" name="Freeform 29">
+            <a:extLst>
+              <a:ext uri="{FF2B5EF4-FFF2-40B4-BE49-F238E27FC236}">
+                <a16:creationId xmlns:a16="http://schemas.microsoft.com/office/drawing/2014/main" id="{08C884F6-3AB8-2F4B-D2C4-F20B8E77779D}"/>
+              </a:ext>
+            </a:extLst>
+          </p:cNvPr>
+          <p:cNvSpPr/>
+          <p:nvPr/>
+        </p:nvSpPr>
+        <p:spPr>
+          <a:xfrm>
+            <a:off x="3946525" y="3505109"/>
+            <a:ext cx="946150" cy="241391"/>
+          </a:xfrm>
+          <a:custGeom>
+            <a:avLst/>
+            <a:gdLst>
+              <a:gd name="connsiteX0" fmla="*/ 946150 w 946150"/>
+              <a:gd name="connsiteY0" fmla="*/ 241391 h 241391"/>
+              <a:gd name="connsiteX1" fmla="*/ 844550 w 946150"/>
+              <a:gd name="connsiteY1" fmla="*/ 203291 h 241391"/>
+              <a:gd name="connsiteX2" fmla="*/ 768350 w 946150"/>
+              <a:gd name="connsiteY2" fmla="*/ 165191 h 241391"/>
+              <a:gd name="connsiteX3" fmla="*/ 660400 w 946150"/>
+              <a:gd name="connsiteY3" fmla="*/ 114391 h 241391"/>
+              <a:gd name="connsiteX4" fmla="*/ 555625 w 946150"/>
+              <a:gd name="connsiteY4" fmla="*/ 73116 h 241391"/>
+              <a:gd name="connsiteX5" fmla="*/ 473075 w 946150"/>
+              <a:gd name="connsiteY5" fmla="*/ 57241 h 241391"/>
+              <a:gd name="connsiteX6" fmla="*/ 390525 w 946150"/>
+              <a:gd name="connsiteY6" fmla="*/ 31841 h 241391"/>
+              <a:gd name="connsiteX7" fmla="*/ 292100 w 946150"/>
+              <a:gd name="connsiteY7" fmla="*/ 19141 h 241391"/>
+              <a:gd name="connsiteX8" fmla="*/ 184150 w 946150"/>
+              <a:gd name="connsiteY8" fmla="*/ 6441 h 241391"/>
+              <a:gd name="connsiteX9" fmla="*/ 69850 w 946150"/>
+              <a:gd name="connsiteY9" fmla="*/ 91 h 241391"/>
+              <a:gd name="connsiteX10" fmla="*/ 0 w 946150"/>
+              <a:gd name="connsiteY10" fmla="*/ 3266 h 241391"/>
+            </a:gdLst>
+            <a:ahLst/>
+            <a:cxnLst>
+              <a:cxn ang="0">
+                <a:pos x="connsiteX0" y="connsiteY0"/>
+              </a:cxn>
+              <a:cxn ang="0">
+                <a:pos x="connsiteX1" y="connsiteY1"/>
+              </a:cxn>
+              <a:cxn ang="0">
+                <a:pos x="connsiteX2" y="connsiteY2"/>
+              </a:cxn>
+              <a:cxn ang="0">
+                <a:pos x="connsiteX3" y="connsiteY3"/>
+              </a:cxn>
+              <a:cxn ang="0">
+                <a:pos x="connsiteX4" y="connsiteY4"/>
+              </a:cxn>
+              <a:cxn ang="0">
+                <a:pos x="connsiteX5" y="connsiteY5"/>
+              </a:cxn>
+              <a:cxn ang="0">
+                <a:pos x="connsiteX6" y="connsiteY6"/>
+              </a:cxn>
+              <a:cxn ang="0">
+                <a:pos x="connsiteX7" y="connsiteY7"/>
+              </a:cxn>
+              <a:cxn ang="0">
+                <a:pos x="connsiteX8" y="connsiteY8"/>
+              </a:cxn>
+              <a:cxn ang="0">
+                <a:pos x="connsiteX9" y="connsiteY9"/>
+              </a:cxn>
+              <a:cxn ang="0">
+                <a:pos x="connsiteX10" y="connsiteY10"/>
+              </a:cxn>
+            </a:cxnLst>
+            <a:rect l="l" t="t" r="r" b="b"/>
+            <a:pathLst>
+              <a:path w="946150" h="241391">
+                <a:moveTo>
+                  <a:pt x="946150" y="241391"/>
+                </a:moveTo>
+                <a:cubicBezTo>
+                  <a:pt x="910166" y="228691"/>
+                  <a:pt x="874183" y="215991"/>
+                  <a:pt x="844550" y="203291"/>
+                </a:cubicBezTo>
+                <a:cubicBezTo>
+                  <a:pt x="814917" y="190591"/>
+                  <a:pt x="799042" y="180008"/>
+                  <a:pt x="768350" y="165191"/>
+                </a:cubicBezTo>
+                <a:cubicBezTo>
+                  <a:pt x="737658" y="150374"/>
+                  <a:pt x="695854" y="129737"/>
+                  <a:pt x="660400" y="114391"/>
+                </a:cubicBezTo>
+                <a:cubicBezTo>
+                  <a:pt x="624946" y="99045"/>
+                  <a:pt x="586846" y="82641"/>
+                  <a:pt x="555625" y="73116"/>
+                </a:cubicBezTo>
+                <a:cubicBezTo>
+                  <a:pt x="524404" y="63591"/>
+                  <a:pt x="500592" y="64120"/>
+                  <a:pt x="473075" y="57241"/>
+                </a:cubicBezTo>
+                <a:cubicBezTo>
+                  <a:pt x="445558" y="50362"/>
+                  <a:pt x="420687" y="38191"/>
+                  <a:pt x="390525" y="31841"/>
+                </a:cubicBezTo>
+                <a:cubicBezTo>
+                  <a:pt x="360363" y="25491"/>
+                  <a:pt x="292100" y="19141"/>
+                  <a:pt x="292100" y="19141"/>
+                </a:cubicBezTo>
+                <a:cubicBezTo>
+                  <a:pt x="257704" y="14908"/>
+                  <a:pt x="221192" y="9616"/>
+                  <a:pt x="184150" y="6441"/>
+                </a:cubicBezTo>
+                <a:cubicBezTo>
+                  <a:pt x="147108" y="3266"/>
+                  <a:pt x="100542" y="620"/>
+                  <a:pt x="69850" y="91"/>
+                </a:cubicBezTo>
+                <a:cubicBezTo>
+                  <a:pt x="39158" y="-438"/>
+                  <a:pt x="19579" y="1414"/>
+                  <a:pt x="0" y="3266"/>
+                </a:cubicBezTo>
+              </a:path>
+            </a:pathLst>
+          </a:custGeom>
+          <a:noFill/>
+          <a:ln w="6350">
+            <a:prstDash val="dash"/>
+          </a:ln>
+        </p:spPr>
+        <p:style>
+          <a:lnRef idx="2">
+            <a:schemeClr val="accent1">
+              <a:shade val="15000"/>
+            </a:schemeClr>
+          </a:lnRef>
+          <a:fillRef idx="1">
+            <a:schemeClr val="accent1"/>
+          </a:fillRef>
+          <a:effectRef idx="0">
+            <a:schemeClr val="accent1"/>
+          </a:effectRef>
+          <a:fontRef idx="minor">
+            <a:schemeClr val="lt1"/>
+          </a:fontRef>
+        </p:style>
+        <p:txBody>
+          <a:bodyPr rtlCol="0" anchor="ctr"/>
+          <a:lstStyle/>
+          <a:p>
+            <a:pPr algn="ctr"/>
+            <a:endParaRPr lang="en-US"/>
+          </a:p>
+        </p:txBody>
+      </p:sp>
+      <p:sp>
+        <p:nvSpPr>
+          <p:cNvPr id="31" name="Freeform 30">
+            <a:extLst>
+              <a:ext uri="{FF2B5EF4-FFF2-40B4-BE49-F238E27FC236}">
+                <a16:creationId xmlns:a16="http://schemas.microsoft.com/office/drawing/2014/main" id="{C44C2BCF-B3E8-5D32-FAFB-CD63918350D7}"/>
+              </a:ext>
+            </a:extLst>
+          </p:cNvPr>
+          <p:cNvSpPr/>
+          <p:nvPr/>
+        </p:nvSpPr>
+        <p:spPr>
+          <a:xfrm>
+            <a:off x="3952875" y="3612754"/>
+            <a:ext cx="942975" cy="203596"/>
+          </a:xfrm>
+          <a:custGeom>
+            <a:avLst/>
+            <a:gdLst>
+              <a:gd name="connsiteX0" fmla="*/ 942975 w 942975"/>
+              <a:gd name="connsiteY0" fmla="*/ 203596 h 203596"/>
+              <a:gd name="connsiteX1" fmla="*/ 825500 w 942975"/>
+              <a:gd name="connsiteY1" fmla="*/ 159146 h 203596"/>
+              <a:gd name="connsiteX2" fmla="*/ 736600 w 942975"/>
+              <a:gd name="connsiteY2" fmla="*/ 124221 h 203596"/>
+              <a:gd name="connsiteX3" fmla="*/ 638175 w 942975"/>
+              <a:gd name="connsiteY3" fmla="*/ 79771 h 203596"/>
+              <a:gd name="connsiteX4" fmla="*/ 561975 w 942975"/>
+              <a:gd name="connsiteY4" fmla="*/ 57546 h 203596"/>
+              <a:gd name="connsiteX5" fmla="*/ 454025 w 942975"/>
+              <a:gd name="connsiteY5" fmla="*/ 32146 h 203596"/>
+              <a:gd name="connsiteX6" fmla="*/ 377825 w 942975"/>
+              <a:gd name="connsiteY6" fmla="*/ 16271 h 203596"/>
+              <a:gd name="connsiteX7" fmla="*/ 257175 w 942975"/>
+              <a:gd name="connsiteY7" fmla="*/ 3571 h 203596"/>
+              <a:gd name="connsiteX8" fmla="*/ 155575 w 942975"/>
+              <a:gd name="connsiteY8" fmla="*/ 396 h 203596"/>
+              <a:gd name="connsiteX9" fmla="*/ 66675 w 942975"/>
+              <a:gd name="connsiteY9" fmla="*/ 396 h 203596"/>
+              <a:gd name="connsiteX10" fmla="*/ 0 w 942975"/>
+              <a:gd name="connsiteY10" fmla="*/ 3571 h 203596"/>
+            </a:gdLst>
+            <a:ahLst/>
+            <a:cxnLst>
+              <a:cxn ang="0">
+                <a:pos x="connsiteX0" y="connsiteY0"/>
+              </a:cxn>
+              <a:cxn ang="0">
+                <a:pos x="connsiteX1" y="connsiteY1"/>
+              </a:cxn>
+              <a:cxn ang="0">
+                <a:pos x="connsiteX2" y="connsiteY2"/>
+              </a:cxn>
+              <a:cxn ang="0">
+                <a:pos x="connsiteX3" y="connsiteY3"/>
+              </a:cxn>
+              <a:cxn ang="0">
+                <a:pos x="connsiteX4" y="connsiteY4"/>
+              </a:cxn>
+              <a:cxn ang="0">
+                <a:pos x="connsiteX5" y="connsiteY5"/>
+              </a:cxn>
+              <a:cxn ang="0">
+                <a:pos x="connsiteX6" y="connsiteY6"/>
+              </a:cxn>
+              <a:cxn ang="0">
+                <a:pos x="connsiteX7" y="connsiteY7"/>
+              </a:cxn>
+              <a:cxn ang="0">
+                <a:pos x="connsiteX8" y="connsiteY8"/>
+              </a:cxn>
+              <a:cxn ang="0">
+                <a:pos x="connsiteX9" y="connsiteY9"/>
+              </a:cxn>
+              <a:cxn ang="0">
+                <a:pos x="connsiteX10" y="connsiteY10"/>
+              </a:cxn>
+            </a:cxnLst>
+            <a:rect l="l" t="t" r="r" b="b"/>
+            <a:pathLst>
+              <a:path w="942975" h="203596">
+                <a:moveTo>
+                  <a:pt x="942975" y="203596"/>
+                </a:moveTo>
+                <a:lnTo>
+                  <a:pt x="825500" y="159146"/>
+                </a:lnTo>
+                <a:cubicBezTo>
+                  <a:pt x="791104" y="145917"/>
+                  <a:pt x="767821" y="137450"/>
+                  <a:pt x="736600" y="124221"/>
+                </a:cubicBezTo>
+                <a:cubicBezTo>
+                  <a:pt x="705379" y="110992"/>
+                  <a:pt x="667279" y="90883"/>
+                  <a:pt x="638175" y="79771"/>
+                </a:cubicBezTo>
+                <a:cubicBezTo>
+                  <a:pt x="609071" y="68658"/>
+                  <a:pt x="592667" y="65483"/>
+                  <a:pt x="561975" y="57546"/>
+                </a:cubicBezTo>
+                <a:cubicBezTo>
+                  <a:pt x="531283" y="49609"/>
+                  <a:pt x="484717" y="39025"/>
+                  <a:pt x="454025" y="32146"/>
+                </a:cubicBezTo>
+                <a:cubicBezTo>
+                  <a:pt x="423333" y="25267"/>
+                  <a:pt x="410633" y="21034"/>
+                  <a:pt x="377825" y="16271"/>
+                </a:cubicBezTo>
+                <a:cubicBezTo>
+                  <a:pt x="345017" y="11508"/>
+                  <a:pt x="294217" y="6217"/>
+                  <a:pt x="257175" y="3571"/>
+                </a:cubicBezTo>
+                <a:cubicBezTo>
+                  <a:pt x="220133" y="925"/>
+                  <a:pt x="187325" y="925"/>
+                  <a:pt x="155575" y="396"/>
+                </a:cubicBezTo>
+                <a:cubicBezTo>
+                  <a:pt x="123825" y="-133"/>
+                  <a:pt x="92604" y="-133"/>
+                  <a:pt x="66675" y="396"/>
+                </a:cubicBezTo>
+                <a:cubicBezTo>
+                  <a:pt x="40746" y="925"/>
+                  <a:pt x="20373" y="2248"/>
+                  <a:pt x="0" y="3571"/>
+                </a:cubicBezTo>
+              </a:path>
+            </a:pathLst>
+          </a:custGeom>
+          <a:noFill/>
+          <a:ln w="6350">
+            <a:prstDash val="dash"/>
+          </a:ln>
+        </p:spPr>
+        <p:style>
+          <a:lnRef idx="2">
+            <a:schemeClr val="accent1">
+              <a:shade val="15000"/>
+            </a:schemeClr>
+          </a:lnRef>
+          <a:fillRef idx="1">
+            <a:schemeClr val="accent1"/>
+          </a:fillRef>
+          <a:effectRef idx="0">
+            <a:schemeClr val="accent1"/>
+          </a:effectRef>
+          <a:fontRef idx="minor">
+            <a:schemeClr val="lt1"/>
+          </a:fontRef>
+        </p:style>
+        <p:txBody>
+          <a:bodyPr rtlCol="0" anchor="ctr"/>
+          <a:lstStyle/>
+          <a:p>
+            <a:pPr algn="ctr"/>
+            <a:endParaRPr lang="en-US"/>
+          </a:p>
+        </p:txBody>
+      </p:sp>
+      <p:sp>
+        <p:nvSpPr>
+          <p:cNvPr id="32" name="Freeform 31">
+            <a:extLst>
+              <a:ext uri="{FF2B5EF4-FFF2-40B4-BE49-F238E27FC236}">
+                <a16:creationId xmlns:a16="http://schemas.microsoft.com/office/drawing/2014/main" id="{A8F68D57-622E-B202-CF2F-30BBC2303B8A}"/>
+              </a:ext>
+            </a:extLst>
+          </p:cNvPr>
+          <p:cNvSpPr/>
+          <p:nvPr/>
+        </p:nvSpPr>
+        <p:spPr>
+          <a:xfrm>
+            <a:off x="3952875" y="3216275"/>
+            <a:ext cx="939800" cy="127000"/>
+          </a:xfrm>
+          <a:custGeom>
+            <a:avLst/>
+            <a:gdLst>
+              <a:gd name="connsiteX0" fmla="*/ 939800 w 939800"/>
+              <a:gd name="connsiteY0" fmla="*/ 0 h 127000"/>
+              <a:gd name="connsiteX1" fmla="*/ 841375 w 939800"/>
+              <a:gd name="connsiteY1" fmla="*/ 57150 h 127000"/>
+              <a:gd name="connsiteX2" fmla="*/ 752475 w 939800"/>
+              <a:gd name="connsiteY2" fmla="*/ 85725 h 127000"/>
+              <a:gd name="connsiteX3" fmla="*/ 663575 w 939800"/>
+              <a:gd name="connsiteY3" fmla="*/ 98425 h 127000"/>
+              <a:gd name="connsiteX4" fmla="*/ 514350 w 939800"/>
+              <a:gd name="connsiteY4" fmla="*/ 114300 h 127000"/>
+              <a:gd name="connsiteX5" fmla="*/ 374650 w 939800"/>
+              <a:gd name="connsiteY5" fmla="*/ 120650 h 127000"/>
+              <a:gd name="connsiteX6" fmla="*/ 209550 w 939800"/>
+              <a:gd name="connsiteY6" fmla="*/ 123825 h 127000"/>
+              <a:gd name="connsiteX7" fmla="*/ 111125 w 939800"/>
+              <a:gd name="connsiteY7" fmla="*/ 123825 h 127000"/>
+              <a:gd name="connsiteX8" fmla="*/ 0 w 939800"/>
+              <a:gd name="connsiteY8" fmla="*/ 127000 h 127000"/>
+            </a:gdLst>
+            <a:ahLst/>
+            <a:cxnLst>
+              <a:cxn ang="0">
+                <a:pos x="connsiteX0" y="connsiteY0"/>
+              </a:cxn>
+              <a:cxn ang="0">
+                <a:pos x="connsiteX1" y="connsiteY1"/>
+              </a:cxn>
+              <a:cxn ang="0">
+                <a:pos x="connsiteX2" y="connsiteY2"/>
+              </a:cxn>
+              <a:cxn ang="0">
+                <a:pos x="connsiteX3" y="connsiteY3"/>
+              </a:cxn>
+              <a:cxn ang="0">
+                <a:pos x="connsiteX4" y="connsiteY4"/>
+              </a:cxn>
+              <a:cxn ang="0">
+                <a:pos x="connsiteX5" y="connsiteY5"/>
+              </a:cxn>
+              <a:cxn ang="0">
+                <a:pos x="connsiteX6" y="connsiteY6"/>
+              </a:cxn>
+              <a:cxn ang="0">
+                <a:pos x="connsiteX7" y="connsiteY7"/>
+              </a:cxn>
+              <a:cxn ang="0">
+                <a:pos x="connsiteX8" y="connsiteY8"/>
+              </a:cxn>
+            </a:cxnLst>
+            <a:rect l="l" t="t" r="r" b="b"/>
+            <a:pathLst>
+              <a:path w="939800" h="127000">
+                <a:moveTo>
+                  <a:pt x="939800" y="0"/>
+                </a:moveTo>
+                <a:cubicBezTo>
+                  <a:pt x="906198" y="21431"/>
+                  <a:pt x="872596" y="42863"/>
+                  <a:pt x="841375" y="57150"/>
+                </a:cubicBezTo>
+                <a:cubicBezTo>
+                  <a:pt x="810154" y="71438"/>
+                  <a:pt x="782108" y="78846"/>
+                  <a:pt x="752475" y="85725"/>
+                </a:cubicBezTo>
+                <a:cubicBezTo>
+                  <a:pt x="722842" y="92604"/>
+                  <a:pt x="703262" y="93663"/>
+                  <a:pt x="663575" y="98425"/>
+                </a:cubicBezTo>
+                <a:cubicBezTo>
+                  <a:pt x="623887" y="103188"/>
+                  <a:pt x="562504" y="110596"/>
+                  <a:pt x="514350" y="114300"/>
+                </a:cubicBezTo>
+                <a:cubicBezTo>
+                  <a:pt x="466196" y="118004"/>
+                  <a:pt x="425450" y="119063"/>
+                  <a:pt x="374650" y="120650"/>
+                </a:cubicBezTo>
+                <a:cubicBezTo>
+                  <a:pt x="323850" y="122238"/>
+                  <a:pt x="253471" y="123296"/>
+                  <a:pt x="209550" y="123825"/>
+                </a:cubicBezTo>
+                <a:cubicBezTo>
+                  <a:pt x="165629" y="124354"/>
+                  <a:pt x="146050" y="123296"/>
+                  <a:pt x="111125" y="123825"/>
+                </a:cubicBezTo>
+                <a:cubicBezTo>
+                  <a:pt x="76200" y="124354"/>
+                  <a:pt x="38100" y="125677"/>
+                  <a:pt x="0" y="127000"/>
+                </a:cubicBezTo>
+              </a:path>
+            </a:pathLst>
+          </a:custGeom>
+          <a:noFill/>
+          <a:ln w="6350">
+            <a:prstDash val="dash"/>
+          </a:ln>
+        </p:spPr>
+        <p:style>
+          <a:lnRef idx="2">
+            <a:schemeClr val="accent1">
+              <a:shade val="15000"/>
+            </a:schemeClr>
+          </a:lnRef>
+          <a:fillRef idx="1">
+            <a:schemeClr val="accent1"/>
+          </a:fillRef>
+          <a:effectRef idx="0">
+            <a:schemeClr val="accent1"/>
+          </a:effectRef>
+          <a:fontRef idx="minor">
+            <a:schemeClr val="lt1"/>
+          </a:fontRef>
+        </p:style>
+        <p:txBody>
+          <a:bodyPr rtlCol="0" anchor="ctr"/>
+          <a:lstStyle/>
+          <a:p>
+            <a:pPr algn="ctr"/>
+            <a:endParaRPr lang="en-US"/>
+          </a:p>
+        </p:txBody>
+      </p:sp>
+      <p:sp>
+        <p:nvSpPr>
+          <p:cNvPr id="33" name="Freeform 32">
+            <a:extLst>
+              <a:ext uri="{FF2B5EF4-FFF2-40B4-BE49-F238E27FC236}">
+                <a16:creationId xmlns:a16="http://schemas.microsoft.com/office/drawing/2014/main" id="{2DF744D7-97F6-DAC0-91D3-44959F643590}"/>
+              </a:ext>
+            </a:extLst>
+          </p:cNvPr>
+          <p:cNvSpPr/>
+          <p:nvPr/>
+        </p:nvSpPr>
+        <p:spPr>
+          <a:xfrm>
+            <a:off x="3956050" y="3095625"/>
+            <a:ext cx="946150" cy="165405"/>
+          </a:xfrm>
+          <a:custGeom>
+            <a:avLst/>
+            <a:gdLst>
+              <a:gd name="connsiteX0" fmla="*/ 946150 w 946150"/>
+              <a:gd name="connsiteY0" fmla="*/ 0 h 165405"/>
+              <a:gd name="connsiteX1" fmla="*/ 869950 w 946150"/>
+              <a:gd name="connsiteY1" fmla="*/ 60325 h 165405"/>
+              <a:gd name="connsiteX2" fmla="*/ 784225 w 946150"/>
+              <a:gd name="connsiteY2" fmla="*/ 98425 h 165405"/>
+              <a:gd name="connsiteX3" fmla="*/ 663575 w 946150"/>
+              <a:gd name="connsiteY3" fmla="*/ 123825 h 165405"/>
+              <a:gd name="connsiteX4" fmla="*/ 495300 w 946150"/>
+              <a:gd name="connsiteY4" fmla="*/ 149225 h 165405"/>
+              <a:gd name="connsiteX5" fmla="*/ 368300 w 946150"/>
+              <a:gd name="connsiteY5" fmla="*/ 152400 h 165405"/>
+              <a:gd name="connsiteX6" fmla="*/ 241300 w 946150"/>
+              <a:gd name="connsiteY6" fmla="*/ 161925 h 165405"/>
+              <a:gd name="connsiteX7" fmla="*/ 133350 w 946150"/>
+              <a:gd name="connsiteY7" fmla="*/ 161925 h 165405"/>
+              <a:gd name="connsiteX8" fmla="*/ 50800 w 946150"/>
+              <a:gd name="connsiteY8" fmla="*/ 165100 h 165405"/>
+              <a:gd name="connsiteX9" fmla="*/ 0 w 946150"/>
+              <a:gd name="connsiteY9" fmla="*/ 165100 h 165405"/>
+            </a:gdLst>
+            <a:ahLst/>
+            <a:cxnLst>
+              <a:cxn ang="0">
+                <a:pos x="connsiteX0" y="connsiteY0"/>
+              </a:cxn>
+              <a:cxn ang="0">
+                <a:pos x="connsiteX1" y="connsiteY1"/>
+              </a:cxn>
+              <a:cxn ang="0">
+                <a:pos x="connsiteX2" y="connsiteY2"/>
+              </a:cxn>
+              <a:cxn ang="0">
+                <a:pos x="connsiteX3" y="connsiteY3"/>
+              </a:cxn>
+              <a:cxn ang="0">
+                <a:pos x="connsiteX4" y="connsiteY4"/>
+              </a:cxn>
+              <a:cxn ang="0">
+                <a:pos x="connsiteX5" y="connsiteY5"/>
+              </a:cxn>
+              <a:cxn ang="0">
+                <a:pos x="connsiteX6" y="connsiteY6"/>
+              </a:cxn>
+              <a:cxn ang="0">
+                <a:pos x="connsiteX7" y="connsiteY7"/>
+              </a:cxn>
+              <a:cxn ang="0">
+                <a:pos x="connsiteX8" y="connsiteY8"/>
+              </a:cxn>
+              <a:cxn ang="0">
+                <a:pos x="connsiteX9" y="connsiteY9"/>
+              </a:cxn>
+            </a:cxnLst>
+            <a:rect l="l" t="t" r="r" b="b"/>
+            <a:pathLst>
+              <a:path w="946150" h="165405">
+                <a:moveTo>
+                  <a:pt x="946150" y="0"/>
+                </a:moveTo>
+                <a:cubicBezTo>
+                  <a:pt x="921543" y="21960"/>
+                  <a:pt x="896937" y="43921"/>
+                  <a:pt x="869950" y="60325"/>
+                </a:cubicBezTo>
+                <a:cubicBezTo>
+                  <a:pt x="842963" y="76729"/>
+                  <a:pt x="818621" y="87842"/>
+                  <a:pt x="784225" y="98425"/>
+                </a:cubicBezTo>
+                <a:cubicBezTo>
+                  <a:pt x="749829" y="109008"/>
+                  <a:pt x="711729" y="115358"/>
+                  <a:pt x="663575" y="123825"/>
+                </a:cubicBezTo>
+                <a:cubicBezTo>
+                  <a:pt x="615421" y="132292"/>
+                  <a:pt x="544512" y="144463"/>
+                  <a:pt x="495300" y="149225"/>
+                </a:cubicBezTo>
+                <a:cubicBezTo>
+                  <a:pt x="446087" y="153988"/>
+                  <a:pt x="410633" y="150283"/>
+                  <a:pt x="368300" y="152400"/>
+                </a:cubicBezTo>
+                <a:cubicBezTo>
+                  <a:pt x="325967" y="154517"/>
+                  <a:pt x="280458" y="160338"/>
+                  <a:pt x="241300" y="161925"/>
+                </a:cubicBezTo>
+                <a:cubicBezTo>
+                  <a:pt x="202142" y="163512"/>
+                  <a:pt x="165100" y="161396"/>
+                  <a:pt x="133350" y="161925"/>
+                </a:cubicBezTo>
+                <a:cubicBezTo>
+                  <a:pt x="101600" y="162454"/>
+                  <a:pt x="73025" y="164571"/>
+                  <a:pt x="50800" y="165100"/>
+                </a:cubicBezTo>
+                <a:cubicBezTo>
+                  <a:pt x="28575" y="165629"/>
+                  <a:pt x="14287" y="165364"/>
+                  <a:pt x="0" y="165100"/>
+                </a:cubicBezTo>
+              </a:path>
+            </a:pathLst>
+          </a:custGeom>
+          <a:noFill/>
+          <a:ln w="6350">
+            <a:prstDash val="dash"/>
+          </a:ln>
+        </p:spPr>
+        <p:style>
+          <a:lnRef idx="2">
+            <a:schemeClr val="accent1">
+              <a:shade val="15000"/>
+            </a:schemeClr>
+          </a:lnRef>
+          <a:fillRef idx="1">
+            <a:schemeClr val="accent1"/>
+          </a:fillRef>
+          <a:effectRef idx="0">
+            <a:schemeClr val="accent1"/>
+          </a:effectRef>
+          <a:fontRef idx="minor">
+            <a:schemeClr val="lt1"/>
+          </a:fontRef>
+        </p:style>
+        <p:txBody>
+          <a:bodyPr rtlCol="0" anchor="ctr"/>
+          <a:lstStyle/>
+          <a:p>
+            <a:pPr algn="ctr"/>
+            <a:endParaRPr lang="en-US"/>
+          </a:p>
+        </p:txBody>
+      </p:sp>
+      <p:sp>
+        <p:nvSpPr>
+          <p:cNvPr id="34" name="Freeform 33">
+            <a:extLst>
+              <a:ext uri="{FF2B5EF4-FFF2-40B4-BE49-F238E27FC236}">
+                <a16:creationId xmlns:a16="http://schemas.microsoft.com/office/drawing/2014/main" id="{8A2D3360-8562-FC66-D87B-3552674CBD9B}"/>
+              </a:ext>
+            </a:extLst>
+          </p:cNvPr>
+          <p:cNvSpPr/>
+          <p:nvPr/>
+        </p:nvSpPr>
+        <p:spPr>
+          <a:xfrm>
+            <a:off x="3949700" y="2965450"/>
+            <a:ext cx="942975" cy="212725"/>
+          </a:xfrm>
+          <a:custGeom>
+            <a:avLst/>
+            <a:gdLst>
+              <a:gd name="connsiteX0" fmla="*/ 942975 w 942975"/>
+              <a:gd name="connsiteY0" fmla="*/ 0 h 212725"/>
+              <a:gd name="connsiteX1" fmla="*/ 882650 w 942975"/>
+              <a:gd name="connsiteY1" fmla="*/ 69850 h 212725"/>
+              <a:gd name="connsiteX2" fmla="*/ 784225 w 942975"/>
+              <a:gd name="connsiteY2" fmla="*/ 139700 h 212725"/>
+              <a:gd name="connsiteX3" fmla="*/ 657225 w 942975"/>
+              <a:gd name="connsiteY3" fmla="*/ 177800 h 212725"/>
+              <a:gd name="connsiteX4" fmla="*/ 549275 w 942975"/>
+              <a:gd name="connsiteY4" fmla="*/ 193675 h 212725"/>
+              <a:gd name="connsiteX5" fmla="*/ 438150 w 942975"/>
+              <a:gd name="connsiteY5" fmla="*/ 203200 h 212725"/>
+              <a:gd name="connsiteX6" fmla="*/ 307975 w 942975"/>
+              <a:gd name="connsiteY6" fmla="*/ 206375 h 212725"/>
+              <a:gd name="connsiteX7" fmla="*/ 127000 w 942975"/>
+              <a:gd name="connsiteY7" fmla="*/ 212725 h 212725"/>
+              <a:gd name="connsiteX8" fmla="*/ 44450 w 942975"/>
+              <a:gd name="connsiteY8" fmla="*/ 206375 h 212725"/>
+              <a:gd name="connsiteX9" fmla="*/ 0 w 942975"/>
+              <a:gd name="connsiteY9" fmla="*/ 206375 h 212725"/>
+            </a:gdLst>
+            <a:ahLst/>
+            <a:cxnLst>
+              <a:cxn ang="0">
+                <a:pos x="connsiteX0" y="connsiteY0"/>
+              </a:cxn>
+              <a:cxn ang="0">
+                <a:pos x="connsiteX1" y="connsiteY1"/>
+              </a:cxn>
+              <a:cxn ang="0">
+                <a:pos x="connsiteX2" y="connsiteY2"/>
+              </a:cxn>
+              <a:cxn ang="0">
+                <a:pos x="connsiteX3" y="connsiteY3"/>
+              </a:cxn>
+              <a:cxn ang="0">
+                <a:pos x="connsiteX4" y="connsiteY4"/>
+              </a:cxn>
+              <a:cxn ang="0">
+                <a:pos x="connsiteX5" y="connsiteY5"/>
+              </a:cxn>
+              <a:cxn ang="0">
+                <a:pos x="connsiteX6" y="connsiteY6"/>
+              </a:cxn>
+              <a:cxn ang="0">
+                <a:pos x="connsiteX7" y="connsiteY7"/>
+              </a:cxn>
+              <a:cxn ang="0">
+                <a:pos x="connsiteX8" y="connsiteY8"/>
+              </a:cxn>
+              <a:cxn ang="0">
+                <a:pos x="connsiteX9" y="connsiteY9"/>
+              </a:cxn>
+            </a:cxnLst>
+            <a:rect l="l" t="t" r="r" b="b"/>
+            <a:pathLst>
+              <a:path w="942975" h="212725">
+                <a:moveTo>
+                  <a:pt x="942975" y="0"/>
+                </a:moveTo>
+                <a:cubicBezTo>
+                  <a:pt x="926041" y="23283"/>
+                  <a:pt x="909108" y="46567"/>
+                  <a:pt x="882650" y="69850"/>
+                </a:cubicBezTo>
+                <a:cubicBezTo>
+                  <a:pt x="856192" y="93133"/>
+                  <a:pt x="821796" y="121708"/>
+                  <a:pt x="784225" y="139700"/>
+                </a:cubicBezTo>
+                <a:cubicBezTo>
+                  <a:pt x="746654" y="157692"/>
+                  <a:pt x="696383" y="168804"/>
+                  <a:pt x="657225" y="177800"/>
+                </a:cubicBezTo>
+                <a:cubicBezTo>
+                  <a:pt x="618067" y="186796"/>
+                  <a:pt x="585787" y="189442"/>
+                  <a:pt x="549275" y="193675"/>
+                </a:cubicBezTo>
+                <a:cubicBezTo>
+                  <a:pt x="512762" y="197908"/>
+                  <a:pt x="478367" y="201083"/>
+                  <a:pt x="438150" y="203200"/>
+                </a:cubicBezTo>
+                <a:cubicBezTo>
+                  <a:pt x="397933" y="205317"/>
+                  <a:pt x="307975" y="206375"/>
+                  <a:pt x="307975" y="206375"/>
+                </a:cubicBezTo>
+                <a:cubicBezTo>
+                  <a:pt x="256117" y="207963"/>
+                  <a:pt x="170921" y="212725"/>
+                  <a:pt x="127000" y="212725"/>
+                </a:cubicBezTo>
+                <a:cubicBezTo>
+                  <a:pt x="83079" y="212725"/>
+                  <a:pt x="65617" y="207433"/>
+                  <a:pt x="44450" y="206375"/>
+                </a:cubicBezTo>
+                <a:cubicBezTo>
+                  <a:pt x="23283" y="205317"/>
+                  <a:pt x="11641" y="205846"/>
+                  <a:pt x="0" y="206375"/>
+                </a:cubicBezTo>
+              </a:path>
+            </a:pathLst>
+          </a:custGeom>
+          <a:noFill/>
+          <a:ln w="6350">
+            <a:prstDash val="dash"/>
+          </a:ln>
+        </p:spPr>
+        <p:style>
+          <a:lnRef idx="2">
+            <a:schemeClr val="accent1">
+              <a:shade val="15000"/>
+            </a:schemeClr>
+          </a:lnRef>
+          <a:fillRef idx="1">
+            <a:schemeClr val="accent1"/>
+          </a:fillRef>
+          <a:effectRef idx="0">
+            <a:schemeClr val="accent1"/>
+          </a:effectRef>
+          <a:fontRef idx="minor">
+            <a:schemeClr val="lt1"/>
+          </a:fontRef>
+        </p:style>
+        <p:txBody>
+          <a:bodyPr rtlCol="0" anchor="ctr"/>
+          <a:lstStyle/>
+          <a:p>
+            <a:pPr algn="ctr"/>
+            <a:endParaRPr lang="en-US"/>
+          </a:p>
+        </p:txBody>
+      </p:sp>
+      <p:sp>
+        <p:nvSpPr>
+          <p:cNvPr id="35" name="Freeform 34">
+            <a:extLst>
+              <a:ext uri="{FF2B5EF4-FFF2-40B4-BE49-F238E27FC236}">
+                <a16:creationId xmlns:a16="http://schemas.microsoft.com/office/drawing/2014/main" id="{6A7C44FA-FEE8-C917-6306-0DE1BE17A31F}"/>
+              </a:ext>
+            </a:extLst>
+          </p:cNvPr>
+          <p:cNvSpPr/>
+          <p:nvPr/>
+        </p:nvSpPr>
+        <p:spPr>
+          <a:xfrm>
+            <a:off x="3957090" y="2994899"/>
+            <a:ext cx="812446" cy="101954"/>
+          </a:xfrm>
+          <a:custGeom>
+            <a:avLst/>
+            <a:gdLst>
+              <a:gd name="connsiteX0" fmla="*/ 812446 w 812446"/>
+              <a:gd name="connsiteY0" fmla="*/ 0 h 101954"/>
+              <a:gd name="connsiteX1" fmla="*/ 720050 w 812446"/>
+              <a:gd name="connsiteY1" fmla="*/ 60535 h 101954"/>
+              <a:gd name="connsiteX2" fmla="*/ 624468 w 812446"/>
+              <a:gd name="connsiteY2" fmla="*/ 79652 h 101954"/>
+              <a:gd name="connsiteX3" fmla="*/ 506584 w 812446"/>
+              <a:gd name="connsiteY3" fmla="*/ 92396 h 101954"/>
+              <a:gd name="connsiteX4" fmla="*/ 375955 w 812446"/>
+              <a:gd name="connsiteY4" fmla="*/ 98768 h 101954"/>
+              <a:gd name="connsiteX5" fmla="*/ 251699 w 812446"/>
+              <a:gd name="connsiteY5" fmla="*/ 101954 h 101954"/>
+              <a:gd name="connsiteX6" fmla="*/ 152931 w 812446"/>
+              <a:gd name="connsiteY6" fmla="*/ 98768 h 101954"/>
+              <a:gd name="connsiteX7" fmla="*/ 70093 w 812446"/>
+              <a:gd name="connsiteY7" fmla="*/ 95582 h 101954"/>
+              <a:gd name="connsiteX8" fmla="*/ 0 w 812446"/>
+              <a:gd name="connsiteY8" fmla="*/ 89210 h 101954"/>
+            </a:gdLst>
+            <a:ahLst/>
+            <a:cxnLst>
+              <a:cxn ang="0">
+                <a:pos x="connsiteX0" y="connsiteY0"/>
+              </a:cxn>
+              <a:cxn ang="0">
+                <a:pos x="connsiteX1" y="connsiteY1"/>
+              </a:cxn>
+              <a:cxn ang="0">
+                <a:pos x="connsiteX2" y="connsiteY2"/>
+              </a:cxn>
+              <a:cxn ang="0">
+                <a:pos x="connsiteX3" y="connsiteY3"/>
+              </a:cxn>
+              <a:cxn ang="0">
+                <a:pos x="connsiteX4" y="connsiteY4"/>
+              </a:cxn>
+              <a:cxn ang="0">
+                <a:pos x="connsiteX5" y="connsiteY5"/>
+              </a:cxn>
+              <a:cxn ang="0">
+                <a:pos x="connsiteX6" y="connsiteY6"/>
+              </a:cxn>
+              <a:cxn ang="0">
+                <a:pos x="connsiteX7" y="connsiteY7"/>
+              </a:cxn>
+              <a:cxn ang="0">
+                <a:pos x="connsiteX8" y="connsiteY8"/>
+              </a:cxn>
+            </a:cxnLst>
+            <a:rect l="l" t="t" r="r" b="b"/>
+            <a:pathLst>
+              <a:path w="812446" h="101954">
+                <a:moveTo>
+                  <a:pt x="812446" y="0"/>
+                </a:moveTo>
+                <a:cubicBezTo>
+                  <a:pt x="781913" y="23630"/>
+                  <a:pt x="751380" y="47260"/>
+                  <a:pt x="720050" y="60535"/>
+                </a:cubicBezTo>
+                <a:cubicBezTo>
+                  <a:pt x="688720" y="73810"/>
+                  <a:pt x="660046" y="74342"/>
+                  <a:pt x="624468" y="79652"/>
+                </a:cubicBezTo>
+                <a:cubicBezTo>
+                  <a:pt x="588890" y="84962"/>
+                  <a:pt x="548003" y="89210"/>
+                  <a:pt x="506584" y="92396"/>
+                </a:cubicBezTo>
+                <a:cubicBezTo>
+                  <a:pt x="465165" y="95582"/>
+                  <a:pt x="418436" y="97175"/>
+                  <a:pt x="375955" y="98768"/>
+                </a:cubicBezTo>
+                <a:cubicBezTo>
+                  <a:pt x="333474" y="100361"/>
+                  <a:pt x="288870" y="101954"/>
+                  <a:pt x="251699" y="101954"/>
+                </a:cubicBezTo>
+                <a:cubicBezTo>
+                  <a:pt x="214528" y="101954"/>
+                  <a:pt x="152931" y="98768"/>
+                  <a:pt x="152931" y="98768"/>
+                </a:cubicBezTo>
+                <a:cubicBezTo>
+                  <a:pt x="122663" y="97706"/>
+                  <a:pt x="95581" y="97175"/>
+                  <a:pt x="70093" y="95582"/>
+                </a:cubicBezTo>
+                <a:cubicBezTo>
+                  <a:pt x="44604" y="93989"/>
+                  <a:pt x="22302" y="91599"/>
+                  <a:pt x="0" y="89210"/>
+                </a:cubicBezTo>
+              </a:path>
+            </a:pathLst>
+          </a:custGeom>
+          <a:noFill/>
+          <a:ln w="6350">
+            <a:prstDash val="dash"/>
+          </a:ln>
+        </p:spPr>
+        <p:style>
+          <a:lnRef idx="2">
+            <a:schemeClr val="accent1">
+              <a:shade val="15000"/>
+            </a:schemeClr>
+          </a:lnRef>
+          <a:fillRef idx="1">
+            <a:schemeClr val="accent1"/>
+          </a:fillRef>
+          <a:effectRef idx="0">
+            <a:schemeClr val="accent1"/>
+          </a:effectRef>
+          <a:fontRef idx="minor">
+            <a:schemeClr val="lt1"/>
+          </a:fontRef>
+        </p:style>
+        <p:txBody>
+          <a:bodyPr rtlCol="0" anchor="ctr"/>
+          <a:lstStyle/>
+          <a:p>
+            <a:pPr algn="ctr"/>
+            <a:endParaRPr lang="en-US"/>
+          </a:p>
+        </p:txBody>
+      </p:sp>
+      <p:sp>
+        <p:nvSpPr>
+          <p:cNvPr id="36" name="Freeform 35">
+            <a:extLst>
+              <a:ext uri="{FF2B5EF4-FFF2-40B4-BE49-F238E27FC236}">
+                <a16:creationId xmlns:a16="http://schemas.microsoft.com/office/drawing/2014/main" id="{0B2B6508-62B7-9C40-D4EB-D7BCA58EDA0B}"/>
+              </a:ext>
+            </a:extLst>
+          </p:cNvPr>
+          <p:cNvSpPr/>
+          <p:nvPr/>
+        </p:nvSpPr>
+        <p:spPr>
+          <a:xfrm>
+            <a:off x="3950718" y="2490557"/>
+            <a:ext cx="943074" cy="58293"/>
+          </a:xfrm>
+          <a:custGeom>
+            <a:avLst/>
+            <a:gdLst>
+              <a:gd name="connsiteX0" fmla="*/ 943074 w 943074"/>
+              <a:gd name="connsiteY0" fmla="*/ 944 h 58293"/>
+              <a:gd name="connsiteX1" fmla="*/ 796515 w 943074"/>
+              <a:gd name="connsiteY1" fmla="*/ 944 h 58293"/>
+              <a:gd name="connsiteX2" fmla="*/ 662701 w 943074"/>
+              <a:gd name="connsiteY2" fmla="*/ 944 h 58293"/>
+              <a:gd name="connsiteX3" fmla="*/ 468351 w 943074"/>
+              <a:gd name="connsiteY3" fmla="*/ 13688 h 58293"/>
+              <a:gd name="connsiteX4" fmla="*/ 299490 w 943074"/>
+              <a:gd name="connsiteY4" fmla="*/ 32805 h 58293"/>
+              <a:gd name="connsiteX5" fmla="*/ 165675 w 943074"/>
+              <a:gd name="connsiteY5" fmla="*/ 48735 h 58293"/>
+              <a:gd name="connsiteX6" fmla="*/ 76465 w 943074"/>
+              <a:gd name="connsiteY6" fmla="*/ 55107 h 58293"/>
+              <a:gd name="connsiteX7" fmla="*/ 0 w 943074"/>
+              <a:gd name="connsiteY7" fmla="*/ 58293 h 58293"/>
+            </a:gdLst>
+            <a:ahLst/>
+            <a:cxnLst>
+              <a:cxn ang="0">
+                <a:pos x="connsiteX0" y="connsiteY0"/>
+              </a:cxn>
+              <a:cxn ang="0">
+                <a:pos x="connsiteX1" y="connsiteY1"/>
+              </a:cxn>
+              <a:cxn ang="0">
+                <a:pos x="connsiteX2" y="connsiteY2"/>
+              </a:cxn>
+              <a:cxn ang="0">
+                <a:pos x="connsiteX3" y="connsiteY3"/>
+              </a:cxn>
+              <a:cxn ang="0">
+                <a:pos x="connsiteX4" y="connsiteY4"/>
+              </a:cxn>
+              <a:cxn ang="0">
+                <a:pos x="connsiteX5" y="connsiteY5"/>
+              </a:cxn>
+              <a:cxn ang="0">
+                <a:pos x="connsiteX6" y="connsiteY6"/>
+              </a:cxn>
+              <a:cxn ang="0">
+                <a:pos x="connsiteX7" y="connsiteY7"/>
+              </a:cxn>
+            </a:cxnLst>
+            <a:rect l="l" t="t" r="r" b="b"/>
+            <a:pathLst>
+              <a:path w="943074" h="58293">
+                <a:moveTo>
+                  <a:pt x="943074" y="944"/>
+                </a:moveTo>
+                <a:lnTo>
+                  <a:pt x="796515" y="944"/>
+                </a:lnTo>
+                <a:cubicBezTo>
+                  <a:pt x="749786" y="944"/>
+                  <a:pt x="717395" y="-1180"/>
+                  <a:pt x="662701" y="944"/>
+                </a:cubicBezTo>
+                <a:cubicBezTo>
+                  <a:pt x="608007" y="3068"/>
+                  <a:pt x="528886" y="8378"/>
+                  <a:pt x="468351" y="13688"/>
+                </a:cubicBezTo>
+                <a:cubicBezTo>
+                  <a:pt x="407816" y="18998"/>
+                  <a:pt x="299490" y="32805"/>
+                  <a:pt x="299490" y="32805"/>
+                </a:cubicBezTo>
+                <a:lnTo>
+                  <a:pt x="165675" y="48735"/>
+                </a:lnTo>
+                <a:cubicBezTo>
+                  <a:pt x="128504" y="52452"/>
+                  <a:pt x="104077" y="53514"/>
+                  <a:pt x="76465" y="55107"/>
+                </a:cubicBezTo>
+                <a:cubicBezTo>
+                  <a:pt x="48853" y="56700"/>
+                  <a:pt x="24426" y="57496"/>
+                  <a:pt x="0" y="58293"/>
+                </a:cubicBezTo>
+              </a:path>
+            </a:pathLst>
+          </a:custGeom>
+          <a:noFill/>
+          <a:ln w="6350">
+            <a:prstDash val="dash"/>
+          </a:ln>
+        </p:spPr>
+        <p:style>
+          <a:lnRef idx="2">
+            <a:schemeClr val="accent1">
+              <a:shade val="15000"/>
+            </a:schemeClr>
+          </a:lnRef>
+          <a:fillRef idx="1">
+            <a:schemeClr val="accent1"/>
+          </a:fillRef>
+          <a:effectRef idx="0">
+            <a:schemeClr val="accent1"/>
+          </a:effectRef>
+          <a:fontRef idx="minor">
+            <a:schemeClr val="lt1"/>
+          </a:fontRef>
+        </p:style>
+        <p:txBody>
+          <a:bodyPr rtlCol="0" anchor="ctr"/>
+          <a:lstStyle/>
+          <a:p>
+            <a:pPr algn="ctr"/>
+            <a:endParaRPr lang="en-US"/>
+          </a:p>
+        </p:txBody>
+      </p:sp>
+      <p:sp>
+        <p:nvSpPr>
+          <p:cNvPr id="37" name="Freeform 36">
+            <a:extLst>
+              <a:ext uri="{FF2B5EF4-FFF2-40B4-BE49-F238E27FC236}">
+                <a16:creationId xmlns:a16="http://schemas.microsoft.com/office/drawing/2014/main" id="{7C8BBFE6-992E-DED8-CFE0-26485ADD7EBE}"/>
+              </a:ext>
+            </a:extLst>
+          </p:cNvPr>
+          <p:cNvSpPr/>
+          <p:nvPr/>
+        </p:nvSpPr>
+        <p:spPr>
+          <a:xfrm>
+            <a:off x="3966648" y="2577466"/>
+            <a:ext cx="933516" cy="66966"/>
+          </a:xfrm>
+          <a:custGeom>
+            <a:avLst/>
+            <a:gdLst>
+              <a:gd name="connsiteX0" fmla="*/ 0 w 933516"/>
+              <a:gd name="connsiteY0" fmla="*/ 66966 h 66966"/>
+              <a:gd name="connsiteX1" fmla="*/ 108326 w 933516"/>
+              <a:gd name="connsiteY1" fmla="*/ 60594 h 66966"/>
+              <a:gd name="connsiteX2" fmla="*/ 219838 w 933516"/>
+              <a:gd name="connsiteY2" fmla="*/ 47850 h 66966"/>
+              <a:gd name="connsiteX3" fmla="*/ 366397 w 933516"/>
+              <a:gd name="connsiteY3" fmla="*/ 25547 h 66966"/>
+              <a:gd name="connsiteX4" fmla="*/ 471537 w 933516"/>
+              <a:gd name="connsiteY4" fmla="*/ 12803 h 66966"/>
+              <a:gd name="connsiteX5" fmla="*/ 557561 w 933516"/>
+              <a:gd name="connsiteY5" fmla="*/ 3245 h 66966"/>
+              <a:gd name="connsiteX6" fmla="*/ 627654 w 933516"/>
+              <a:gd name="connsiteY6" fmla="*/ 6431 h 66966"/>
+              <a:gd name="connsiteX7" fmla="*/ 761469 w 933516"/>
+              <a:gd name="connsiteY7" fmla="*/ 59 h 66966"/>
+              <a:gd name="connsiteX8" fmla="*/ 825190 w 933516"/>
+              <a:gd name="connsiteY8" fmla="*/ 3245 h 66966"/>
+              <a:gd name="connsiteX9" fmla="*/ 857051 w 933516"/>
+              <a:gd name="connsiteY9" fmla="*/ 3245 h 66966"/>
+              <a:gd name="connsiteX10" fmla="*/ 933516 w 933516"/>
+              <a:gd name="connsiteY10" fmla="*/ 59 h 66966"/>
+            </a:gdLst>
+            <a:ahLst/>
+            <a:cxnLst>
+              <a:cxn ang="0">
+                <a:pos x="connsiteX0" y="connsiteY0"/>
+              </a:cxn>
+              <a:cxn ang="0">
+                <a:pos x="connsiteX1" y="connsiteY1"/>
+              </a:cxn>
+              <a:cxn ang="0">
+                <a:pos x="connsiteX2" y="connsiteY2"/>
+              </a:cxn>
+              <a:cxn ang="0">
+                <a:pos x="connsiteX3" y="connsiteY3"/>
+              </a:cxn>
+              <a:cxn ang="0">
+                <a:pos x="connsiteX4" y="connsiteY4"/>
+              </a:cxn>
+              <a:cxn ang="0">
+                <a:pos x="connsiteX5" y="connsiteY5"/>
+              </a:cxn>
+              <a:cxn ang="0">
+                <a:pos x="connsiteX6" y="connsiteY6"/>
+              </a:cxn>
+              <a:cxn ang="0">
+                <a:pos x="connsiteX7" y="connsiteY7"/>
+              </a:cxn>
+              <a:cxn ang="0">
+                <a:pos x="connsiteX8" y="connsiteY8"/>
+              </a:cxn>
+              <a:cxn ang="0">
+                <a:pos x="connsiteX9" y="connsiteY9"/>
+              </a:cxn>
+              <a:cxn ang="0">
+                <a:pos x="connsiteX10" y="connsiteY10"/>
+              </a:cxn>
+            </a:cxnLst>
+            <a:rect l="l" t="t" r="r" b="b"/>
+            <a:pathLst>
+              <a:path w="933516" h="66966">
+                <a:moveTo>
+                  <a:pt x="0" y="66966"/>
+                </a:moveTo>
+                <a:cubicBezTo>
+                  <a:pt x="35843" y="65373"/>
+                  <a:pt x="71686" y="63780"/>
+                  <a:pt x="108326" y="60594"/>
+                </a:cubicBezTo>
+                <a:cubicBezTo>
+                  <a:pt x="144966" y="57408"/>
+                  <a:pt x="176826" y="53691"/>
+                  <a:pt x="219838" y="47850"/>
+                </a:cubicBezTo>
+                <a:cubicBezTo>
+                  <a:pt x="262850" y="42009"/>
+                  <a:pt x="324447" y="31388"/>
+                  <a:pt x="366397" y="25547"/>
+                </a:cubicBezTo>
+                <a:cubicBezTo>
+                  <a:pt x="408347" y="19706"/>
+                  <a:pt x="471537" y="12803"/>
+                  <a:pt x="471537" y="12803"/>
+                </a:cubicBezTo>
+                <a:cubicBezTo>
+                  <a:pt x="503398" y="9086"/>
+                  <a:pt x="531542" y="4307"/>
+                  <a:pt x="557561" y="3245"/>
+                </a:cubicBezTo>
+                <a:cubicBezTo>
+                  <a:pt x="583580" y="2183"/>
+                  <a:pt x="593669" y="6962"/>
+                  <a:pt x="627654" y="6431"/>
+                </a:cubicBezTo>
+                <a:cubicBezTo>
+                  <a:pt x="661639" y="5900"/>
+                  <a:pt x="728546" y="590"/>
+                  <a:pt x="761469" y="59"/>
+                </a:cubicBezTo>
+                <a:cubicBezTo>
+                  <a:pt x="794392" y="-472"/>
+                  <a:pt x="809260" y="2714"/>
+                  <a:pt x="825190" y="3245"/>
+                </a:cubicBezTo>
+                <a:cubicBezTo>
+                  <a:pt x="841120" y="3776"/>
+                  <a:pt x="838997" y="3776"/>
+                  <a:pt x="857051" y="3245"/>
+                </a:cubicBezTo>
+                <a:cubicBezTo>
+                  <a:pt x="875105" y="2714"/>
+                  <a:pt x="904310" y="1386"/>
+                  <a:pt x="933516" y="59"/>
+                </a:cubicBezTo>
+              </a:path>
+            </a:pathLst>
+          </a:custGeom>
+          <a:noFill/>
+          <a:ln w="6350">
+            <a:prstDash val="dash"/>
+          </a:ln>
+        </p:spPr>
+        <p:style>
+          <a:lnRef idx="2">
+            <a:schemeClr val="accent1">
+              <a:shade val="15000"/>
+            </a:schemeClr>
+          </a:lnRef>
+          <a:fillRef idx="1">
+            <a:schemeClr val="accent1"/>
+          </a:fillRef>
+          <a:effectRef idx="0">
+            <a:schemeClr val="accent1"/>
+          </a:effectRef>
+          <a:fontRef idx="minor">
+            <a:schemeClr val="lt1"/>
+          </a:fontRef>
+        </p:style>
+        <p:txBody>
+          <a:bodyPr rtlCol="0" anchor="ctr"/>
+          <a:lstStyle/>
+          <a:p>
+            <a:pPr algn="ctr"/>
+            <a:endParaRPr lang="en-US"/>
+          </a:p>
+        </p:txBody>
+      </p:sp>
+      <p:sp>
+        <p:nvSpPr>
+          <p:cNvPr id="38" name="Freeform 37">
+            <a:extLst>
+              <a:ext uri="{FF2B5EF4-FFF2-40B4-BE49-F238E27FC236}">
+                <a16:creationId xmlns:a16="http://schemas.microsoft.com/office/drawing/2014/main" id="{7D4140A2-1261-0139-1DF4-FED8A5E495D7}"/>
+              </a:ext>
+            </a:extLst>
+          </p:cNvPr>
+          <p:cNvSpPr/>
+          <p:nvPr/>
+        </p:nvSpPr>
+        <p:spPr>
+          <a:xfrm>
+            <a:off x="3950718" y="2660362"/>
+            <a:ext cx="949446" cy="92396"/>
+          </a:xfrm>
+          <a:custGeom>
+            <a:avLst/>
+            <a:gdLst>
+              <a:gd name="connsiteX0" fmla="*/ 949446 w 949446"/>
+              <a:gd name="connsiteY0" fmla="*/ 0 h 92396"/>
+              <a:gd name="connsiteX1" fmla="*/ 751911 w 949446"/>
+              <a:gd name="connsiteY1" fmla="*/ 3186 h 92396"/>
+              <a:gd name="connsiteX2" fmla="*/ 649957 w 949446"/>
+              <a:gd name="connsiteY2" fmla="*/ 6372 h 92396"/>
+              <a:gd name="connsiteX3" fmla="*/ 541630 w 949446"/>
+              <a:gd name="connsiteY3" fmla="*/ 15931 h 92396"/>
+              <a:gd name="connsiteX4" fmla="*/ 369583 w 949446"/>
+              <a:gd name="connsiteY4" fmla="*/ 38233 h 92396"/>
+              <a:gd name="connsiteX5" fmla="*/ 264443 w 949446"/>
+              <a:gd name="connsiteY5" fmla="*/ 57349 h 92396"/>
+              <a:gd name="connsiteX6" fmla="*/ 165675 w 949446"/>
+              <a:gd name="connsiteY6" fmla="*/ 70094 h 92396"/>
+              <a:gd name="connsiteX7" fmla="*/ 41419 w 949446"/>
+              <a:gd name="connsiteY7" fmla="*/ 86024 h 92396"/>
+              <a:gd name="connsiteX8" fmla="*/ 0 w 949446"/>
+              <a:gd name="connsiteY8" fmla="*/ 92396 h 92396"/>
+            </a:gdLst>
+            <a:ahLst/>
+            <a:cxnLst>
+              <a:cxn ang="0">
+                <a:pos x="connsiteX0" y="connsiteY0"/>
+              </a:cxn>
+              <a:cxn ang="0">
+                <a:pos x="connsiteX1" y="connsiteY1"/>
+              </a:cxn>
+              <a:cxn ang="0">
+                <a:pos x="connsiteX2" y="connsiteY2"/>
+              </a:cxn>
+              <a:cxn ang="0">
+                <a:pos x="connsiteX3" y="connsiteY3"/>
+              </a:cxn>
+              <a:cxn ang="0">
+                <a:pos x="connsiteX4" y="connsiteY4"/>
+              </a:cxn>
+              <a:cxn ang="0">
+                <a:pos x="connsiteX5" y="connsiteY5"/>
+              </a:cxn>
+              <a:cxn ang="0">
+                <a:pos x="connsiteX6" y="connsiteY6"/>
+              </a:cxn>
+              <a:cxn ang="0">
+                <a:pos x="connsiteX7" y="connsiteY7"/>
+              </a:cxn>
+              <a:cxn ang="0">
+                <a:pos x="connsiteX8" y="connsiteY8"/>
+              </a:cxn>
+            </a:cxnLst>
+            <a:rect l="l" t="t" r="r" b="b"/>
+            <a:pathLst>
+              <a:path w="949446" h="92396">
+                <a:moveTo>
+                  <a:pt x="949446" y="0"/>
+                </a:moveTo>
+                <a:lnTo>
+                  <a:pt x="751911" y="3186"/>
+                </a:lnTo>
+                <a:cubicBezTo>
+                  <a:pt x="701996" y="4248"/>
+                  <a:pt x="685004" y="4248"/>
+                  <a:pt x="649957" y="6372"/>
+                </a:cubicBezTo>
+                <a:cubicBezTo>
+                  <a:pt x="614910" y="8496"/>
+                  <a:pt x="588359" y="10621"/>
+                  <a:pt x="541630" y="15931"/>
+                </a:cubicBezTo>
+                <a:cubicBezTo>
+                  <a:pt x="494901" y="21241"/>
+                  <a:pt x="415781" y="31330"/>
+                  <a:pt x="369583" y="38233"/>
+                </a:cubicBezTo>
+                <a:cubicBezTo>
+                  <a:pt x="323385" y="45136"/>
+                  <a:pt x="298428" y="52039"/>
+                  <a:pt x="264443" y="57349"/>
+                </a:cubicBezTo>
+                <a:cubicBezTo>
+                  <a:pt x="230458" y="62659"/>
+                  <a:pt x="165675" y="70094"/>
+                  <a:pt x="165675" y="70094"/>
+                </a:cubicBezTo>
+                <a:lnTo>
+                  <a:pt x="41419" y="86024"/>
+                </a:lnTo>
+                <a:cubicBezTo>
+                  <a:pt x="13807" y="89741"/>
+                  <a:pt x="6903" y="91068"/>
+                  <a:pt x="0" y="92396"/>
+                </a:cubicBezTo>
+              </a:path>
+            </a:pathLst>
+          </a:custGeom>
+          <a:noFill/>
+          <a:ln w="6350">
+            <a:prstDash val="dash"/>
+          </a:ln>
+        </p:spPr>
+        <p:style>
+          <a:lnRef idx="2">
+            <a:schemeClr val="accent1">
+              <a:shade val="15000"/>
+            </a:schemeClr>
+          </a:lnRef>
+          <a:fillRef idx="1">
+            <a:schemeClr val="accent1"/>
+          </a:fillRef>
+          <a:effectRef idx="0">
+            <a:schemeClr val="accent1"/>
+          </a:effectRef>
+          <a:fontRef idx="minor">
+            <a:schemeClr val="lt1"/>
+          </a:fontRef>
+        </p:style>
+        <p:txBody>
+          <a:bodyPr rtlCol="0" anchor="ctr"/>
+          <a:lstStyle/>
+          <a:p>
+            <a:pPr algn="ctr"/>
+            <a:endParaRPr lang="en-US"/>
+          </a:p>
+        </p:txBody>
+      </p:sp>
+      <p:sp>
+        <p:nvSpPr>
+          <p:cNvPr id="39" name="Freeform 38">
+            <a:extLst>
+              <a:ext uri="{FF2B5EF4-FFF2-40B4-BE49-F238E27FC236}">
+                <a16:creationId xmlns:a16="http://schemas.microsoft.com/office/drawing/2014/main" id="{7B2C3690-7656-083F-A69C-74BA33A845FD}"/>
+              </a:ext>
+            </a:extLst>
+          </p:cNvPr>
+          <p:cNvSpPr/>
+          <p:nvPr/>
+        </p:nvSpPr>
+        <p:spPr>
+          <a:xfrm>
+            <a:off x="3957090" y="2743200"/>
+            <a:ext cx="939888" cy="121070"/>
+          </a:xfrm>
+          <a:custGeom>
+            <a:avLst/>
+            <a:gdLst>
+              <a:gd name="connsiteX0" fmla="*/ 939888 w 939888"/>
+              <a:gd name="connsiteY0" fmla="*/ 0 h 121070"/>
+              <a:gd name="connsiteX1" fmla="*/ 812446 w 939888"/>
+              <a:gd name="connsiteY1" fmla="*/ 3186 h 121070"/>
+              <a:gd name="connsiteX2" fmla="*/ 704120 w 939888"/>
+              <a:gd name="connsiteY2" fmla="*/ 15930 h 121070"/>
+              <a:gd name="connsiteX3" fmla="*/ 560747 w 939888"/>
+              <a:gd name="connsiteY3" fmla="*/ 28675 h 121070"/>
+              <a:gd name="connsiteX4" fmla="*/ 455607 w 939888"/>
+              <a:gd name="connsiteY4" fmla="*/ 44605 h 121070"/>
+              <a:gd name="connsiteX5" fmla="*/ 328164 w 939888"/>
+              <a:gd name="connsiteY5" fmla="*/ 66907 h 121070"/>
+              <a:gd name="connsiteX6" fmla="*/ 229396 w 939888"/>
+              <a:gd name="connsiteY6" fmla="*/ 86024 h 121070"/>
+              <a:gd name="connsiteX7" fmla="*/ 137001 w 939888"/>
+              <a:gd name="connsiteY7" fmla="*/ 101954 h 121070"/>
+              <a:gd name="connsiteX8" fmla="*/ 57349 w 939888"/>
+              <a:gd name="connsiteY8" fmla="*/ 111512 h 121070"/>
+              <a:gd name="connsiteX9" fmla="*/ 0 w 939888"/>
+              <a:gd name="connsiteY9" fmla="*/ 121070 h 121070"/>
+            </a:gdLst>
+            <a:ahLst/>
+            <a:cxnLst>
+              <a:cxn ang="0">
+                <a:pos x="connsiteX0" y="connsiteY0"/>
+              </a:cxn>
+              <a:cxn ang="0">
+                <a:pos x="connsiteX1" y="connsiteY1"/>
+              </a:cxn>
+              <a:cxn ang="0">
+                <a:pos x="connsiteX2" y="connsiteY2"/>
+              </a:cxn>
+              <a:cxn ang="0">
+                <a:pos x="connsiteX3" y="connsiteY3"/>
+              </a:cxn>
+              <a:cxn ang="0">
+                <a:pos x="connsiteX4" y="connsiteY4"/>
+              </a:cxn>
+              <a:cxn ang="0">
+                <a:pos x="connsiteX5" y="connsiteY5"/>
+              </a:cxn>
+              <a:cxn ang="0">
+                <a:pos x="connsiteX6" y="connsiteY6"/>
+              </a:cxn>
+              <a:cxn ang="0">
+                <a:pos x="connsiteX7" y="connsiteY7"/>
+              </a:cxn>
+              <a:cxn ang="0">
+                <a:pos x="connsiteX8" y="connsiteY8"/>
+              </a:cxn>
+              <a:cxn ang="0">
+                <a:pos x="connsiteX9" y="connsiteY9"/>
+              </a:cxn>
+            </a:cxnLst>
+            <a:rect l="l" t="t" r="r" b="b"/>
+            <a:pathLst>
+              <a:path w="939888" h="121070">
+                <a:moveTo>
+                  <a:pt x="939888" y="0"/>
+                </a:moveTo>
+                <a:cubicBezTo>
+                  <a:pt x="895814" y="265"/>
+                  <a:pt x="851741" y="531"/>
+                  <a:pt x="812446" y="3186"/>
+                </a:cubicBezTo>
+                <a:cubicBezTo>
+                  <a:pt x="773151" y="5841"/>
+                  <a:pt x="746070" y="11682"/>
+                  <a:pt x="704120" y="15930"/>
+                </a:cubicBezTo>
+                <a:cubicBezTo>
+                  <a:pt x="662170" y="20178"/>
+                  <a:pt x="602166" y="23896"/>
+                  <a:pt x="560747" y="28675"/>
+                </a:cubicBezTo>
+                <a:cubicBezTo>
+                  <a:pt x="519328" y="33454"/>
+                  <a:pt x="494371" y="38233"/>
+                  <a:pt x="455607" y="44605"/>
+                </a:cubicBezTo>
+                <a:cubicBezTo>
+                  <a:pt x="416843" y="50977"/>
+                  <a:pt x="365866" y="60004"/>
+                  <a:pt x="328164" y="66907"/>
+                </a:cubicBezTo>
+                <a:cubicBezTo>
+                  <a:pt x="290462" y="73810"/>
+                  <a:pt x="261256" y="80183"/>
+                  <a:pt x="229396" y="86024"/>
+                </a:cubicBezTo>
+                <a:cubicBezTo>
+                  <a:pt x="197536" y="91865"/>
+                  <a:pt x="165675" y="97706"/>
+                  <a:pt x="137001" y="101954"/>
+                </a:cubicBezTo>
+                <a:cubicBezTo>
+                  <a:pt x="108327" y="106202"/>
+                  <a:pt x="80183" y="108326"/>
+                  <a:pt x="57349" y="111512"/>
+                </a:cubicBezTo>
+                <a:cubicBezTo>
+                  <a:pt x="34515" y="114698"/>
+                  <a:pt x="17257" y="117884"/>
+                  <a:pt x="0" y="121070"/>
+                </a:cubicBezTo>
+              </a:path>
+            </a:pathLst>
+          </a:custGeom>
+          <a:noFill/>
+          <a:ln w="6350">
+            <a:prstDash val="dash"/>
+          </a:ln>
+        </p:spPr>
+        <p:style>
+          <a:lnRef idx="2">
+            <a:schemeClr val="accent1">
+              <a:shade val="15000"/>
+            </a:schemeClr>
+          </a:lnRef>
+          <a:fillRef idx="1">
+            <a:schemeClr val="accent1"/>
+          </a:fillRef>
+          <a:effectRef idx="0">
+            <a:schemeClr val="accent1"/>
+          </a:effectRef>
+          <a:fontRef idx="minor">
+            <a:schemeClr val="lt1"/>
+          </a:fontRef>
+        </p:style>
+        <p:txBody>
+          <a:bodyPr rtlCol="0" anchor="ctr"/>
+          <a:lstStyle/>
+          <a:p>
+            <a:pPr algn="ctr"/>
+            <a:endParaRPr lang="en-US"/>
+          </a:p>
+        </p:txBody>
+      </p:sp>
+      <p:sp>
+        <p:nvSpPr>
+          <p:cNvPr id="41" name="Freeform 40">
+            <a:extLst>
+              <a:ext uri="{FF2B5EF4-FFF2-40B4-BE49-F238E27FC236}">
+                <a16:creationId xmlns:a16="http://schemas.microsoft.com/office/drawing/2014/main" id="{8DF61329-15C3-EFDB-11CF-75BC5D1C0518}"/>
+              </a:ext>
+            </a:extLst>
+          </p:cNvPr>
+          <p:cNvSpPr/>
+          <p:nvPr/>
+        </p:nvSpPr>
+        <p:spPr>
+          <a:xfrm>
+            <a:off x="3957090" y="2829035"/>
+            <a:ext cx="884757" cy="201524"/>
+          </a:xfrm>
+          <a:custGeom>
+            <a:avLst/>
+            <a:gdLst>
+              <a:gd name="connsiteX0" fmla="*/ 6372 w 884757"/>
+              <a:gd name="connsiteY0" fmla="*/ 105329 h 201524"/>
+              <a:gd name="connsiteX1" fmla="*/ 133815 w 884757"/>
+              <a:gd name="connsiteY1" fmla="*/ 89398 h 201524"/>
+              <a:gd name="connsiteX2" fmla="*/ 274001 w 884757"/>
+              <a:gd name="connsiteY2" fmla="*/ 63910 h 201524"/>
+              <a:gd name="connsiteX3" fmla="*/ 407816 w 884757"/>
+              <a:gd name="connsiteY3" fmla="*/ 38421 h 201524"/>
+              <a:gd name="connsiteX4" fmla="*/ 497026 w 884757"/>
+              <a:gd name="connsiteY4" fmla="*/ 28863 h 201524"/>
+              <a:gd name="connsiteX5" fmla="*/ 614910 w 884757"/>
+              <a:gd name="connsiteY5" fmla="*/ 16119 h 201524"/>
+              <a:gd name="connsiteX6" fmla="*/ 681817 w 884757"/>
+              <a:gd name="connsiteY6" fmla="*/ 9747 h 201524"/>
+              <a:gd name="connsiteX7" fmla="*/ 751911 w 884757"/>
+              <a:gd name="connsiteY7" fmla="*/ 189 h 201524"/>
+              <a:gd name="connsiteX8" fmla="*/ 815632 w 884757"/>
+              <a:gd name="connsiteY8" fmla="*/ 3375 h 201524"/>
+              <a:gd name="connsiteX9" fmla="*/ 882539 w 884757"/>
+              <a:gd name="connsiteY9" fmla="*/ 3375 h 201524"/>
+              <a:gd name="connsiteX10" fmla="*/ 860237 w 884757"/>
+              <a:gd name="connsiteY10" fmla="*/ 38421 h 201524"/>
+              <a:gd name="connsiteX11" fmla="*/ 777399 w 884757"/>
+              <a:gd name="connsiteY11" fmla="*/ 92585 h 201524"/>
+              <a:gd name="connsiteX12" fmla="*/ 716864 w 884757"/>
+              <a:gd name="connsiteY12" fmla="*/ 127631 h 201524"/>
+              <a:gd name="connsiteX13" fmla="*/ 637212 w 884757"/>
+              <a:gd name="connsiteY13" fmla="*/ 165864 h 201524"/>
+              <a:gd name="connsiteX14" fmla="*/ 525700 w 884757"/>
+              <a:gd name="connsiteY14" fmla="*/ 191352 h 201524"/>
+              <a:gd name="connsiteX15" fmla="*/ 388700 w 884757"/>
+              <a:gd name="connsiteY15" fmla="*/ 194539 h 201524"/>
+              <a:gd name="connsiteX16" fmla="*/ 235769 w 884757"/>
+              <a:gd name="connsiteY16" fmla="*/ 200911 h 201524"/>
+              <a:gd name="connsiteX17" fmla="*/ 137001 w 884757"/>
+              <a:gd name="connsiteY17" fmla="*/ 200911 h 201524"/>
+              <a:gd name="connsiteX18" fmla="*/ 63721 w 884757"/>
+              <a:gd name="connsiteY18" fmla="*/ 197725 h 201524"/>
+              <a:gd name="connsiteX19" fmla="*/ 0 w 884757"/>
+              <a:gd name="connsiteY19" fmla="*/ 191352 h 201524"/>
+            </a:gdLst>
+            <a:ahLst/>
+            <a:cxnLst>
+              <a:cxn ang="0">
+                <a:pos x="connsiteX0" y="connsiteY0"/>
+              </a:cxn>
+              <a:cxn ang="0">
+                <a:pos x="connsiteX1" y="connsiteY1"/>
+              </a:cxn>
+              <a:cxn ang="0">
+                <a:pos x="connsiteX2" y="connsiteY2"/>
+              </a:cxn>
+              <a:cxn ang="0">
+                <a:pos x="connsiteX3" y="connsiteY3"/>
+              </a:cxn>
+              <a:cxn ang="0">
+                <a:pos x="connsiteX4" y="connsiteY4"/>
+              </a:cxn>
+              <a:cxn ang="0">
+                <a:pos x="connsiteX5" y="connsiteY5"/>
+              </a:cxn>
+              <a:cxn ang="0">
+                <a:pos x="connsiteX6" y="connsiteY6"/>
+              </a:cxn>
+              <a:cxn ang="0">
+                <a:pos x="connsiteX7" y="connsiteY7"/>
+              </a:cxn>
+              <a:cxn ang="0">
+                <a:pos x="connsiteX8" y="connsiteY8"/>
+              </a:cxn>
+              <a:cxn ang="0">
+                <a:pos x="connsiteX9" y="connsiteY9"/>
+              </a:cxn>
+              <a:cxn ang="0">
+                <a:pos x="connsiteX10" y="connsiteY10"/>
+              </a:cxn>
+              <a:cxn ang="0">
+                <a:pos x="connsiteX11" y="connsiteY11"/>
+              </a:cxn>
+              <a:cxn ang="0">
+                <a:pos x="connsiteX12" y="connsiteY12"/>
+              </a:cxn>
+              <a:cxn ang="0">
+                <a:pos x="connsiteX13" y="connsiteY13"/>
+              </a:cxn>
+              <a:cxn ang="0">
+                <a:pos x="connsiteX14" y="connsiteY14"/>
+              </a:cxn>
+              <a:cxn ang="0">
+                <a:pos x="connsiteX15" y="connsiteY15"/>
+              </a:cxn>
+              <a:cxn ang="0">
+                <a:pos x="connsiteX16" y="connsiteY16"/>
+              </a:cxn>
+              <a:cxn ang="0">
+                <a:pos x="connsiteX17" y="connsiteY17"/>
+              </a:cxn>
+              <a:cxn ang="0">
+                <a:pos x="connsiteX18" y="connsiteY18"/>
+              </a:cxn>
+              <a:cxn ang="0">
+                <a:pos x="connsiteX19" y="connsiteY19"/>
+              </a:cxn>
+            </a:cxnLst>
+            <a:rect l="l" t="t" r="r" b="b"/>
+            <a:pathLst>
+              <a:path w="884757" h="201524">
+                <a:moveTo>
+                  <a:pt x="6372" y="105329"/>
+                </a:moveTo>
+                <a:cubicBezTo>
+                  <a:pt x="47791" y="100815"/>
+                  <a:pt x="89210" y="96301"/>
+                  <a:pt x="133815" y="89398"/>
+                </a:cubicBezTo>
+                <a:cubicBezTo>
+                  <a:pt x="178420" y="82495"/>
+                  <a:pt x="274001" y="63910"/>
+                  <a:pt x="274001" y="63910"/>
+                </a:cubicBezTo>
+                <a:cubicBezTo>
+                  <a:pt x="319668" y="55414"/>
+                  <a:pt x="370645" y="44262"/>
+                  <a:pt x="407816" y="38421"/>
+                </a:cubicBezTo>
+                <a:cubicBezTo>
+                  <a:pt x="444987" y="32580"/>
+                  <a:pt x="497026" y="28863"/>
+                  <a:pt x="497026" y="28863"/>
+                </a:cubicBezTo>
+                <a:lnTo>
+                  <a:pt x="614910" y="16119"/>
+                </a:lnTo>
+                <a:cubicBezTo>
+                  <a:pt x="645708" y="12933"/>
+                  <a:pt x="658984" y="12402"/>
+                  <a:pt x="681817" y="9747"/>
+                </a:cubicBezTo>
+                <a:cubicBezTo>
+                  <a:pt x="704651" y="7092"/>
+                  <a:pt x="729609" y="1251"/>
+                  <a:pt x="751911" y="189"/>
+                </a:cubicBezTo>
+                <a:cubicBezTo>
+                  <a:pt x="774213" y="-873"/>
+                  <a:pt x="793861" y="2844"/>
+                  <a:pt x="815632" y="3375"/>
+                </a:cubicBezTo>
+                <a:cubicBezTo>
+                  <a:pt x="837403" y="3906"/>
+                  <a:pt x="875105" y="-2466"/>
+                  <a:pt x="882539" y="3375"/>
+                </a:cubicBezTo>
+                <a:cubicBezTo>
+                  <a:pt x="889973" y="9216"/>
+                  <a:pt x="877760" y="23553"/>
+                  <a:pt x="860237" y="38421"/>
+                </a:cubicBezTo>
+                <a:cubicBezTo>
+                  <a:pt x="842714" y="53289"/>
+                  <a:pt x="801294" y="77717"/>
+                  <a:pt x="777399" y="92585"/>
+                </a:cubicBezTo>
+                <a:cubicBezTo>
+                  <a:pt x="753504" y="107453"/>
+                  <a:pt x="740229" y="115418"/>
+                  <a:pt x="716864" y="127631"/>
+                </a:cubicBezTo>
+                <a:cubicBezTo>
+                  <a:pt x="693500" y="139844"/>
+                  <a:pt x="669073" y="155244"/>
+                  <a:pt x="637212" y="165864"/>
+                </a:cubicBezTo>
+                <a:cubicBezTo>
+                  <a:pt x="605351" y="176484"/>
+                  <a:pt x="567119" y="186573"/>
+                  <a:pt x="525700" y="191352"/>
+                </a:cubicBezTo>
+                <a:cubicBezTo>
+                  <a:pt x="484281" y="196131"/>
+                  <a:pt x="388700" y="194539"/>
+                  <a:pt x="388700" y="194539"/>
+                </a:cubicBezTo>
+                <a:lnTo>
+                  <a:pt x="235769" y="200911"/>
+                </a:lnTo>
+                <a:cubicBezTo>
+                  <a:pt x="193819" y="201973"/>
+                  <a:pt x="165676" y="201442"/>
+                  <a:pt x="137001" y="200911"/>
+                </a:cubicBezTo>
+                <a:cubicBezTo>
+                  <a:pt x="108326" y="200380"/>
+                  <a:pt x="86554" y="199318"/>
+                  <a:pt x="63721" y="197725"/>
+                </a:cubicBezTo>
+                <a:cubicBezTo>
+                  <a:pt x="40888" y="196132"/>
+                  <a:pt x="20444" y="193742"/>
+                  <a:pt x="0" y="191352"/>
+                </a:cubicBezTo>
+              </a:path>
+            </a:pathLst>
+          </a:custGeom>
+          <a:noFill/>
+          <a:ln w="6350">
+            <a:prstDash val="dash"/>
+          </a:ln>
+        </p:spPr>
+        <p:style>
+          <a:lnRef idx="2">
+            <a:schemeClr val="accent1">
+              <a:shade val="15000"/>
+            </a:schemeClr>
+          </a:lnRef>
+          <a:fillRef idx="1">
+            <a:schemeClr val="accent1"/>
+          </a:fillRef>
+          <a:effectRef idx="0">
+            <a:schemeClr val="accent1"/>
+          </a:effectRef>
+          <a:fontRef idx="minor">
+            <a:schemeClr val="lt1"/>
+          </a:fontRef>
+        </p:style>
+        <p:txBody>
+          <a:bodyPr rtlCol="0" anchor="ctr"/>
+          <a:lstStyle/>
+          <a:p>
+            <a:pPr algn="ctr"/>
+            <a:endParaRPr lang="en-US"/>
+          </a:p>
+        </p:txBody>
+      </p:sp>
+      <p:sp>
+        <p:nvSpPr>
+          <p:cNvPr id="42" name="Freeform 41">
+            <a:extLst>
+              <a:ext uri="{FF2B5EF4-FFF2-40B4-BE49-F238E27FC236}">
+                <a16:creationId xmlns:a16="http://schemas.microsoft.com/office/drawing/2014/main" id="{5E098889-9291-151E-5012-D767ECE493F5}"/>
+              </a:ext>
+            </a:extLst>
+          </p:cNvPr>
+          <p:cNvSpPr/>
+          <p:nvPr/>
+        </p:nvSpPr>
+        <p:spPr>
+          <a:xfrm>
+            <a:off x="4154612" y="2894121"/>
+            <a:ext cx="478163" cy="79312"/>
+          </a:xfrm>
+          <a:custGeom>
+            <a:avLst/>
+            <a:gdLst>
+              <a:gd name="connsiteX0" fmla="*/ 14 w 478163"/>
+              <a:gd name="connsiteY0" fmla="*/ 68917 h 79312"/>
+              <a:gd name="connsiteX1" fmla="*/ 89224 w 478163"/>
+              <a:gd name="connsiteY1" fmla="*/ 52987 h 79312"/>
+              <a:gd name="connsiteX2" fmla="*/ 156131 w 478163"/>
+              <a:gd name="connsiteY2" fmla="*/ 40243 h 79312"/>
+              <a:gd name="connsiteX3" fmla="*/ 254899 w 478163"/>
+              <a:gd name="connsiteY3" fmla="*/ 30685 h 79312"/>
+              <a:gd name="connsiteX4" fmla="*/ 366411 w 478163"/>
+              <a:gd name="connsiteY4" fmla="*/ 14754 h 79312"/>
+              <a:gd name="connsiteX5" fmla="*/ 433318 w 478163"/>
+              <a:gd name="connsiteY5" fmla="*/ 8382 h 79312"/>
+              <a:gd name="connsiteX6" fmla="*/ 477923 w 478163"/>
+              <a:gd name="connsiteY6" fmla="*/ 2010 h 79312"/>
+              <a:gd name="connsiteX7" fmla="*/ 414202 w 478163"/>
+              <a:gd name="connsiteY7" fmla="*/ 46615 h 79312"/>
+              <a:gd name="connsiteX8" fmla="*/ 305876 w 478163"/>
+              <a:gd name="connsiteY8" fmla="*/ 65731 h 79312"/>
+              <a:gd name="connsiteX9" fmla="*/ 178433 w 478163"/>
+              <a:gd name="connsiteY9" fmla="*/ 78476 h 79312"/>
+              <a:gd name="connsiteX10" fmla="*/ 82851 w 478163"/>
+              <a:gd name="connsiteY10" fmla="*/ 78476 h 79312"/>
+              <a:gd name="connsiteX11" fmla="*/ 14 w 478163"/>
+              <a:gd name="connsiteY11" fmla="*/ 68917 h 79312"/>
+            </a:gdLst>
+            <a:ahLst/>
+            <a:cxnLst>
+              <a:cxn ang="0">
+                <a:pos x="connsiteX0" y="connsiteY0"/>
+              </a:cxn>
+              <a:cxn ang="0">
+                <a:pos x="connsiteX1" y="connsiteY1"/>
+              </a:cxn>
+              <a:cxn ang="0">
+                <a:pos x="connsiteX2" y="connsiteY2"/>
+              </a:cxn>
+              <a:cxn ang="0">
+                <a:pos x="connsiteX3" y="connsiteY3"/>
+              </a:cxn>
+              <a:cxn ang="0">
+                <a:pos x="connsiteX4" y="connsiteY4"/>
+              </a:cxn>
+              <a:cxn ang="0">
+                <a:pos x="connsiteX5" y="connsiteY5"/>
+              </a:cxn>
+              <a:cxn ang="0">
+                <a:pos x="connsiteX6" y="connsiteY6"/>
+              </a:cxn>
+              <a:cxn ang="0">
+                <a:pos x="connsiteX7" y="connsiteY7"/>
+              </a:cxn>
+              <a:cxn ang="0">
+                <a:pos x="connsiteX8" y="connsiteY8"/>
+              </a:cxn>
+              <a:cxn ang="0">
+                <a:pos x="connsiteX9" y="connsiteY9"/>
+              </a:cxn>
+              <a:cxn ang="0">
+                <a:pos x="connsiteX10" y="connsiteY10"/>
+              </a:cxn>
+              <a:cxn ang="0">
+                <a:pos x="connsiteX11" y="connsiteY11"/>
+              </a:cxn>
+            </a:cxnLst>
+            <a:rect l="l" t="t" r="r" b="b"/>
+            <a:pathLst>
+              <a:path w="478163" h="79312">
+                <a:moveTo>
+                  <a:pt x="14" y="68917"/>
+                </a:moveTo>
+                <a:cubicBezTo>
+                  <a:pt x="1076" y="64669"/>
+                  <a:pt x="89224" y="52987"/>
+                  <a:pt x="89224" y="52987"/>
+                </a:cubicBezTo>
+                <a:cubicBezTo>
+                  <a:pt x="115243" y="48208"/>
+                  <a:pt x="128519" y="43960"/>
+                  <a:pt x="156131" y="40243"/>
+                </a:cubicBezTo>
+                <a:cubicBezTo>
+                  <a:pt x="183743" y="36526"/>
+                  <a:pt x="219852" y="34933"/>
+                  <a:pt x="254899" y="30685"/>
+                </a:cubicBezTo>
+                <a:cubicBezTo>
+                  <a:pt x="289946" y="26437"/>
+                  <a:pt x="336675" y="18471"/>
+                  <a:pt x="366411" y="14754"/>
+                </a:cubicBezTo>
+                <a:cubicBezTo>
+                  <a:pt x="396147" y="11037"/>
+                  <a:pt x="414733" y="10506"/>
+                  <a:pt x="433318" y="8382"/>
+                </a:cubicBezTo>
+                <a:cubicBezTo>
+                  <a:pt x="451903" y="6258"/>
+                  <a:pt x="481109" y="-4362"/>
+                  <a:pt x="477923" y="2010"/>
+                </a:cubicBezTo>
+                <a:cubicBezTo>
+                  <a:pt x="474737" y="8382"/>
+                  <a:pt x="442877" y="35995"/>
+                  <a:pt x="414202" y="46615"/>
+                </a:cubicBezTo>
+                <a:cubicBezTo>
+                  <a:pt x="385528" y="57235"/>
+                  <a:pt x="345171" y="60421"/>
+                  <a:pt x="305876" y="65731"/>
+                </a:cubicBezTo>
+                <a:cubicBezTo>
+                  <a:pt x="266581" y="71041"/>
+                  <a:pt x="215604" y="76352"/>
+                  <a:pt x="178433" y="78476"/>
+                </a:cubicBezTo>
+                <a:cubicBezTo>
+                  <a:pt x="141262" y="80600"/>
+                  <a:pt x="110994" y="77945"/>
+                  <a:pt x="82851" y="78476"/>
+                </a:cubicBezTo>
+                <a:cubicBezTo>
+                  <a:pt x="54708" y="79007"/>
+                  <a:pt x="-1048" y="73165"/>
+                  <a:pt x="14" y="68917"/>
+                </a:cubicBezTo>
+                <a:close/>
+              </a:path>
+            </a:pathLst>
+          </a:custGeom>
+          <a:noFill/>
+          <a:ln w="6350">
+            <a:prstDash val="dash"/>
+          </a:ln>
+        </p:spPr>
+        <p:style>
+          <a:lnRef idx="2">
+            <a:schemeClr val="accent1">
+              <a:shade val="15000"/>
+            </a:schemeClr>
+          </a:lnRef>
+          <a:fillRef idx="1">
+            <a:schemeClr val="accent1"/>
+          </a:fillRef>
+          <a:effectRef idx="0">
+            <a:schemeClr val="accent1"/>
+          </a:effectRef>
+          <a:fontRef idx="minor">
+            <a:schemeClr val="lt1"/>
+          </a:fontRef>
+        </p:style>
+        <p:txBody>
+          <a:bodyPr rtlCol="0" anchor="ctr"/>
+          <a:lstStyle/>
+          <a:p>
+            <a:pPr algn="ctr"/>
+            <a:endParaRPr lang="en-US"/>
+          </a:p>
+        </p:txBody>
+      </p:sp>
+      <p:sp>
+        <p:nvSpPr>
+          <p:cNvPr id="44" name="Freeform 43">
+            <a:extLst>
+              <a:ext uri="{FF2B5EF4-FFF2-40B4-BE49-F238E27FC236}">
+                <a16:creationId xmlns:a16="http://schemas.microsoft.com/office/drawing/2014/main" id="{97B8E148-F436-7F7E-1014-A9F54E1FFB6C}"/>
+              </a:ext>
+            </a:extLst>
+          </p:cNvPr>
+          <p:cNvSpPr/>
+          <p:nvPr/>
+        </p:nvSpPr>
+        <p:spPr>
+          <a:xfrm>
+            <a:off x="4192409" y="3384658"/>
+            <a:ext cx="542822" cy="209778"/>
+          </a:xfrm>
+          <a:custGeom>
+            <a:avLst/>
+            <a:gdLst>
+              <a:gd name="connsiteX0" fmla="*/ 450 w 542822"/>
+              <a:gd name="connsiteY0" fmla="*/ 40359 h 209778"/>
+              <a:gd name="connsiteX1" fmla="*/ 134264 w 542822"/>
+              <a:gd name="connsiteY1" fmla="*/ 40359 h 209778"/>
+              <a:gd name="connsiteX2" fmla="*/ 268079 w 542822"/>
+              <a:gd name="connsiteY2" fmla="*/ 30801 h 209778"/>
+              <a:gd name="connsiteX3" fmla="*/ 385963 w 542822"/>
+              <a:gd name="connsiteY3" fmla="*/ 24429 h 209778"/>
+              <a:gd name="connsiteX4" fmla="*/ 484731 w 542822"/>
+              <a:gd name="connsiteY4" fmla="*/ 5313 h 209778"/>
+              <a:gd name="connsiteX5" fmla="*/ 507034 w 542822"/>
+              <a:gd name="connsiteY5" fmla="*/ 2127 h 209778"/>
+              <a:gd name="connsiteX6" fmla="*/ 487917 w 542822"/>
+              <a:gd name="connsiteY6" fmla="*/ 33987 h 209778"/>
+              <a:gd name="connsiteX7" fmla="*/ 484731 w 542822"/>
+              <a:gd name="connsiteY7" fmla="*/ 78592 h 209778"/>
+              <a:gd name="connsiteX8" fmla="*/ 487917 w 542822"/>
+              <a:gd name="connsiteY8" fmla="*/ 113639 h 209778"/>
+              <a:gd name="connsiteX9" fmla="*/ 507034 w 542822"/>
+              <a:gd name="connsiteY9" fmla="*/ 145499 h 209778"/>
+              <a:gd name="connsiteX10" fmla="*/ 526150 w 542822"/>
+              <a:gd name="connsiteY10" fmla="*/ 180546 h 209778"/>
+              <a:gd name="connsiteX11" fmla="*/ 535708 w 542822"/>
+              <a:gd name="connsiteY11" fmla="*/ 199663 h 209778"/>
+              <a:gd name="connsiteX12" fmla="*/ 538894 w 542822"/>
+              <a:gd name="connsiteY12" fmla="*/ 209221 h 209778"/>
+              <a:gd name="connsiteX13" fmla="*/ 478359 w 542822"/>
+              <a:gd name="connsiteY13" fmla="*/ 183732 h 209778"/>
+              <a:gd name="connsiteX14" fmla="*/ 417824 w 542822"/>
+              <a:gd name="connsiteY14" fmla="*/ 151872 h 209778"/>
+              <a:gd name="connsiteX15" fmla="*/ 350916 w 542822"/>
+              <a:gd name="connsiteY15" fmla="*/ 126383 h 209778"/>
+              <a:gd name="connsiteX16" fmla="*/ 268079 w 542822"/>
+              <a:gd name="connsiteY16" fmla="*/ 104081 h 209778"/>
+              <a:gd name="connsiteX17" fmla="*/ 188427 w 542822"/>
+              <a:gd name="connsiteY17" fmla="*/ 88150 h 209778"/>
+              <a:gd name="connsiteX18" fmla="*/ 92845 w 542822"/>
+              <a:gd name="connsiteY18" fmla="*/ 69034 h 209778"/>
+              <a:gd name="connsiteX19" fmla="*/ 450 w 542822"/>
+              <a:gd name="connsiteY19" fmla="*/ 40359 h 209778"/>
+            </a:gdLst>
+            <a:ahLst/>
+            <a:cxnLst>
+              <a:cxn ang="0">
+                <a:pos x="connsiteX0" y="connsiteY0"/>
+              </a:cxn>
+              <a:cxn ang="0">
+                <a:pos x="connsiteX1" y="connsiteY1"/>
+              </a:cxn>
+              <a:cxn ang="0">
+                <a:pos x="connsiteX2" y="connsiteY2"/>
+              </a:cxn>
+              <a:cxn ang="0">
+                <a:pos x="connsiteX3" y="connsiteY3"/>
+              </a:cxn>
+              <a:cxn ang="0">
+                <a:pos x="connsiteX4" y="connsiteY4"/>
+              </a:cxn>
+              <a:cxn ang="0">
+                <a:pos x="connsiteX5" y="connsiteY5"/>
+              </a:cxn>
+              <a:cxn ang="0">
+                <a:pos x="connsiteX6" y="connsiteY6"/>
+              </a:cxn>
+              <a:cxn ang="0">
+                <a:pos x="connsiteX7" y="connsiteY7"/>
+              </a:cxn>
+              <a:cxn ang="0">
+                <a:pos x="connsiteX8" y="connsiteY8"/>
+              </a:cxn>
+              <a:cxn ang="0">
+                <a:pos x="connsiteX9" y="connsiteY9"/>
+              </a:cxn>
+              <a:cxn ang="0">
+                <a:pos x="connsiteX10" y="connsiteY10"/>
+              </a:cxn>
+              <a:cxn ang="0">
+                <a:pos x="connsiteX11" y="connsiteY11"/>
+              </a:cxn>
+              <a:cxn ang="0">
+                <a:pos x="connsiteX12" y="connsiteY12"/>
+              </a:cxn>
+              <a:cxn ang="0">
+                <a:pos x="connsiteX13" y="connsiteY13"/>
+              </a:cxn>
+              <a:cxn ang="0">
+                <a:pos x="connsiteX14" y="connsiteY14"/>
+              </a:cxn>
+              <a:cxn ang="0">
+                <a:pos x="connsiteX15" y="connsiteY15"/>
+              </a:cxn>
+              <a:cxn ang="0">
+                <a:pos x="connsiteX16" y="connsiteY16"/>
+              </a:cxn>
+              <a:cxn ang="0">
+                <a:pos x="connsiteX17" y="connsiteY17"/>
+              </a:cxn>
+              <a:cxn ang="0">
+                <a:pos x="connsiteX18" y="connsiteY18"/>
+              </a:cxn>
+              <a:cxn ang="0">
+                <a:pos x="connsiteX19" y="connsiteY19"/>
+              </a:cxn>
+            </a:cxnLst>
+            <a:rect l="l" t="t" r="r" b="b"/>
+            <a:pathLst>
+              <a:path w="542822" h="209778">
+                <a:moveTo>
+                  <a:pt x="450" y="40359"/>
+                </a:moveTo>
+                <a:cubicBezTo>
+                  <a:pt x="7353" y="35580"/>
+                  <a:pt x="89659" y="41952"/>
+                  <a:pt x="134264" y="40359"/>
+                </a:cubicBezTo>
+                <a:cubicBezTo>
+                  <a:pt x="178869" y="38766"/>
+                  <a:pt x="268079" y="30801"/>
+                  <a:pt x="268079" y="30801"/>
+                </a:cubicBezTo>
+                <a:cubicBezTo>
+                  <a:pt x="310029" y="28146"/>
+                  <a:pt x="349854" y="28677"/>
+                  <a:pt x="385963" y="24429"/>
+                </a:cubicBezTo>
+                <a:cubicBezTo>
+                  <a:pt x="422072" y="20181"/>
+                  <a:pt x="464552" y="9030"/>
+                  <a:pt x="484731" y="5313"/>
+                </a:cubicBezTo>
+                <a:cubicBezTo>
+                  <a:pt x="504910" y="1596"/>
+                  <a:pt x="506503" y="-2652"/>
+                  <a:pt x="507034" y="2127"/>
+                </a:cubicBezTo>
+                <a:cubicBezTo>
+                  <a:pt x="507565" y="6906"/>
+                  <a:pt x="491634" y="21243"/>
+                  <a:pt x="487917" y="33987"/>
+                </a:cubicBezTo>
+                <a:cubicBezTo>
+                  <a:pt x="484200" y="46731"/>
+                  <a:pt x="484731" y="65317"/>
+                  <a:pt x="484731" y="78592"/>
+                </a:cubicBezTo>
+                <a:cubicBezTo>
+                  <a:pt x="484731" y="91867"/>
+                  <a:pt x="484200" y="102488"/>
+                  <a:pt x="487917" y="113639"/>
+                </a:cubicBezTo>
+                <a:cubicBezTo>
+                  <a:pt x="491634" y="124790"/>
+                  <a:pt x="500662" y="134348"/>
+                  <a:pt x="507034" y="145499"/>
+                </a:cubicBezTo>
+                <a:cubicBezTo>
+                  <a:pt x="513406" y="156650"/>
+                  <a:pt x="526150" y="180546"/>
+                  <a:pt x="526150" y="180546"/>
+                </a:cubicBezTo>
+                <a:cubicBezTo>
+                  <a:pt x="530929" y="189573"/>
+                  <a:pt x="535708" y="199663"/>
+                  <a:pt x="535708" y="199663"/>
+                </a:cubicBezTo>
+                <a:cubicBezTo>
+                  <a:pt x="537832" y="204442"/>
+                  <a:pt x="548452" y="211876"/>
+                  <a:pt x="538894" y="209221"/>
+                </a:cubicBezTo>
+                <a:cubicBezTo>
+                  <a:pt x="529336" y="206566"/>
+                  <a:pt x="498537" y="193290"/>
+                  <a:pt x="478359" y="183732"/>
+                </a:cubicBezTo>
+                <a:cubicBezTo>
+                  <a:pt x="458181" y="174174"/>
+                  <a:pt x="439064" y="161430"/>
+                  <a:pt x="417824" y="151872"/>
+                </a:cubicBezTo>
+                <a:cubicBezTo>
+                  <a:pt x="396584" y="142314"/>
+                  <a:pt x="375873" y="134348"/>
+                  <a:pt x="350916" y="126383"/>
+                </a:cubicBezTo>
+                <a:cubicBezTo>
+                  <a:pt x="325959" y="118418"/>
+                  <a:pt x="295161" y="110453"/>
+                  <a:pt x="268079" y="104081"/>
+                </a:cubicBezTo>
+                <a:cubicBezTo>
+                  <a:pt x="240998" y="97709"/>
+                  <a:pt x="188427" y="88150"/>
+                  <a:pt x="188427" y="88150"/>
+                </a:cubicBezTo>
+                <a:cubicBezTo>
+                  <a:pt x="159221" y="82309"/>
+                  <a:pt x="117802" y="73282"/>
+                  <a:pt x="92845" y="69034"/>
+                </a:cubicBezTo>
+                <a:cubicBezTo>
+                  <a:pt x="67888" y="64786"/>
+                  <a:pt x="-6453" y="45138"/>
+                  <a:pt x="450" y="40359"/>
+                </a:cubicBezTo>
+                <a:close/>
+              </a:path>
+            </a:pathLst>
+          </a:custGeom>
+          <a:noFill/>
+          <a:ln w="6350">
+            <a:prstDash val="dash"/>
+          </a:ln>
+        </p:spPr>
+        <p:style>
+          <a:lnRef idx="2">
+            <a:schemeClr val="accent1">
+              <a:shade val="15000"/>
+            </a:schemeClr>
+          </a:lnRef>
+          <a:fillRef idx="1">
+            <a:schemeClr val="accent1"/>
+          </a:fillRef>
+          <a:effectRef idx="0">
+            <a:schemeClr val="accent1"/>
+          </a:effectRef>
+          <a:fontRef idx="minor">
+            <a:schemeClr val="lt1"/>
+          </a:fontRef>
+        </p:style>
+        <p:txBody>
+          <a:bodyPr rtlCol="0" anchor="ctr"/>
+          <a:lstStyle/>
+          <a:p>
+            <a:pPr algn="ctr"/>
+            <a:endParaRPr lang="en-US"/>
+          </a:p>
+        </p:txBody>
+      </p:sp>
+      <p:sp>
+        <p:nvSpPr>
+          <p:cNvPr id="45" name="Freeform 44">
+            <a:extLst>
+              <a:ext uri="{FF2B5EF4-FFF2-40B4-BE49-F238E27FC236}">
+                <a16:creationId xmlns:a16="http://schemas.microsoft.com/office/drawing/2014/main" id="{3501C877-9187-8003-D17C-1733172474CD}"/>
+              </a:ext>
+            </a:extLst>
+          </p:cNvPr>
+          <p:cNvSpPr/>
+          <p:nvPr/>
+        </p:nvSpPr>
+        <p:spPr>
+          <a:xfrm>
+            <a:off x="3953904" y="3739897"/>
+            <a:ext cx="943074" cy="156658"/>
+          </a:xfrm>
+          <a:custGeom>
+            <a:avLst/>
+            <a:gdLst>
+              <a:gd name="connsiteX0" fmla="*/ 943074 w 943074"/>
+              <a:gd name="connsiteY0" fmla="*/ 156658 h 156658"/>
+              <a:gd name="connsiteX1" fmla="*/ 857051 w 943074"/>
+              <a:gd name="connsiteY1" fmla="*/ 127983 h 156658"/>
+              <a:gd name="connsiteX2" fmla="*/ 799702 w 943074"/>
+              <a:gd name="connsiteY2" fmla="*/ 108867 h 156658"/>
+              <a:gd name="connsiteX3" fmla="*/ 716864 w 943074"/>
+              <a:gd name="connsiteY3" fmla="*/ 80192 h 156658"/>
+              <a:gd name="connsiteX4" fmla="*/ 637212 w 943074"/>
+              <a:gd name="connsiteY4" fmla="*/ 57890 h 156658"/>
+              <a:gd name="connsiteX5" fmla="*/ 548003 w 943074"/>
+              <a:gd name="connsiteY5" fmla="*/ 35587 h 156658"/>
+              <a:gd name="connsiteX6" fmla="*/ 423746 w 943074"/>
+              <a:gd name="connsiteY6" fmla="*/ 6913 h 156658"/>
+              <a:gd name="connsiteX7" fmla="*/ 337722 w 943074"/>
+              <a:gd name="connsiteY7" fmla="*/ 3727 h 156658"/>
+              <a:gd name="connsiteX8" fmla="*/ 219838 w 943074"/>
+              <a:gd name="connsiteY8" fmla="*/ 3727 h 156658"/>
+              <a:gd name="connsiteX9" fmla="*/ 95582 w 943074"/>
+              <a:gd name="connsiteY9" fmla="*/ 541 h 156658"/>
+              <a:gd name="connsiteX10" fmla="*/ 0 w 943074"/>
+              <a:gd name="connsiteY10" fmla="*/ 16471 h 156658"/>
+            </a:gdLst>
+            <a:ahLst/>
+            <a:cxnLst>
+              <a:cxn ang="0">
+                <a:pos x="connsiteX0" y="connsiteY0"/>
+              </a:cxn>
+              <a:cxn ang="0">
+                <a:pos x="connsiteX1" y="connsiteY1"/>
+              </a:cxn>
+              <a:cxn ang="0">
+                <a:pos x="connsiteX2" y="connsiteY2"/>
+              </a:cxn>
+              <a:cxn ang="0">
+                <a:pos x="connsiteX3" y="connsiteY3"/>
+              </a:cxn>
+              <a:cxn ang="0">
+                <a:pos x="connsiteX4" y="connsiteY4"/>
+              </a:cxn>
+              <a:cxn ang="0">
+                <a:pos x="connsiteX5" y="connsiteY5"/>
+              </a:cxn>
+              <a:cxn ang="0">
+                <a:pos x="connsiteX6" y="connsiteY6"/>
+              </a:cxn>
+              <a:cxn ang="0">
+                <a:pos x="connsiteX7" y="connsiteY7"/>
+              </a:cxn>
+              <a:cxn ang="0">
+                <a:pos x="connsiteX8" y="connsiteY8"/>
+              </a:cxn>
+              <a:cxn ang="0">
+                <a:pos x="connsiteX9" y="connsiteY9"/>
+              </a:cxn>
+              <a:cxn ang="0">
+                <a:pos x="connsiteX10" y="connsiteY10"/>
+              </a:cxn>
+            </a:cxnLst>
+            <a:rect l="l" t="t" r="r" b="b"/>
+            <a:pathLst>
+              <a:path w="943074" h="156658">
+                <a:moveTo>
+                  <a:pt x="943074" y="156658"/>
+                </a:moveTo>
+                <a:lnTo>
+                  <a:pt x="857051" y="127983"/>
+                </a:lnTo>
+                <a:lnTo>
+                  <a:pt x="799702" y="108867"/>
+                </a:lnTo>
+                <a:cubicBezTo>
+                  <a:pt x="776337" y="100902"/>
+                  <a:pt x="743946" y="88688"/>
+                  <a:pt x="716864" y="80192"/>
+                </a:cubicBezTo>
+                <a:cubicBezTo>
+                  <a:pt x="689782" y="71696"/>
+                  <a:pt x="665355" y="65324"/>
+                  <a:pt x="637212" y="57890"/>
+                </a:cubicBezTo>
+                <a:cubicBezTo>
+                  <a:pt x="609069" y="50456"/>
+                  <a:pt x="548003" y="35587"/>
+                  <a:pt x="548003" y="35587"/>
+                </a:cubicBezTo>
+                <a:cubicBezTo>
+                  <a:pt x="512425" y="27091"/>
+                  <a:pt x="458793" y="12223"/>
+                  <a:pt x="423746" y="6913"/>
+                </a:cubicBezTo>
+                <a:cubicBezTo>
+                  <a:pt x="388699" y="1603"/>
+                  <a:pt x="371707" y="4258"/>
+                  <a:pt x="337722" y="3727"/>
+                </a:cubicBezTo>
+                <a:cubicBezTo>
+                  <a:pt x="303737" y="3196"/>
+                  <a:pt x="260195" y="4258"/>
+                  <a:pt x="219838" y="3727"/>
+                </a:cubicBezTo>
+                <a:cubicBezTo>
+                  <a:pt x="179481" y="3196"/>
+                  <a:pt x="132222" y="-1583"/>
+                  <a:pt x="95582" y="541"/>
+                </a:cubicBezTo>
+                <a:cubicBezTo>
+                  <a:pt x="58942" y="2665"/>
+                  <a:pt x="29471" y="9568"/>
+                  <a:pt x="0" y="16471"/>
+                </a:cubicBezTo>
+              </a:path>
+            </a:pathLst>
+          </a:custGeom>
+          <a:noFill/>
+          <a:ln w="6350">
+            <a:prstDash val="dash"/>
+          </a:ln>
+        </p:spPr>
+        <p:style>
+          <a:lnRef idx="2">
+            <a:schemeClr val="accent1">
+              <a:shade val="15000"/>
+            </a:schemeClr>
+          </a:lnRef>
+          <a:fillRef idx="1">
+            <a:schemeClr val="accent1"/>
+          </a:fillRef>
+          <a:effectRef idx="0">
+            <a:schemeClr val="accent1"/>
+          </a:effectRef>
+          <a:fontRef idx="minor">
+            <a:schemeClr val="lt1"/>
+          </a:fontRef>
+        </p:style>
+        <p:txBody>
+          <a:bodyPr rtlCol="0" anchor="ctr"/>
+          <a:lstStyle/>
+          <a:p>
+            <a:pPr algn="ctr"/>
+            <a:endParaRPr lang="en-US"/>
+          </a:p>
+        </p:txBody>
+      </p:sp>
+      <p:sp>
+        <p:nvSpPr>
+          <p:cNvPr id="46" name="Freeform 45">
+            <a:extLst>
+              <a:ext uri="{FF2B5EF4-FFF2-40B4-BE49-F238E27FC236}">
+                <a16:creationId xmlns:a16="http://schemas.microsoft.com/office/drawing/2014/main" id="{02B8817D-14EC-F941-D21E-F4F1A9FC3733}"/>
+              </a:ext>
+            </a:extLst>
+          </p:cNvPr>
+          <p:cNvSpPr/>
+          <p:nvPr/>
+        </p:nvSpPr>
+        <p:spPr>
+          <a:xfrm>
+            <a:off x="3953904" y="3953063"/>
+            <a:ext cx="939888" cy="48632"/>
+          </a:xfrm>
+          <a:custGeom>
+            <a:avLst/>
+            <a:gdLst>
+              <a:gd name="connsiteX0" fmla="*/ 939888 w 939888"/>
+              <a:gd name="connsiteY0" fmla="*/ 48632 h 48632"/>
+              <a:gd name="connsiteX1" fmla="*/ 755097 w 939888"/>
+              <a:gd name="connsiteY1" fmla="*/ 32701 h 48632"/>
+              <a:gd name="connsiteX2" fmla="*/ 649957 w 939888"/>
+              <a:gd name="connsiteY2" fmla="*/ 19957 h 48632"/>
+              <a:gd name="connsiteX3" fmla="*/ 474723 w 939888"/>
+              <a:gd name="connsiteY3" fmla="*/ 4027 h 48632"/>
+              <a:gd name="connsiteX4" fmla="*/ 363211 w 939888"/>
+              <a:gd name="connsiteY4" fmla="*/ 841 h 48632"/>
+              <a:gd name="connsiteX5" fmla="*/ 219838 w 939888"/>
+              <a:gd name="connsiteY5" fmla="*/ 841 h 48632"/>
+              <a:gd name="connsiteX6" fmla="*/ 130628 w 939888"/>
+              <a:gd name="connsiteY6" fmla="*/ 10399 h 48632"/>
+              <a:gd name="connsiteX7" fmla="*/ 50977 w 939888"/>
+              <a:gd name="connsiteY7" fmla="*/ 16771 h 48632"/>
+              <a:gd name="connsiteX8" fmla="*/ 0 w 939888"/>
+              <a:gd name="connsiteY8" fmla="*/ 16771 h 48632"/>
+            </a:gdLst>
+            <a:ahLst/>
+            <a:cxnLst>
+              <a:cxn ang="0">
+                <a:pos x="connsiteX0" y="connsiteY0"/>
+              </a:cxn>
+              <a:cxn ang="0">
+                <a:pos x="connsiteX1" y="connsiteY1"/>
+              </a:cxn>
+              <a:cxn ang="0">
+                <a:pos x="connsiteX2" y="connsiteY2"/>
+              </a:cxn>
+              <a:cxn ang="0">
+                <a:pos x="connsiteX3" y="connsiteY3"/>
+              </a:cxn>
+              <a:cxn ang="0">
+                <a:pos x="connsiteX4" y="connsiteY4"/>
+              </a:cxn>
+              <a:cxn ang="0">
+                <a:pos x="connsiteX5" y="connsiteY5"/>
+              </a:cxn>
+              <a:cxn ang="0">
+                <a:pos x="connsiteX6" y="connsiteY6"/>
+              </a:cxn>
+              <a:cxn ang="0">
+                <a:pos x="connsiteX7" y="connsiteY7"/>
+              </a:cxn>
+              <a:cxn ang="0">
+                <a:pos x="connsiteX8" y="connsiteY8"/>
+              </a:cxn>
+            </a:cxnLst>
+            <a:rect l="l" t="t" r="r" b="b"/>
+            <a:pathLst>
+              <a:path w="939888" h="48632">
+                <a:moveTo>
+                  <a:pt x="939888" y="48632"/>
+                </a:moveTo>
+                <a:lnTo>
+                  <a:pt x="755097" y="32701"/>
+                </a:lnTo>
+                <a:cubicBezTo>
+                  <a:pt x="706775" y="27922"/>
+                  <a:pt x="696686" y="24736"/>
+                  <a:pt x="649957" y="19957"/>
+                </a:cubicBezTo>
+                <a:cubicBezTo>
+                  <a:pt x="603228" y="15178"/>
+                  <a:pt x="522514" y="7213"/>
+                  <a:pt x="474723" y="4027"/>
+                </a:cubicBezTo>
+                <a:cubicBezTo>
+                  <a:pt x="426932" y="841"/>
+                  <a:pt x="405692" y="1372"/>
+                  <a:pt x="363211" y="841"/>
+                </a:cubicBezTo>
+                <a:cubicBezTo>
+                  <a:pt x="320730" y="310"/>
+                  <a:pt x="258602" y="-752"/>
+                  <a:pt x="219838" y="841"/>
+                </a:cubicBezTo>
+                <a:cubicBezTo>
+                  <a:pt x="181074" y="2434"/>
+                  <a:pt x="158771" y="7744"/>
+                  <a:pt x="130628" y="10399"/>
+                </a:cubicBezTo>
+                <a:cubicBezTo>
+                  <a:pt x="102485" y="13054"/>
+                  <a:pt x="72748" y="15709"/>
+                  <a:pt x="50977" y="16771"/>
+                </a:cubicBezTo>
+                <a:cubicBezTo>
+                  <a:pt x="29206" y="17833"/>
+                  <a:pt x="14603" y="17302"/>
+                  <a:pt x="0" y="16771"/>
+                </a:cubicBezTo>
+              </a:path>
+            </a:pathLst>
+          </a:custGeom>
+          <a:noFill/>
+          <a:ln w="6350">
+            <a:prstDash val="dash"/>
+          </a:ln>
+        </p:spPr>
+        <p:style>
+          <a:lnRef idx="2">
+            <a:schemeClr val="accent1">
+              <a:shade val="15000"/>
+            </a:schemeClr>
+          </a:lnRef>
+          <a:fillRef idx="1">
+            <a:schemeClr val="accent1"/>
+          </a:fillRef>
+          <a:effectRef idx="0">
+            <a:schemeClr val="accent1"/>
+          </a:effectRef>
+          <a:fontRef idx="minor">
+            <a:schemeClr val="lt1"/>
+          </a:fontRef>
+        </p:style>
+        <p:txBody>
+          <a:bodyPr rtlCol="0" anchor="ctr"/>
+          <a:lstStyle/>
+          <a:p>
+            <a:pPr algn="ctr"/>
+            <a:endParaRPr lang="en-US"/>
+          </a:p>
+        </p:txBody>
+      </p:sp>
+      <p:sp>
+        <p:nvSpPr>
+          <p:cNvPr id="47" name="Freeform 46">
+            <a:extLst>
+              <a:ext uri="{FF2B5EF4-FFF2-40B4-BE49-F238E27FC236}">
+                <a16:creationId xmlns:a16="http://schemas.microsoft.com/office/drawing/2014/main" id="{D1EBA16D-AB87-6C4B-02B0-82E53F08AC51}"/>
+              </a:ext>
+            </a:extLst>
+          </p:cNvPr>
+          <p:cNvSpPr/>
+          <p:nvPr/>
+        </p:nvSpPr>
+        <p:spPr>
+          <a:xfrm>
+            <a:off x="4823699" y="4103649"/>
+            <a:ext cx="63721" cy="86023"/>
+          </a:xfrm>
+          <a:custGeom>
+            <a:avLst/>
+            <a:gdLst>
+              <a:gd name="connsiteX0" fmla="*/ 63721 w 63721"/>
+              <a:gd name="connsiteY0" fmla="*/ 0 h 86023"/>
+              <a:gd name="connsiteX1" fmla="*/ 19116 w 63721"/>
+              <a:gd name="connsiteY1" fmla="*/ 54163 h 86023"/>
+              <a:gd name="connsiteX2" fmla="*/ 0 w 63721"/>
+              <a:gd name="connsiteY2" fmla="*/ 86023 h 86023"/>
+            </a:gdLst>
+            <a:ahLst/>
+            <a:cxnLst>
+              <a:cxn ang="0">
+                <a:pos x="connsiteX0" y="connsiteY0"/>
+              </a:cxn>
+              <a:cxn ang="0">
+                <a:pos x="connsiteX1" y="connsiteY1"/>
+              </a:cxn>
+              <a:cxn ang="0">
+                <a:pos x="connsiteX2" y="connsiteY2"/>
+              </a:cxn>
+            </a:cxnLst>
+            <a:rect l="l" t="t" r="r" b="b"/>
+            <a:pathLst>
+              <a:path w="63721" h="86023">
+                <a:moveTo>
+                  <a:pt x="63721" y="0"/>
+                </a:moveTo>
+                <a:cubicBezTo>
+                  <a:pt x="46728" y="19913"/>
+                  <a:pt x="29736" y="39826"/>
+                  <a:pt x="19116" y="54163"/>
+                </a:cubicBezTo>
+                <a:cubicBezTo>
+                  <a:pt x="8496" y="68500"/>
+                  <a:pt x="4248" y="77261"/>
+                  <a:pt x="0" y="86023"/>
+                </a:cubicBezTo>
+              </a:path>
+            </a:pathLst>
+          </a:custGeom>
+          <a:noFill/>
+          <a:ln w="6350">
+            <a:prstDash val="dash"/>
+          </a:ln>
+        </p:spPr>
+        <p:style>
+          <a:lnRef idx="2">
+            <a:schemeClr val="accent1">
+              <a:shade val="15000"/>
+            </a:schemeClr>
+          </a:lnRef>
+          <a:fillRef idx="1">
+            <a:schemeClr val="accent1"/>
+          </a:fillRef>
+          <a:effectRef idx="0">
+            <a:schemeClr val="accent1"/>
+          </a:effectRef>
+          <a:fontRef idx="minor">
+            <a:schemeClr val="lt1"/>
+          </a:fontRef>
+        </p:style>
+        <p:txBody>
+          <a:bodyPr rtlCol="0" anchor="ctr"/>
+          <a:lstStyle/>
+          <a:p>
+            <a:pPr algn="ctr"/>
+            <a:endParaRPr lang="en-US"/>
+          </a:p>
+        </p:txBody>
+      </p:sp>
     </p:spTree>
     <p:extLst>
       <p:ext uri="{BB962C8B-B14F-4D97-AF65-F5344CB8AC3E}">

</xml_diff>